<commit_message>
them thong tin nguoi dung
</commit_message>
<xml_diff>
--- a/src/Slide/Nhom12_slide.pptx
+++ b/src/Slide/Nhom12_slide.pptx
@@ -6,7 +6,7 @@
     <p:sldMasterId id="2147483661" r:id="rId2"/>
   </p:sldMasterIdLst>
   <p:notesMasterIdLst>
-    <p:notesMasterId r:id="rId60"/>
+    <p:notesMasterId r:id="rId63"/>
   </p:notesMasterIdLst>
   <p:sldIdLst>
     <p:sldId id="256" r:id="rId3"/>
@@ -33,39 +33,42 @@
     <p:sldId id="319" r:id="rId24"/>
     <p:sldId id="320" r:id="rId25"/>
     <p:sldId id="322" r:id="rId26"/>
-    <p:sldId id="323" r:id="rId27"/>
-    <p:sldId id="324" r:id="rId28"/>
-    <p:sldId id="325" r:id="rId29"/>
-    <p:sldId id="326" r:id="rId30"/>
-    <p:sldId id="327" r:id="rId31"/>
-    <p:sldId id="328" r:id="rId32"/>
-    <p:sldId id="329" r:id="rId33"/>
-    <p:sldId id="330" r:id="rId34"/>
-    <p:sldId id="333" r:id="rId35"/>
-    <p:sldId id="335" r:id="rId36"/>
-    <p:sldId id="334" r:id="rId37"/>
-    <p:sldId id="336" r:id="rId38"/>
-    <p:sldId id="345" r:id="rId39"/>
-    <p:sldId id="346" r:id="rId40"/>
-    <p:sldId id="347" r:id="rId41"/>
-    <p:sldId id="337" r:id="rId42"/>
-    <p:sldId id="338" r:id="rId43"/>
-    <p:sldId id="340" r:id="rId44"/>
-    <p:sldId id="341" r:id="rId45"/>
-    <p:sldId id="342" r:id="rId46"/>
-    <p:sldId id="339" r:id="rId47"/>
-    <p:sldId id="348" r:id="rId48"/>
-    <p:sldId id="350" r:id="rId49"/>
-    <p:sldId id="351" r:id="rId50"/>
-    <p:sldId id="349" r:id="rId51"/>
-    <p:sldId id="352" r:id="rId52"/>
-    <p:sldId id="354" r:id="rId53"/>
-    <p:sldId id="353" r:id="rId54"/>
-    <p:sldId id="356" r:id="rId55"/>
-    <p:sldId id="358" r:id="rId56"/>
-    <p:sldId id="359" r:id="rId57"/>
-    <p:sldId id="357" r:id="rId58"/>
-    <p:sldId id="306" r:id="rId59"/>
+    <p:sldId id="363" r:id="rId27"/>
+    <p:sldId id="365" r:id="rId28"/>
+    <p:sldId id="364" r:id="rId29"/>
+    <p:sldId id="323" r:id="rId30"/>
+    <p:sldId id="324" r:id="rId31"/>
+    <p:sldId id="325" r:id="rId32"/>
+    <p:sldId id="326" r:id="rId33"/>
+    <p:sldId id="327" r:id="rId34"/>
+    <p:sldId id="328" r:id="rId35"/>
+    <p:sldId id="329" r:id="rId36"/>
+    <p:sldId id="330" r:id="rId37"/>
+    <p:sldId id="333" r:id="rId38"/>
+    <p:sldId id="335" r:id="rId39"/>
+    <p:sldId id="334" r:id="rId40"/>
+    <p:sldId id="336" r:id="rId41"/>
+    <p:sldId id="345" r:id="rId42"/>
+    <p:sldId id="346" r:id="rId43"/>
+    <p:sldId id="347" r:id="rId44"/>
+    <p:sldId id="337" r:id="rId45"/>
+    <p:sldId id="338" r:id="rId46"/>
+    <p:sldId id="340" r:id="rId47"/>
+    <p:sldId id="341" r:id="rId48"/>
+    <p:sldId id="342" r:id="rId49"/>
+    <p:sldId id="339" r:id="rId50"/>
+    <p:sldId id="348" r:id="rId51"/>
+    <p:sldId id="350" r:id="rId52"/>
+    <p:sldId id="351" r:id="rId53"/>
+    <p:sldId id="349" r:id="rId54"/>
+    <p:sldId id="352" r:id="rId55"/>
+    <p:sldId id="354" r:id="rId56"/>
+    <p:sldId id="353" r:id="rId57"/>
+    <p:sldId id="356" r:id="rId58"/>
+    <p:sldId id="358" r:id="rId59"/>
+    <p:sldId id="359" r:id="rId60"/>
+    <p:sldId id="357" r:id="rId61"/>
+    <p:sldId id="306" r:id="rId62"/>
   </p:sldIdLst>
   <p:sldSz cx="12192000" cy="6858000"/>
   <p:notesSz cx="7559675" cy="10691813"/>
@@ -254,7 +257,7 @@
           <a:p>
             <a:fld id="{B6A92E65-837E-46E3-939D-9A3DB21820C2}" type="datetimeFigureOut">
               <a:rPr lang="en-US" smtClean="0"/>
-              <a:t>10/13/2021</a:t>
+              <a:t>10/16/2021</a:t>
             </a:fld>
             <a:endParaRPr lang="en-US"/>
           </a:p>
@@ -4754,7 +4757,7 @@
                 </a:solidFill>
                 <a:latin typeface="Rockwell"/>
               </a:rPr>
-              <a:t>10/13/2021</a:t>
+              <a:t>10/16/2021</a:t>
             </a:fld>
             <a:endParaRPr lang="en-US" sz="1800" b="0" strike="noStrike" spc="-1">
               <a:latin typeface="Times New Roman"/>
@@ -6292,7 +6295,7 @@
                 </a:solidFill>
                 <a:latin typeface="Rockwell"/>
               </a:rPr>
-              <a:t>10/13/2021</a:t>
+              <a:t>10/16/2021</a:t>
             </a:fld>
             <a:endParaRPr lang="en-US" sz="1800" b="0" strike="noStrike" spc="-1">
               <a:latin typeface="Times New Roman"/>
@@ -7301,7 +7304,7 @@
     <mc:Choice Requires="p14">
       <p:transition spd="slow" p14:dur="2000"/>
     </mc:Choice>
-    <mc:Fallback xmlns="" xmlns:p15="http://schemas.microsoft.com/office/powerpoint/2012/main">
+    <mc:Fallback xmlns:p15="http://schemas.microsoft.com/office/powerpoint/2012/main" xmlns="">
       <p:transition spd="slow"/>
     </mc:Fallback>
   </mc:AlternateContent>
@@ -7678,7 +7681,7 @@
     <mc:Choice Requires="p14">
       <p:transition spd="slow" p14:dur="2000"/>
     </mc:Choice>
-    <mc:Fallback xmlns="" xmlns:p15="http://schemas.microsoft.com/office/powerpoint/2012/main">
+    <mc:Fallback xmlns:p15="http://schemas.microsoft.com/office/powerpoint/2012/main" xmlns="">
       <p:transition spd="slow"/>
     </mc:Fallback>
   </mc:AlternateContent>
@@ -8006,7 +8009,7 @@
     <mc:Choice Requires="p14">
       <p:transition spd="slow" p14:dur="2000"/>
     </mc:Choice>
-    <mc:Fallback xmlns="" xmlns:p15="http://schemas.microsoft.com/office/powerpoint/2012/main">
+    <mc:Fallback xmlns:p15="http://schemas.microsoft.com/office/powerpoint/2012/main" xmlns="">
       <p:transition spd="slow"/>
     </mc:Fallback>
   </mc:AlternateContent>
@@ -8379,7 +8382,7 @@
     <mc:Choice Requires="p14">
       <p:transition spd="slow" p14:dur="2000"/>
     </mc:Choice>
-    <mc:Fallback xmlns="" xmlns:p15="http://schemas.microsoft.com/office/powerpoint/2012/main">
+    <mc:Fallback xmlns:p15="http://schemas.microsoft.com/office/powerpoint/2012/main" xmlns="">
       <p:transition spd="slow"/>
     </mc:Fallback>
   </mc:AlternateContent>
@@ -8728,7 +8731,7 @@
     <mc:Choice Requires="p14">
       <p:transition spd="slow" p14:dur="2000"/>
     </mc:Choice>
-    <mc:Fallback xmlns="" xmlns:p15="http://schemas.microsoft.com/office/powerpoint/2012/main">
+    <mc:Fallback xmlns:p15="http://schemas.microsoft.com/office/powerpoint/2012/main" xmlns="">
       <p:transition spd="slow"/>
     </mc:Fallback>
   </mc:AlternateContent>
@@ -8928,7 +8931,7 @@
     <mc:Choice Requires="p14">
       <p:transition spd="slow" p14:dur="2000"/>
     </mc:Choice>
-    <mc:Fallback xmlns="" xmlns:p15="http://schemas.microsoft.com/office/powerpoint/2012/main">
+    <mc:Fallback xmlns:p15="http://schemas.microsoft.com/office/powerpoint/2012/main" xmlns="">
       <p:transition spd="slow"/>
     </mc:Fallback>
   </mc:AlternateContent>
@@ -9252,7 +9255,7 @@
     <mc:Choice Requires="p14">
       <p:transition spd="slow" p14:dur="2000"/>
     </mc:Choice>
-    <mc:Fallback xmlns="" xmlns:p15="http://schemas.microsoft.com/office/powerpoint/2012/main">
+    <mc:Fallback xmlns:p15="http://schemas.microsoft.com/office/powerpoint/2012/main" xmlns="">
       <p:transition spd="slow"/>
     </mc:Fallback>
   </mc:AlternateContent>
@@ -9483,7 +9486,7 @@
     <mc:Choice Requires="p14">
       <p:transition spd="slow" p14:dur="2000"/>
     </mc:Choice>
-    <mc:Fallback xmlns="" xmlns:p15="http://schemas.microsoft.com/office/powerpoint/2012/main">
+    <mc:Fallback xmlns:p15="http://schemas.microsoft.com/office/powerpoint/2012/main" xmlns="">
       <p:transition spd="slow"/>
     </mc:Fallback>
   </mc:AlternateContent>
@@ -9892,7 +9895,7 @@
     <mc:Choice Requires="p14">
       <p:transition spd="slow" p14:dur="2000"/>
     </mc:Choice>
-    <mc:Fallback xmlns="" xmlns:p15="http://schemas.microsoft.com/office/powerpoint/2012/main">
+    <mc:Fallback xmlns:p15="http://schemas.microsoft.com/office/powerpoint/2012/main" xmlns="">
       <p:transition spd="slow"/>
     </mc:Fallback>
   </mc:AlternateContent>
@@ -10150,7 +10153,7 @@
     <mc:Choice Requires="p14">
       <p:transition spd="slow" p14:dur="2000"/>
     </mc:Choice>
-    <mc:Fallback xmlns="" xmlns:p15="http://schemas.microsoft.com/office/powerpoint/2012/main">
+    <mc:Fallback xmlns:p15="http://schemas.microsoft.com/office/powerpoint/2012/main" xmlns="">
       <p:transition spd="slow"/>
     </mc:Fallback>
   </mc:AlternateContent>
@@ -10294,7 +10297,7 @@
     <mc:Choice Requires="p14">
       <p:transition spd="slow" p14:dur="2000"/>
     </mc:Choice>
-    <mc:Fallback xmlns="" xmlns:p15="http://schemas.microsoft.com/office/powerpoint/2012/main">
+    <mc:Fallback xmlns:p15="http://schemas.microsoft.com/office/powerpoint/2012/main" xmlns="">
       <p:transition spd="slow"/>
     </mc:Fallback>
   </mc:AlternateContent>
@@ -10356,7 +10359,7 @@
         </p:nvSpPr>
         <p:spPr>
           <a:xfrm>
-            <a:off x="4970880" y="932760"/>
+            <a:off x="4970880" y="765919"/>
             <a:ext cx="2074135" cy="706432"/>
           </a:xfrm>
           <a:prstGeom prst="rect">
@@ -10413,7 +10416,7 @@
         </p:nvSpPr>
         <p:spPr>
           <a:xfrm>
-            <a:off x="1106452" y="1457111"/>
+            <a:off x="999772" y="1220916"/>
             <a:ext cx="8183322" cy="5661635"/>
           </a:xfrm>
           <a:prstGeom prst="rect">
@@ -10870,7 +10873,7 @@
     <mc:Choice Requires="p14">
       <p:transition spd="slow" p14:dur="2000"/>
     </mc:Choice>
-    <mc:Fallback xmlns="" xmlns:p15="http://schemas.microsoft.com/office/powerpoint/2012/main">
+    <mc:Fallback xmlns:p15="http://schemas.microsoft.com/office/powerpoint/2012/main" xmlns="">
       <p:transition spd="slow"/>
     </mc:Fallback>
   </mc:AlternateContent>
@@ -11114,7 +11117,7 @@
     <mc:Choice Requires="p14">
       <p:transition spd="slow" p14:dur="2000"/>
     </mc:Choice>
-    <mc:Fallback xmlns="" xmlns:p15="http://schemas.microsoft.com/office/powerpoint/2012/main">
+    <mc:Fallback xmlns:p15="http://schemas.microsoft.com/office/powerpoint/2012/main" xmlns="">
       <p:transition spd="slow"/>
     </mc:Fallback>
   </mc:AlternateContent>
@@ -11363,7 +11366,7 @@
     <mc:Choice Requires="p14">
       <p:transition spd="slow" p14:dur="2000"/>
     </mc:Choice>
-    <mc:Fallback xmlns="" xmlns:p15="http://schemas.microsoft.com/office/powerpoint/2012/main">
+    <mc:Fallback xmlns:p15="http://schemas.microsoft.com/office/powerpoint/2012/main" xmlns="">
       <p:transition spd="slow"/>
     </mc:Fallback>
   </mc:AlternateContent>
@@ -11609,7 +11612,7 @@
     <mc:Choice Requires="p14">
       <p:transition spd="slow" p14:dur="2000"/>
     </mc:Choice>
-    <mc:Fallback xmlns="" xmlns:p15="http://schemas.microsoft.com/office/powerpoint/2012/main">
+    <mc:Fallback xmlns:p15="http://schemas.microsoft.com/office/powerpoint/2012/main" xmlns="">
       <p:transition spd="slow"/>
     </mc:Fallback>
   </mc:AlternateContent>
@@ -11977,7 +11980,7 @@
     <mc:Choice Requires="p14">
       <p:transition spd="slow" p14:dur="2000"/>
     </mc:Choice>
-    <mc:Fallback xmlns="" xmlns:p15="http://schemas.microsoft.com/office/powerpoint/2012/main">
+    <mc:Fallback xmlns:p15="http://schemas.microsoft.com/office/powerpoint/2012/main" xmlns="">
       <p:transition spd="slow"/>
     </mc:Fallback>
   </mc:AlternateContent>
@@ -12342,7 +12345,7 @@
     <mc:Choice Requires="p14">
       <p:transition spd="slow" p14:dur="2000"/>
     </mc:Choice>
-    <mc:Fallback xmlns="" xmlns:p15="http://schemas.microsoft.com/office/powerpoint/2012/main">
+    <mc:Fallback xmlns:p15="http://schemas.microsoft.com/office/powerpoint/2012/main" xmlns="">
       <p:transition spd="slow"/>
     </mc:Fallback>
   </mc:AlternateContent>
@@ -12520,7 +12523,7 @@
               <a:defRPr/>
             </a:pPr>
             <a:r>
-              <a:rPr kumimoji="0" lang="en-US" sz="2400" b="0" i="0" u="none" strike="noStrike" kern="1200" cap="none" spc="0" normalizeH="0" baseline="0" noProof="0" dirty="0" smtClean="0">
+              <a:rPr kumimoji="0" lang="en-US" sz="2400" b="0" i="0" u="none" strike="noStrike" kern="1200" cap="none" spc="0" normalizeH="0" baseline="0" noProof="0" dirty="0" err="1" smtClean="0">
                 <a:ln>
                   <a:noFill/>
                 </a:ln>
@@ -12533,7 +12536,7 @@
                 <a:latin typeface="Times New Roman" panose="02020603050405020304" pitchFamily="18" charset="0"/>
                 <a:cs typeface="Times New Roman" panose="02020603050405020304" pitchFamily="18" charset="0"/>
               </a:rPr>
-              <a:t>Xem sản</a:t>
+              <a:t>Thông</a:t>
             </a:r>
             <a:r>
               <a:rPr kumimoji="0" lang="en-US" sz="2400" b="0" i="0" u="none" strike="noStrike" kern="1200" cap="none" spc="0" normalizeH="0" noProof="0" dirty="0" smtClean="0">
@@ -12549,7 +12552,39 @@
                 <a:latin typeface="Times New Roman" panose="02020603050405020304" pitchFamily="18" charset="0"/>
                 <a:cs typeface="Times New Roman" panose="02020603050405020304" pitchFamily="18" charset="0"/>
               </a:rPr>
-              <a:t> phẩm theo danh mục</a:t>
+              <a:t> tin </a:t>
+            </a:r>
+            <a:r>
+              <a:rPr kumimoji="0" lang="en-US" sz="2400" b="0" i="0" u="none" strike="noStrike" kern="1200" cap="none" spc="0" normalizeH="0" noProof="0" dirty="0" err="1" smtClean="0">
+                <a:ln>
+                  <a:noFill/>
+                </a:ln>
+                <a:solidFill>
+                  <a:prstClr val="white"/>
+                </a:solidFill>
+                <a:effectLst/>
+                <a:uLnTx/>
+                <a:uFillTx/>
+                <a:latin typeface="Times New Roman" panose="02020603050405020304" pitchFamily="18" charset="0"/>
+                <a:cs typeface="Times New Roman" panose="02020603050405020304" pitchFamily="18" charset="0"/>
+              </a:rPr>
+              <a:t>người</a:t>
+            </a:r>
+            <a:r>
+              <a:rPr kumimoji="0" lang="en-US" sz="2400" b="0" i="0" u="none" strike="noStrike" kern="1200" cap="none" spc="0" normalizeH="0" noProof="0" dirty="0" smtClean="0">
+                <a:ln>
+                  <a:noFill/>
+                </a:ln>
+                <a:solidFill>
+                  <a:prstClr val="white"/>
+                </a:solidFill>
+                <a:effectLst/>
+                <a:uLnTx/>
+                <a:uFillTx/>
+                <a:latin typeface="Times New Roman" panose="02020603050405020304" pitchFamily="18" charset="0"/>
+                <a:cs typeface="Times New Roman" panose="02020603050405020304" pitchFamily="18" charset="0"/>
+              </a:rPr>
+              <a:t> dung</a:t>
             </a:r>
             <a:endParaRPr kumimoji="0" lang="en-US" sz="2400" b="0" i="0" u="none" strike="noStrike" kern="1200" cap="none" spc="0" normalizeH="0" baseline="0" noProof="0" dirty="0">
               <a:ln>
@@ -12704,8 +12739,8 @@
         </p:blipFill>
         <p:spPr>
           <a:xfrm>
-            <a:off x="2009775" y="2365229"/>
-            <a:ext cx="8172450" cy="3704267"/>
+            <a:off x="1405364" y="2242118"/>
+            <a:ext cx="9171196" cy="3845253"/>
           </a:xfrm>
           <a:prstGeom prst="rect">
             <a:avLst/>
@@ -12715,7 +12750,7 @@
     </p:spTree>
     <p:extLst>
       <p:ext uri="{BB962C8B-B14F-4D97-AF65-F5344CB8AC3E}">
-        <p14:creationId xmlns:p14="http://schemas.microsoft.com/office/powerpoint/2010/main" val="1620215413"/>
+        <p14:creationId xmlns:p14="http://schemas.microsoft.com/office/powerpoint/2010/main" val="4179148779"/>
       </p:ext>
     </p:extLst>
   </p:cSld>
@@ -12726,7 +12761,7 @@
     <mc:Choice Requires="p14">
       <p:transition spd="slow" p14:dur="2000"/>
     </mc:Choice>
-    <mc:Fallback xmlns="" xmlns:p15="http://schemas.microsoft.com/office/powerpoint/2012/main">
+    <mc:Fallback xmlns:p15="http://schemas.microsoft.com/office/powerpoint/2012/main" xmlns="">
       <p:transition spd="slow"/>
     </mc:Fallback>
   </mc:AlternateContent>
@@ -12904,7 +12939,7 @@
               <a:defRPr/>
             </a:pPr>
             <a:r>
-              <a:rPr kumimoji="0" lang="en-US" sz="2400" b="0" i="0" u="none" strike="noStrike" kern="1200" cap="none" spc="0" normalizeH="0" baseline="0" noProof="0" dirty="0" smtClean="0">
+              <a:rPr kumimoji="0" lang="en-US" sz="2400" b="0" i="0" u="none" strike="noStrike" kern="1200" cap="none" spc="0" normalizeH="0" baseline="0" noProof="0" dirty="0" err="1" smtClean="0">
                 <a:ln>
                   <a:noFill/>
                 </a:ln>
@@ -12917,7 +12952,7 @@
                 <a:latin typeface="Times New Roman" panose="02020603050405020304" pitchFamily="18" charset="0"/>
                 <a:cs typeface="Times New Roman" panose="02020603050405020304" pitchFamily="18" charset="0"/>
               </a:rPr>
-              <a:t>Xem</a:t>
+              <a:t>Thông</a:t>
             </a:r>
             <a:r>
               <a:rPr kumimoji="0" lang="en-US" sz="2400" b="0" i="0" u="none" strike="noStrike" kern="1200" cap="none" spc="0" normalizeH="0" noProof="0" dirty="0" smtClean="0">
@@ -12933,7 +12968,39 @@
                 <a:latin typeface="Times New Roman" panose="02020603050405020304" pitchFamily="18" charset="0"/>
                 <a:cs typeface="Times New Roman" panose="02020603050405020304" pitchFamily="18" charset="0"/>
               </a:rPr>
-              <a:t> sản phẩm theo danh mục</a:t>
+              <a:t> tin </a:t>
+            </a:r>
+            <a:r>
+              <a:rPr kumimoji="0" lang="en-US" sz="2400" b="0" i="0" u="none" strike="noStrike" kern="1200" cap="none" spc="0" normalizeH="0" noProof="0" dirty="0" err="1" smtClean="0">
+                <a:ln>
+                  <a:noFill/>
+                </a:ln>
+                <a:solidFill>
+                  <a:prstClr val="white"/>
+                </a:solidFill>
+                <a:effectLst/>
+                <a:uLnTx/>
+                <a:uFillTx/>
+                <a:latin typeface="Times New Roman" panose="02020603050405020304" pitchFamily="18" charset="0"/>
+                <a:cs typeface="Times New Roman" panose="02020603050405020304" pitchFamily="18" charset="0"/>
+              </a:rPr>
+              <a:t>người</a:t>
+            </a:r>
+            <a:r>
+              <a:rPr kumimoji="0" lang="en-US" sz="2400" b="0" i="0" u="none" strike="noStrike" kern="1200" cap="none" spc="0" normalizeH="0" noProof="0" dirty="0" smtClean="0">
+                <a:ln>
+                  <a:noFill/>
+                </a:ln>
+                <a:solidFill>
+                  <a:prstClr val="white"/>
+                </a:solidFill>
+                <a:effectLst/>
+                <a:uLnTx/>
+                <a:uFillTx/>
+                <a:latin typeface="Times New Roman" panose="02020603050405020304" pitchFamily="18" charset="0"/>
+                <a:cs typeface="Times New Roman" panose="02020603050405020304" pitchFamily="18" charset="0"/>
+              </a:rPr>
+              <a:t> dung</a:t>
             </a:r>
             <a:endParaRPr kumimoji="0" lang="en-US" sz="2400" b="0" i="0" u="none" strike="noStrike" kern="1200" cap="none" spc="0" normalizeH="0" baseline="0" noProof="0" dirty="0">
               <a:ln>
@@ -12960,7 +13027,7 @@
         <p:spPr>
           <a:xfrm>
             <a:off x="1405364" y="1903564"/>
-            <a:ext cx="3961766" cy="677108"/>
+            <a:ext cx="2172723" cy="677108"/>
           </a:xfrm>
           <a:prstGeom prst="rect">
             <a:avLst/>
@@ -13007,7 +13074,7 @@
               <a:t>- </a:t>
             </a:r>
             <a:r>
-              <a:rPr kumimoji="0" lang="en-US" sz="2000" b="0" i="0" u="none" strike="noStrike" kern="1200" cap="none" spc="0" normalizeH="0" baseline="0" noProof="0" dirty="0" smtClean="0">
+              <a:rPr kumimoji="0" lang="en-US" sz="2000" b="0" i="0" u="none" strike="noStrike" kern="1200" cap="none" spc="0" normalizeH="0" baseline="0" noProof="0" dirty="0">
                 <a:ln>
                   <a:noFill/>
                 </a:ln>
@@ -13020,21 +13087,24 @@
                 <a:latin typeface="Times New Roman" panose="02020603050405020304" pitchFamily="18" charset="0"/>
                 <a:cs typeface="Times New Roman" panose="02020603050405020304" pitchFamily="18" charset="0"/>
               </a:rPr>
-              <a:t>Biểu đồ lớp phân tích</a:t>
-            </a:r>
-            <a:endParaRPr kumimoji="0" lang="en-US" sz="1800" b="0" i="0" u="none" strike="noStrike" kern="1200" cap="none" spc="0" normalizeH="0" baseline="0" noProof="0" dirty="0">
-              <a:ln>
-                <a:noFill/>
-              </a:ln>
-              <a:solidFill>
-                <a:prstClr val="white"/>
-              </a:solidFill>
-              <a:effectLst/>
-              <a:uLnTx/>
-              <a:uFillTx/>
-              <a:latin typeface="Times New Roman" panose="02020603050405020304" pitchFamily="18" charset="0"/>
-              <a:cs typeface="Times New Roman" panose="02020603050405020304" pitchFamily="18" charset="0"/>
-            </a:endParaRPr>
+              <a:t>Biểu</a:t>
+            </a:r>
+            <a:r>
+              <a:rPr kumimoji="0" lang="en-US" sz="1800" b="0" i="0" u="none" strike="noStrike" kern="1200" cap="none" spc="0" normalizeH="0" baseline="0" noProof="0" dirty="0">
+                <a:ln>
+                  <a:noFill/>
+                </a:ln>
+                <a:solidFill>
+                  <a:prstClr val="white"/>
+                </a:solidFill>
+                <a:effectLst/>
+                <a:uLnTx/>
+                <a:uFillTx/>
+                <a:latin typeface="Times New Roman" panose="02020603050405020304" pitchFamily="18" charset="0"/>
+                <a:cs typeface="Times New Roman" panose="02020603050405020304" pitchFamily="18" charset="0"/>
+              </a:rPr>
+              <a:t> đồ trình tự</a:t>
+            </a:r>
           </a:p>
           <a:p>
             <a:pPr marL="0" marR="0" lvl="0" indent="0" algn="l" defTabSz="914400" rtl="0" eaLnBrk="1" fontAlgn="auto" latinLnBrk="0" hangingPunct="1">
@@ -13085,8 +13155,8 @@
         </p:blipFill>
         <p:spPr>
           <a:xfrm>
-            <a:off x="2133600" y="2339419"/>
-            <a:ext cx="7924800" cy="3728005"/>
+            <a:off x="1155590" y="2365229"/>
+            <a:ext cx="8857090" cy="3812746"/>
           </a:xfrm>
           <a:prstGeom prst="rect">
             <a:avLst/>
@@ -13096,7 +13166,7 @@
     </p:spTree>
     <p:extLst>
       <p:ext uri="{BB962C8B-B14F-4D97-AF65-F5344CB8AC3E}">
-        <p14:creationId xmlns:p14="http://schemas.microsoft.com/office/powerpoint/2010/main" val="1070020997"/>
+        <p14:creationId xmlns:p14="http://schemas.microsoft.com/office/powerpoint/2010/main" val="968616519"/>
       </p:ext>
     </p:extLst>
   </p:cSld>
@@ -13107,7 +13177,7 @@
     <mc:Choice Requires="p14">
       <p:transition spd="slow" p14:dur="2000"/>
     </mc:Choice>
-    <mc:Fallback xmlns="" xmlns:p15="http://schemas.microsoft.com/office/powerpoint/2012/main">
+    <mc:Fallback xmlns:p15="http://schemas.microsoft.com/office/powerpoint/2012/main" xmlns="">
       <p:transition spd="slow"/>
     </mc:Fallback>
   </mc:AlternateContent>
@@ -13285,7 +13355,7 @@
               <a:defRPr/>
             </a:pPr>
             <a:r>
-              <a:rPr kumimoji="0" lang="en-US" sz="2400" b="0" i="0" u="none" strike="noStrike" kern="1200" cap="none" spc="0" normalizeH="0" baseline="0" noProof="0" dirty="0" smtClean="0">
+              <a:rPr kumimoji="0" lang="en-US" sz="2400" b="0" i="0" u="none" strike="noStrike" kern="1200" cap="none" spc="0" normalizeH="0" baseline="0" noProof="0" dirty="0" err="1" smtClean="0">
                 <a:ln>
                   <a:noFill/>
                 </a:ln>
@@ -13298,7 +13368,7 @@
                 <a:latin typeface="Times New Roman" panose="02020603050405020304" pitchFamily="18" charset="0"/>
                 <a:cs typeface="Times New Roman" panose="02020603050405020304" pitchFamily="18" charset="0"/>
               </a:rPr>
-              <a:t>Xem chi tiết</a:t>
+              <a:t>Thông</a:t>
             </a:r>
             <a:r>
               <a:rPr kumimoji="0" lang="en-US" sz="2400" b="0" i="0" u="none" strike="noStrike" kern="1200" cap="none" spc="0" normalizeH="0" noProof="0" dirty="0" smtClean="0">
@@ -13314,7 +13384,55 @@
                 <a:latin typeface="Times New Roman" panose="02020603050405020304" pitchFamily="18" charset="0"/>
                 <a:cs typeface="Times New Roman" panose="02020603050405020304" pitchFamily="18" charset="0"/>
               </a:rPr>
-              <a:t> sản phẩm</a:t>
+              <a:t> tin </a:t>
+            </a:r>
+            <a:r>
+              <a:rPr kumimoji="0" lang="en-US" sz="2400" b="0" i="0" u="none" strike="noStrike" kern="1200" cap="none" spc="0" normalizeH="0" noProof="0" dirty="0" err="1" smtClean="0">
+                <a:ln>
+                  <a:noFill/>
+                </a:ln>
+                <a:solidFill>
+                  <a:prstClr val="white"/>
+                </a:solidFill>
+                <a:effectLst/>
+                <a:uLnTx/>
+                <a:uFillTx/>
+                <a:latin typeface="Times New Roman" panose="02020603050405020304" pitchFamily="18" charset="0"/>
+                <a:cs typeface="Times New Roman" panose="02020603050405020304" pitchFamily="18" charset="0"/>
+              </a:rPr>
+              <a:t>người</a:t>
+            </a:r>
+            <a:r>
+              <a:rPr kumimoji="0" lang="en-US" sz="2400" b="0" i="0" u="none" strike="noStrike" kern="1200" cap="none" spc="0" normalizeH="0" noProof="0" dirty="0" smtClean="0">
+                <a:ln>
+                  <a:noFill/>
+                </a:ln>
+                <a:solidFill>
+                  <a:prstClr val="white"/>
+                </a:solidFill>
+                <a:effectLst/>
+                <a:uLnTx/>
+                <a:uFillTx/>
+                <a:latin typeface="Times New Roman" panose="02020603050405020304" pitchFamily="18" charset="0"/>
+                <a:cs typeface="Times New Roman" panose="02020603050405020304" pitchFamily="18" charset="0"/>
+              </a:rPr>
+              <a:t> </a:t>
+            </a:r>
+            <a:r>
+              <a:rPr kumimoji="0" lang="en-US" sz="2400" b="0" i="0" u="none" strike="noStrike" kern="1200" cap="none" spc="0" normalizeH="0" noProof="0" dirty="0" err="1" smtClean="0">
+                <a:ln>
+                  <a:noFill/>
+                </a:ln>
+                <a:solidFill>
+                  <a:prstClr val="white"/>
+                </a:solidFill>
+                <a:effectLst/>
+                <a:uLnTx/>
+                <a:uFillTx/>
+                <a:latin typeface="Times New Roman" panose="02020603050405020304" pitchFamily="18" charset="0"/>
+                <a:cs typeface="Times New Roman" panose="02020603050405020304" pitchFamily="18" charset="0"/>
+              </a:rPr>
+              <a:t>dùng</a:t>
             </a:r>
             <a:endParaRPr kumimoji="0" lang="en-US" sz="2400" b="0" i="0" u="none" strike="noStrike" kern="1200" cap="none" spc="0" normalizeH="0" baseline="0" noProof="0" dirty="0">
               <a:ln>
@@ -13341,7 +13459,7 @@
         <p:spPr>
           <a:xfrm>
             <a:off x="1405364" y="1903564"/>
-            <a:ext cx="2172723" cy="677108"/>
+            <a:ext cx="3961766" cy="677108"/>
           </a:xfrm>
           <a:prstGeom prst="rect">
             <a:avLst/>
@@ -13388,7 +13506,7 @@
               <a:t>- </a:t>
             </a:r>
             <a:r>
-              <a:rPr kumimoji="0" lang="en-US" sz="2000" b="0" i="0" u="none" strike="noStrike" kern="1200" cap="none" spc="0" normalizeH="0" baseline="0" noProof="0" dirty="0">
+              <a:rPr kumimoji="0" lang="en-US" sz="2000" b="0" i="0" u="none" strike="noStrike" kern="1200" cap="none" spc="0" normalizeH="0" baseline="0" noProof="0" dirty="0" smtClean="0">
                 <a:ln>
                   <a:noFill/>
                 </a:ln>
@@ -13401,24 +13519,21 @@
                 <a:latin typeface="Times New Roman" panose="02020603050405020304" pitchFamily="18" charset="0"/>
                 <a:cs typeface="Times New Roman" panose="02020603050405020304" pitchFamily="18" charset="0"/>
               </a:rPr>
-              <a:t>Biểu</a:t>
-            </a:r>
-            <a:r>
-              <a:rPr kumimoji="0" lang="en-US" sz="1800" b="0" i="0" u="none" strike="noStrike" kern="1200" cap="none" spc="0" normalizeH="0" baseline="0" noProof="0" dirty="0">
-                <a:ln>
-                  <a:noFill/>
-                </a:ln>
-                <a:solidFill>
-                  <a:prstClr val="white"/>
-                </a:solidFill>
-                <a:effectLst/>
-                <a:uLnTx/>
-                <a:uFillTx/>
-                <a:latin typeface="Times New Roman" panose="02020603050405020304" pitchFamily="18" charset="0"/>
-                <a:cs typeface="Times New Roman" panose="02020603050405020304" pitchFamily="18" charset="0"/>
-              </a:rPr>
-              <a:t> đồ trình tự</a:t>
-            </a:r>
+              <a:t>Biểu đồ lớp phân tích</a:t>
+            </a:r>
+            <a:endParaRPr kumimoji="0" lang="en-US" sz="1800" b="0" i="0" u="none" strike="noStrike" kern="1200" cap="none" spc="0" normalizeH="0" baseline="0" noProof="0" dirty="0">
+              <a:ln>
+                <a:noFill/>
+              </a:ln>
+              <a:solidFill>
+                <a:prstClr val="white"/>
+              </a:solidFill>
+              <a:effectLst/>
+              <a:uLnTx/>
+              <a:uFillTx/>
+              <a:latin typeface="Times New Roman" panose="02020603050405020304" pitchFamily="18" charset="0"/>
+              <a:cs typeface="Times New Roman" panose="02020603050405020304" pitchFamily="18" charset="0"/>
+            </a:endParaRPr>
           </a:p>
           <a:p>
             <a:pPr marL="0" marR="0" lvl="0" indent="0" algn="l" defTabSz="914400" rtl="0" eaLnBrk="1" fontAlgn="auto" latinLnBrk="0" hangingPunct="1">
@@ -13469,8 +13584,8 @@
         </p:blipFill>
         <p:spPr>
           <a:xfrm>
-            <a:off x="2209800" y="2365228"/>
-            <a:ext cx="7772400" cy="3483121"/>
+            <a:off x="1858684" y="2339420"/>
+            <a:ext cx="7590115" cy="3907995"/>
           </a:xfrm>
           <a:prstGeom prst="rect">
             <a:avLst/>
@@ -13480,7 +13595,7 @@
     </p:spTree>
     <p:extLst>
       <p:ext uri="{BB962C8B-B14F-4D97-AF65-F5344CB8AC3E}">
-        <p14:creationId xmlns:p14="http://schemas.microsoft.com/office/powerpoint/2010/main" val="4228237379"/>
+        <p14:creationId xmlns:p14="http://schemas.microsoft.com/office/powerpoint/2010/main" val="840522171"/>
       </p:ext>
     </p:extLst>
   </p:cSld>
@@ -13491,7 +13606,7 @@
     <mc:Choice Requires="p14">
       <p:transition spd="slow" p14:dur="2000"/>
     </mc:Choice>
-    <mc:Fallback xmlns="" xmlns:p15="http://schemas.microsoft.com/office/powerpoint/2012/main">
+    <mc:Fallback xmlns:p15="http://schemas.microsoft.com/office/powerpoint/2012/main" xmlns="">
       <p:transition spd="slow"/>
     </mc:Fallback>
   </mc:AlternateContent>
@@ -13682,7 +13797,7 @@
                 <a:latin typeface="Times New Roman" panose="02020603050405020304" pitchFamily="18" charset="0"/>
                 <a:cs typeface="Times New Roman" panose="02020603050405020304" pitchFamily="18" charset="0"/>
               </a:rPr>
-              <a:t>Xem</a:t>
+              <a:t>Xem sản</a:t>
             </a:r>
             <a:r>
               <a:rPr kumimoji="0" lang="en-US" sz="2400" b="0" i="0" u="none" strike="noStrike" kern="1200" cap="none" spc="0" normalizeH="0" noProof="0" dirty="0" smtClean="0">
@@ -13698,7 +13813,7 @@
                 <a:latin typeface="Times New Roman" panose="02020603050405020304" pitchFamily="18" charset="0"/>
                 <a:cs typeface="Times New Roman" panose="02020603050405020304" pitchFamily="18" charset="0"/>
               </a:rPr>
-              <a:t> chi tiết sản phẩm</a:t>
+              <a:t> phẩm theo danh mục</a:t>
             </a:r>
             <a:endParaRPr kumimoji="0" lang="en-US" sz="2400" b="0" i="0" u="none" strike="noStrike" kern="1200" cap="none" spc="0" normalizeH="0" baseline="0" noProof="0" dirty="0">
               <a:ln>
@@ -13725,7 +13840,7 @@
         <p:spPr>
           <a:xfrm>
             <a:off x="1405364" y="1903564"/>
-            <a:ext cx="3961766" cy="677108"/>
+            <a:ext cx="2172723" cy="677108"/>
           </a:xfrm>
           <a:prstGeom prst="rect">
             <a:avLst/>
@@ -13772,7 +13887,7 @@
               <a:t>- </a:t>
             </a:r>
             <a:r>
-              <a:rPr kumimoji="0" lang="en-US" sz="2000" b="0" i="0" u="none" strike="noStrike" kern="1200" cap="none" spc="0" normalizeH="0" baseline="0" noProof="0" dirty="0" smtClean="0">
+              <a:rPr kumimoji="0" lang="en-US" sz="2000" b="0" i="0" u="none" strike="noStrike" kern="1200" cap="none" spc="0" normalizeH="0" baseline="0" noProof="0" dirty="0">
                 <a:ln>
                   <a:noFill/>
                 </a:ln>
@@ -13785,21 +13900,24 @@
                 <a:latin typeface="Times New Roman" panose="02020603050405020304" pitchFamily="18" charset="0"/>
                 <a:cs typeface="Times New Roman" panose="02020603050405020304" pitchFamily="18" charset="0"/>
               </a:rPr>
-              <a:t>Biểu đồ lớp phân tích</a:t>
-            </a:r>
-            <a:endParaRPr kumimoji="0" lang="en-US" sz="1800" b="0" i="0" u="none" strike="noStrike" kern="1200" cap="none" spc="0" normalizeH="0" baseline="0" noProof="0" dirty="0">
-              <a:ln>
-                <a:noFill/>
-              </a:ln>
-              <a:solidFill>
-                <a:prstClr val="white"/>
-              </a:solidFill>
-              <a:effectLst/>
-              <a:uLnTx/>
-              <a:uFillTx/>
-              <a:latin typeface="Times New Roman" panose="02020603050405020304" pitchFamily="18" charset="0"/>
-              <a:cs typeface="Times New Roman" panose="02020603050405020304" pitchFamily="18" charset="0"/>
-            </a:endParaRPr>
+              <a:t>Biểu</a:t>
+            </a:r>
+            <a:r>
+              <a:rPr kumimoji="0" lang="en-US" sz="1800" b="0" i="0" u="none" strike="noStrike" kern="1200" cap="none" spc="0" normalizeH="0" baseline="0" noProof="0" dirty="0">
+                <a:ln>
+                  <a:noFill/>
+                </a:ln>
+                <a:solidFill>
+                  <a:prstClr val="white"/>
+                </a:solidFill>
+                <a:effectLst/>
+                <a:uLnTx/>
+                <a:uFillTx/>
+                <a:latin typeface="Times New Roman" panose="02020603050405020304" pitchFamily="18" charset="0"/>
+                <a:cs typeface="Times New Roman" panose="02020603050405020304" pitchFamily="18" charset="0"/>
+              </a:rPr>
+              <a:t> đồ trình tự</a:t>
+            </a:r>
           </a:p>
           <a:p>
             <a:pPr marL="0" marR="0" lvl="0" indent="0" algn="l" defTabSz="914400" rtl="0" eaLnBrk="1" fontAlgn="auto" latinLnBrk="0" hangingPunct="1">
@@ -13836,7 +13954,7 @@
       </p:sp>
       <p:pic>
         <p:nvPicPr>
-          <p:cNvPr id="6" name="Picture 5"/>
+          <p:cNvPr id="4" name="Picture 3"/>
           <p:cNvPicPr>
             <a:picLocks noChangeAspect="1"/>
           </p:cNvPicPr>
@@ -13850,8 +13968,8 @@
         </p:blipFill>
         <p:spPr>
           <a:xfrm>
-            <a:off x="2632006" y="2242118"/>
-            <a:ext cx="7458075" cy="3800873"/>
+            <a:off x="2009775" y="2365229"/>
+            <a:ext cx="8172450" cy="3704267"/>
           </a:xfrm>
           <a:prstGeom prst="rect">
             <a:avLst/>
@@ -13861,7 +13979,7 @@
     </p:spTree>
     <p:extLst>
       <p:ext uri="{BB962C8B-B14F-4D97-AF65-F5344CB8AC3E}">
-        <p14:creationId xmlns:p14="http://schemas.microsoft.com/office/powerpoint/2010/main" val="3342292692"/>
+        <p14:creationId xmlns:p14="http://schemas.microsoft.com/office/powerpoint/2010/main" val="1620215413"/>
       </p:ext>
     </p:extLst>
   </p:cSld>
@@ -13872,7 +13990,7 @@
     <mc:Choice Requires="p14">
       <p:transition spd="slow" p14:dur="2000"/>
     </mc:Choice>
-    <mc:Fallback xmlns="" xmlns:p15="http://schemas.microsoft.com/office/powerpoint/2012/main">
+    <mc:Fallback xmlns:p15="http://schemas.microsoft.com/office/powerpoint/2012/main" xmlns="">
       <p:transition spd="slow"/>
     </mc:Fallback>
   </mc:AlternateContent>
@@ -14063,7 +14181,7 @@
                 <a:latin typeface="Times New Roman" panose="02020603050405020304" pitchFamily="18" charset="0"/>
                 <a:cs typeface="Times New Roman" panose="02020603050405020304" pitchFamily="18" charset="0"/>
               </a:rPr>
-              <a:t>Tìm</a:t>
+              <a:t>Xem</a:t>
             </a:r>
             <a:r>
               <a:rPr kumimoji="0" lang="en-US" sz="2400" b="0" i="0" u="none" strike="noStrike" kern="1200" cap="none" spc="0" normalizeH="0" noProof="0" dirty="0" smtClean="0">
@@ -14079,7 +14197,7 @@
                 <a:latin typeface="Times New Roman" panose="02020603050405020304" pitchFamily="18" charset="0"/>
                 <a:cs typeface="Times New Roman" panose="02020603050405020304" pitchFamily="18" charset="0"/>
               </a:rPr>
-              <a:t> kiếm sản phẩm</a:t>
+              <a:t> sản phẩm theo danh mục</a:t>
             </a:r>
             <a:endParaRPr kumimoji="0" lang="en-US" sz="2400" b="0" i="0" u="none" strike="noStrike" kern="1200" cap="none" spc="0" normalizeH="0" baseline="0" noProof="0" dirty="0">
               <a:ln>
@@ -14106,7 +14224,7 @@
         <p:spPr>
           <a:xfrm>
             <a:off x="1405364" y="1903564"/>
-            <a:ext cx="2172723" cy="677108"/>
+            <a:ext cx="3961766" cy="677108"/>
           </a:xfrm>
           <a:prstGeom prst="rect">
             <a:avLst/>
@@ -14153,7 +14271,7 @@
               <a:t>- </a:t>
             </a:r>
             <a:r>
-              <a:rPr kumimoji="0" lang="en-US" sz="2000" b="0" i="0" u="none" strike="noStrike" kern="1200" cap="none" spc="0" normalizeH="0" baseline="0" noProof="0" dirty="0">
+              <a:rPr kumimoji="0" lang="en-US" sz="2000" b="0" i="0" u="none" strike="noStrike" kern="1200" cap="none" spc="0" normalizeH="0" baseline="0" noProof="0" dirty="0" smtClean="0">
                 <a:ln>
                   <a:noFill/>
                 </a:ln>
@@ -14166,24 +14284,21 @@
                 <a:latin typeface="Times New Roman" panose="02020603050405020304" pitchFamily="18" charset="0"/>
                 <a:cs typeface="Times New Roman" panose="02020603050405020304" pitchFamily="18" charset="0"/>
               </a:rPr>
-              <a:t>Biểu</a:t>
-            </a:r>
-            <a:r>
-              <a:rPr kumimoji="0" lang="en-US" sz="1800" b="0" i="0" u="none" strike="noStrike" kern="1200" cap="none" spc="0" normalizeH="0" baseline="0" noProof="0" dirty="0">
-                <a:ln>
-                  <a:noFill/>
-                </a:ln>
-                <a:solidFill>
-                  <a:prstClr val="white"/>
-                </a:solidFill>
-                <a:effectLst/>
-                <a:uLnTx/>
-                <a:uFillTx/>
-                <a:latin typeface="Times New Roman" panose="02020603050405020304" pitchFamily="18" charset="0"/>
-                <a:cs typeface="Times New Roman" panose="02020603050405020304" pitchFamily="18" charset="0"/>
-              </a:rPr>
-              <a:t> đồ trình tự</a:t>
-            </a:r>
+              <a:t>Biểu đồ lớp phân tích</a:t>
+            </a:r>
+            <a:endParaRPr kumimoji="0" lang="en-US" sz="1800" b="0" i="0" u="none" strike="noStrike" kern="1200" cap="none" spc="0" normalizeH="0" baseline="0" noProof="0" dirty="0">
+              <a:ln>
+                <a:noFill/>
+              </a:ln>
+              <a:solidFill>
+                <a:prstClr val="white"/>
+              </a:solidFill>
+              <a:effectLst/>
+              <a:uLnTx/>
+              <a:uFillTx/>
+              <a:latin typeface="Times New Roman" panose="02020603050405020304" pitchFamily="18" charset="0"/>
+              <a:cs typeface="Times New Roman" panose="02020603050405020304" pitchFamily="18" charset="0"/>
+            </a:endParaRPr>
           </a:p>
           <a:p>
             <a:pPr marL="0" marR="0" lvl="0" indent="0" algn="l" defTabSz="914400" rtl="0" eaLnBrk="1" fontAlgn="auto" latinLnBrk="0" hangingPunct="1">
@@ -14220,7 +14335,7 @@
       </p:sp>
       <p:pic>
         <p:nvPicPr>
-          <p:cNvPr id="4" name="Picture 3"/>
+          <p:cNvPr id="5" name="Picture 4"/>
           <p:cNvPicPr>
             <a:picLocks noChangeAspect="1"/>
           </p:cNvPicPr>
@@ -14234,8 +14349,8 @@
         </p:blipFill>
         <p:spPr>
           <a:xfrm>
-            <a:off x="2228850" y="2365228"/>
-            <a:ext cx="7734300" cy="3597421"/>
+            <a:off x="2133600" y="2339419"/>
+            <a:ext cx="7924800" cy="3728005"/>
           </a:xfrm>
           <a:prstGeom prst="rect">
             <a:avLst/>
@@ -14245,7 +14360,7 @@
     </p:spTree>
     <p:extLst>
       <p:ext uri="{BB962C8B-B14F-4D97-AF65-F5344CB8AC3E}">
-        <p14:creationId xmlns:p14="http://schemas.microsoft.com/office/powerpoint/2010/main" val="449508041"/>
+        <p14:creationId xmlns:p14="http://schemas.microsoft.com/office/powerpoint/2010/main" val="1070020997"/>
       </p:ext>
     </p:extLst>
   </p:cSld>
@@ -14256,7 +14371,7 @@
     <mc:Choice Requires="p14">
       <p:transition spd="slow" p14:dur="2000"/>
     </mc:Choice>
-    <mc:Fallback xmlns="" xmlns:p15="http://schemas.microsoft.com/office/powerpoint/2012/main">
+    <mc:Fallback xmlns:p15="http://schemas.microsoft.com/office/powerpoint/2012/main" xmlns="">
       <p:transition spd="slow"/>
     </mc:Fallback>
   </mc:AlternateContent>
@@ -14606,7 +14721,7 @@
     <mc:Choice Requires="p14">
       <p:transition spd="slow" p14:dur="2000"/>
     </mc:Choice>
-    <mc:Fallback xmlns="" xmlns:p15="http://schemas.microsoft.com/office/powerpoint/2012/main">
+    <mc:Fallback xmlns:p15="http://schemas.microsoft.com/office/powerpoint/2012/main" xmlns="">
       <p:transition spd="slow"/>
     </mc:Fallback>
   </mc:AlternateContent>
@@ -14797,7 +14912,7 @@
                 <a:latin typeface="Times New Roman" panose="02020603050405020304" pitchFamily="18" charset="0"/>
                 <a:cs typeface="Times New Roman" panose="02020603050405020304" pitchFamily="18" charset="0"/>
               </a:rPr>
-              <a:t>Tìm</a:t>
+              <a:t>Xem chi tiết</a:t>
             </a:r>
             <a:r>
               <a:rPr kumimoji="0" lang="en-US" sz="2400" b="0" i="0" u="none" strike="noStrike" kern="1200" cap="none" spc="0" normalizeH="0" noProof="0" dirty="0" smtClean="0">
@@ -14813,7 +14928,7 @@
                 <a:latin typeface="Times New Roman" panose="02020603050405020304" pitchFamily="18" charset="0"/>
                 <a:cs typeface="Times New Roman" panose="02020603050405020304" pitchFamily="18" charset="0"/>
               </a:rPr>
-              <a:t> kiếm sản phẩm</a:t>
+              <a:t> sản phẩm</a:t>
             </a:r>
             <a:endParaRPr kumimoji="0" lang="en-US" sz="2400" b="0" i="0" u="none" strike="noStrike" kern="1200" cap="none" spc="0" normalizeH="0" baseline="0" noProof="0" dirty="0">
               <a:ln>
@@ -14840,7 +14955,7 @@
         <p:spPr>
           <a:xfrm>
             <a:off x="1405364" y="1903564"/>
-            <a:ext cx="3961766" cy="677108"/>
+            <a:ext cx="2172723" cy="677108"/>
           </a:xfrm>
           <a:prstGeom prst="rect">
             <a:avLst/>
@@ -14887,7 +15002,7 @@
               <a:t>- </a:t>
             </a:r>
             <a:r>
-              <a:rPr kumimoji="0" lang="en-US" sz="2000" b="0" i="0" u="none" strike="noStrike" kern="1200" cap="none" spc="0" normalizeH="0" baseline="0" noProof="0" dirty="0" smtClean="0">
+              <a:rPr kumimoji="0" lang="en-US" sz="2000" b="0" i="0" u="none" strike="noStrike" kern="1200" cap="none" spc="0" normalizeH="0" baseline="0" noProof="0" dirty="0">
                 <a:ln>
                   <a:noFill/>
                 </a:ln>
@@ -14900,21 +15015,24 @@
                 <a:latin typeface="Times New Roman" panose="02020603050405020304" pitchFamily="18" charset="0"/>
                 <a:cs typeface="Times New Roman" panose="02020603050405020304" pitchFamily="18" charset="0"/>
               </a:rPr>
-              <a:t>Biểu đồ lớp phân tích</a:t>
-            </a:r>
-            <a:endParaRPr kumimoji="0" lang="en-US" sz="1800" b="0" i="0" u="none" strike="noStrike" kern="1200" cap="none" spc="0" normalizeH="0" baseline="0" noProof="0" dirty="0">
-              <a:ln>
-                <a:noFill/>
-              </a:ln>
-              <a:solidFill>
-                <a:prstClr val="white"/>
-              </a:solidFill>
-              <a:effectLst/>
-              <a:uLnTx/>
-              <a:uFillTx/>
-              <a:latin typeface="Times New Roman" panose="02020603050405020304" pitchFamily="18" charset="0"/>
-              <a:cs typeface="Times New Roman" panose="02020603050405020304" pitchFamily="18" charset="0"/>
-            </a:endParaRPr>
+              <a:t>Biểu</a:t>
+            </a:r>
+            <a:r>
+              <a:rPr kumimoji="0" lang="en-US" sz="1800" b="0" i="0" u="none" strike="noStrike" kern="1200" cap="none" spc="0" normalizeH="0" baseline="0" noProof="0" dirty="0">
+                <a:ln>
+                  <a:noFill/>
+                </a:ln>
+                <a:solidFill>
+                  <a:prstClr val="white"/>
+                </a:solidFill>
+                <a:effectLst/>
+                <a:uLnTx/>
+                <a:uFillTx/>
+                <a:latin typeface="Times New Roman" panose="02020603050405020304" pitchFamily="18" charset="0"/>
+                <a:cs typeface="Times New Roman" panose="02020603050405020304" pitchFamily="18" charset="0"/>
+              </a:rPr>
+              <a:t> đồ trình tự</a:t>
+            </a:r>
           </a:p>
           <a:p>
             <a:pPr marL="0" marR="0" lvl="0" indent="0" algn="l" defTabSz="914400" rtl="0" eaLnBrk="1" fontAlgn="auto" latinLnBrk="0" hangingPunct="1">
@@ -14965,8 +15083,8 @@
         </p:blipFill>
         <p:spPr>
           <a:xfrm>
-            <a:off x="2262187" y="2226365"/>
-            <a:ext cx="7667625" cy="3644348"/>
+            <a:off x="2209800" y="2365228"/>
+            <a:ext cx="7772400" cy="3483121"/>
           </a:xfrm>
           <a:prstGeom prst="rect">
             <a:avLst/>
@@ -14976,7 +15094,7 @@
     </p:spTree>
     <p:extLst>
       <p:ext uri="{BB962C8B-B14F-4D97-AF65-F5344CB8AC3E}">
-        <p14:creationId xmlns:p14="http://schemas.microsoft.com/office/powerpoint/2010/main" val="886097603"/>
+        <p14:creationId xmlns:p14="http://schemas.microsoft.com/office/powerpoint/2010/main" val="4228237379"/>
       </p:ext>
     </p:extLst>
   </p:cSld>
@@ -14987,7 +15105,7 @@
     <mc:Choice Requires="p14">
       <p:transition spd="slow" p14:dur="2000"/>
     </mc:Choice>
-    <mc:Fallback xmlns="" xmlns:p15="http://schemas.microsoft.com/office/powerpoint/2012/main">
+    <mc:Fallback xmlns:p15="http://schemas.microsoft.com/office/powerpoint/2012/main" xmlns="">
       <p:transition spd="slow"/>
     </mc:Fallback>
   </mc:AlternateContent>
@@ -15165,14 +15283,36 @@
               <a:defRPr/>
             </a:pPr>
             <a:r>
-              <a:rPr lang="en-US" sz="2400" dirty="0" smtClean="0">
+              <a:rPr kumimoji="0" lang="en-US" sz="2400" b="0" i="0" u="none" strike="noStrike" kern="1200" cap="none" spc="0" normalizeH="0" baseline="0" noProof="0" dirty="0" smtClean="0">
+                <a:ln>
+                  <a:noFill/>
+                </a:ln>
                 <a:solidFill>
                   <a:prstClr val="white"/>
                 </a:solidFill>
+                <a:effectLst/>
+                <a:uLnTx/>
+                <a:uFillTx/>
                 <a:latin typeface="Times New Roman" panose="02020603050405020304" pitchFamily="18" charset="0"/>
                 <a:cs typeface="Times New Roman" panose="02020603050405020304" pitchFamily="18" charset="0"/>
               </a:rPr>
-              <a:t>Đăng kí nhận thông tin</a:t>
+              <a:t>Xem</a:t>
+            </a:r>
+            <a:r>
+              <a:rPr kumimoji="0" lang="en-US" sz="2400" b="0" i="0" u="none" strike="noStrike" kern="1200" cap="none" spc="0" normalizeH="0" noProof="0" dirty="0" smtClean="0">
+                <a:ln>
+                  <a:noFill/>
+                </a:ln>
+                <a:solidFill>
+                  <a:prstClr val="white"/>
+                </a:solidFill>
+                <a:effectLst/>
+                <a:uLnTx/>
+                <a:uFillTx/>
+                <a:latin typeface="Times New Roman" panose="02020603050405020304" pitchFamily="18" charset="0"/>
+                <a:cs typeface="Times New Roman" panose="02020603050405020304" pitchFamily="18" charset="0"/>
+              </a:rPr>
+              <a:t> chi tiết sản phẩm</a:t>
             </a:r>
             <a:endParaRPr kumimoji="0" lang="en-US" sz="2400" b="0" i="0" u="none" strike="noStrike" kern="1200" cap="none" spc="0" normalizeH="0" baseline="0" noProof="0" dirty="0">
               <a:ln>
@@ -15199,7 +15339,7 @@
         <p:spPr>
           <a:xfrm>
             <a:off x="1405364" y="1903564"/>
-            <a:ext cx="2172723" cy="677108"/>
+            <a:ext cx="3961766" cy="677108"/>
           </a:xfrm>
           <a:prstGeom prst="rect">
             <a:avLst/>
@@ -15246,7 +15386,7 @@
               <a:t>- </a:t>
             </a:r>
             <a:r>
-              <a:rPr kumimoji="0" lang="en-US" sz="2000" b="0" i="0" u="none" strike="noStrike" kern="1200" cap="none" spc="0" normalizeH="0" baseline="0" noProof="0" dirty="0">
+              <a:rPr kumimoji="0" lang="en-US" sz="2000" b="0" i="0" u="none" strike="noStrike" kern="1200" cap="none" spc="0" normalizeH="0" baseline="0" noProof="0" dirty="0" smtClean="0">
                 <a:ln>
                   <a:noFill/>
                 </a:ln>
@@ -15259,24 +15399,21 @@
                 <a:latin typeface="Times New Roman" panose="02020603050405020304" pitchFamily="18" charset="0"/>
                 <a:cs typeface="Times New Roman" panose="02020603050405020304" pitchFamily="18" charset="0"/>
               </a:rPr>
-              <a:t>Biểu</a:t>
-            </a:r>
-            <a:r>
-              <a:rPr kumimoji="0" lang="en-US" sz="1800" b="0" i="0" u="none" strike="noStrike" kern="1200" cap="none" spc="0" normalizeH="0" baseline="0" noProof="0" dirty="0">
-                <a:ln>
-                  <a:noFill/>
-                </a:ln>
-                <a:solidFill>
-                  <a:prstClr val="white"/>
-                </a:solidFill>
-                <a:effectLst/>
-                <a:uLnTx/>
-                <a:uFillTx/>
-                <a:latin typeface="Times New Roman" panose="02020603050405020304" pitchFamily="18" charset="0"/>
-                <a:cs typeface="Times New Roman" panose="02020603050405020304" pitchFamily="18" charset="0"/>
-              </a:rPr>
-              <a:t> đồ trình tự</a:t>
-            </a:r>
+              <a:t>Biểu đồ lớp phân tích</a:t>
+            </a:r>
+            <a:endParaRPr kumimoji="0" lang="en-US" sz="1800" b="0" i="0" u="none" strike="noStrike" kern="1200" cap="none" spc="0" normalizeH="0" baseline="0" noProof="0" dirty="0">
+              <a:ln>
+                <a:noFill/>
+              </a:ln>
+              <a:solidFill>
+                <a:prstClr val="white"/>
+              </a:solidFill>
+              <a:effectLst/>
+              <a:uLnTx/>
+              <a:uFillTx/>
+              <a:latin typeface="Times New Roman" panose="02020603050405020304" pitchFamily="18" charset="0"/>
+              <a:cs typeface="Times New Roman" panose="02020603050405020304" pitchFamily="18" charset="0"/>
+            </a:endParaRPr>
           </a:p>
           <a:p>
             <a:pPr marL="0" marR="0" lvl="0" indent="0" algn="l" defTabSz="914400" rtl="0" eaLnBrk="1" fontAlgn="auto" latinLnBrk="0" hangingPunct="1">
@@ -15313,7 +15450,7 @@
       </p:sp>
       <p:pic>
         <p:nvPicPr>
-          <p:cNvPr id="5" name="Picture 4"/>
+          <p:cNvPr id="6" name="Picture 5"/>
           <p:cNvPicPr>
             <a:picLocks noChangeAspect="1"/>
           </p:cNvPicPr>
@@ -15327,8 +15464,8 @@
         </p:blipFill>
         <p:spPr>
           <a:xfrm>
-            <a:off x="1966912" y="2365228"/>
-            <a:ext cx="8258175" cy="3692671"/>
+            <a:off x="2632006" y="2242118"/>
+            <a:ext cx="7458075" cy="3800873"/>
           </a:xfrm>
           <a:prstGeom prst="rect">
             <a:avLst/>
@@ -15338,7 +15475,7 @@
     </p:spTree>
     <p:extLst>
       <p:ext uri="{BB962C8B-B14F-4D97-AF65-F5344CB8AC3E}">
-        <p14:creationId xmlns:p14="http://schemas.microsoft.com/office/powerpoint/2010/main" val="1414748006"/>
+        <p14:creationId xmlns:p14="http://schemas.microsoft.com/office/powerpoint/2010/main" val="3342292692"/>
       </p:ext>
     </p:extLst>
   </p:cSld>
@@ -15349,7 +15486,7 @@
     <mc:Choice Requires="p14">
       <p:transition spd="slow" p14:dur="2000"/>
     </mc:Choice>
-    <mc:Fallback xmlns="" xmlns:p15="http://schemas.microsoft.com/office/powerpoint/2012/main">
+    <mc:Fallback xmlns:p15="http://schemas.microsoft.com/office/powerpoint/2012/main" xmlns="">
       <p:transition spd="slow"/>
     </mc:Fallback>
   </mc:AlternateContent>
@@ -15527,14 +15664,36 @@
               <a:defRPr/>
             </a:pPr>
             <a:r>
-              <a:rPr lang="en-US" sz="2400" dirty="0" smtClean="0">
+              <a:rPr kumimoji="0" lang="en-US" sz="2400" b="0" i="0" u="none" strike="noStrike" kern="1200" cap="none" spc="0" normalizeH="0" baseline="0" noProof="0" dirty="0" smtClean="0">
+                <a:ln>
+                  <a:noFill/>
+                </a:ln>
                 <a:solidFill>
                   <a:prstClr val="white"/>
                 </a:solidFill>
+                <a:effectLst/>
+                <a:uLnTx/>
+                <a:uFillTx/>
                 <a:latin typeface="Times New Roman" panose="02020603050405020304" pitchFamily="18" charset="0"/>
                 <a:cs typeface="Times New Roman" panose="02020603050405020304" pitchFamily="18" charset="0"/>
               </a:rPr>
-              <a:t>Đăng kí nhận thông tin</a:t>
+              <a:t>Tìm</a:t>
+            </a:r>
+            <a:r>
+              <a:rPr kumimoji="0" lang="en-US" sz="2400" b="0" i="0" u="none" strike="noStrike" kern="1200" cap="none" spc="0" normalizeH="0" noProof="0" dirty="0" smtClean="0">
+                <a:ln>
+                  <a:noFill/>
+                </a:ln>
+                <a:solidFill>
+                  <a:prstClr val="white"/>
+                </a:solidFill>
+                <a:effectLst/>
+                <a:uLnTx/>
+                <a:uFillTx/>
+                <a:latin typeface="Times New Roman" panose="02020603050405020304" pitchFamily="18" charset="0"/>
+                <a:cs typeface="Times New Roman" panose="02020603050405020304" pitchFamily="18" charset="0"/>
+              </a:rPr>
+              <a:t> kiếm sản phẩm</a:t>
             </a:r>
             <a:endParaRPr kumimoji="0" lang="en-US" sz="2400" b="0" i="0" u="none" strike="noStrike" kern="1200" cap="none" spc="0" normalizeH="0" baseline="0" noProof="0" dirty="0">
               <a:ln>
@@ -15561,7 +15720,7 @@
         <p:spPr>
           <a:xfrm>
             <a:off x="1405364" y="1903564"/>
-            <a:ext cx="3961766" cy="677108"/>
+            <a:ext cx="2172723" cy="677108"/>
           </a:xfrm>
           <a:prstGeom prst="rect">
             <a:avLst/>
@@ -15608,7 +15767,7 @@
               <a:t>- </a:t>
             </a:r>
             <a:r>
-              <a:rPr kumimoji="0" lang="en-US" sz="2000" b="0" i="0" u="none" strike="noStrike" kern="1200" cap="none" spc="0" normalizeH="0" baseline="0" noProof="0" dirty="0" smtClean="0">
+              <a:rPr kumimoji="0" lang="en-US" sz="2000" b="0" i="0" u="none" strike="noStrike" kern="1200" cap="none" spc="0" normalizeH="0" baseline="0" noProof="0" dirty="0">
                 <a:ln>
                   <a:noFill/>
                 </a:ln>
@@ -15621,21 +15780,24 @@
                 <a:latin typeface="Times New Roman" panose="02020603050405020304" pitchFamily="18" charset="0"/>
                 <a:cs typeface="Times New Roman" panose="02020603050405020304" pitchFamily="18" charset="0"/>
               </a:rPr>
-              <a:t>Biểu đồ lớp phân tích</a:t>
-            </a:r>
-            <a:endParaRPr kumimoji="0" lang="en-US" sz="1800" b="0" i="0" u="none" strike="noStrike" kern="1200" cap="none" spc="0" normalizeH="0" baseline="0" noProof="0" dirty="0">
-              <a:ln>
-                <a:noFill/>
-              </a:ln>
-              <a:solidFill>
-                <a:prstClr val="white"/>
-              </a:solidFill>
-              <a:effectLst/>
-              <a:uLnTx/>
-              <a:uFillTx/>
-              <a:latin typeface="Times New Roman" panose="02020603050405020304" pitchFamily="18" charset="0"/>
-              <a:cs typeface="Times New Roman" panose="02020603050405020304" pitchFamily="18" charset="0"/>
-            </a:endParaRPr>
+              <a:t>Biểu</a:t>
+            </a:r>
+            <a:r>
+              <a:rPr kumimoji="0" lang="en-US" sz="1800" b="0" i="0" u="none" strike="noStrike" kern="1200" cap="none" spc="0" normalizeH="0" baseline="0" noProof="0" dirty="0">
+                <a:ln>
+                  <a:noFill/>
+                </a:ln>
+                <a:solidFill>
+                  <a:prstClr val="white"/>
+                </a:solidFill>
+                <a:effectLst/>
+                <a:uLnTx/>
+                <a:uFillTx/>
+                <a:latin typeface="Times New Roman" panose="02020603050405020304" pitchFamily="18" charset="0"/>
+                <a:cs typeface="Times New Roman" panose="02020603050405020304" pitchFamily="18" charset="0"/>
+              </a:rPr>
+              <a:t> đồ trình tự</a:t>
+            </a:r>
           </a:p>
           <a:p>
             <a:pPr marL="0" marR="0" lvl="0" indent="0" algn="l" defTabSz="914400" rtl="0" eaLnBrk="1" fontAlgn="auto" latinLnBrk="0" hangingPunct="1">
@@ -15686,8 +15848,8 @@
         </p:blipFill>
         <p:spPr>
           <a:xfrm>
-            <a:off x="2471736" y="2242119"/>
-            <a:ext cx="7248525" cy="3734612"/>
+            <a:off x="2228850" y="2365228"/>
+            <a:ext cx="7734300" cy="3597421"/>
           </a:xfrm>
           <a:prstGeom prst="rect">
             <a:avLst/>
@@ -15697,7 +15859,7 @@
     </p:spTree>
     <p:extLst>
       <p:ext uri="{BB962C8B-B14F-4D97-AF65-F5344CB8AC3E}">
-        <p14:creationId xmlns:p14="http://schemas.microsoft.com/office/powerpoint/2010/main" val="811708155"/>
+        <p14:creationId xmlns:p14="http://schemas.microsoft.com/office/powerpoint/2010/main" val="449508041"/>
       </p:ext>
     </p:extLst>
   </p:cSld>
@@ -15708,7 +15870,7 @@
     <mc:Choice Requires="p14">
       <p:transition spd="slow" p14:dur="2000"/>
     </mc:Choice>
-    <mc:Fallback xmlns="" xmlns:p15="http://schemas.microsoft.com/office/powerpoint/2012/main">
+    <mc:Fallback xmlns:p15="http://schemas.microsoft.com/office/powerpoint/2012/main" xmlns="">
       <p:transition spd="slow"/>
     </mc:Fallback>
   </mc:AlternateContent>
@@ -15886,14 +16048,36 @@
               <a:defRPr/>
             </a:pPr>
             <a:r>
-              <a:rPr lang="en-US" sz="2400" noProof="0" dirty="0" smtClean="0">
+              <a:rPr kumimoji="0" lang="en-US" sz="2400" b="0" i="0" u="none" strike="noStrike" kern="1200" cap="none" spc="0" normalizeH="0" baseline="0" noProof="0" dirty="0" smtClean="0">
+                <a:ln>
+                  <a:noFill/>
+                </a:ln>
                 <a:solidFill>
                   <a:prstClr val="white"/>
                 </a:solidFill>
+                <a:effectLst/>
+                <a:uLnTx/>
+                <a:uFillTx/>
                 <a:latin typeface="Times New Roman" panose="02020603050405020304" pitchFamily="18" charset="0"/>
                 <a:cs typeface="Times New Roman" panose="02020603050405020304" pitchFamily="18" charset="0"/>
               </a:rPr>
-              <a:t>Đặt hàng</a:t>
+              <a:t>Tìm</a:t>
+            </a:r>
+            <a:r>
+              <a:rPr kumimoji="0" lang="en-US" sz="2400" b="0" i="0" u="none" strike="noStrike" kern="1200" cap="none" spc="0" normalizeH="0" noProof="0" dirty="0" smtClean="0">
+                <a:ln>
+                  <a:noFill/>
+                </a:ln>
+                <a:solidFill>
+                  <a:prstClr val="white"/>
+                </a:solidFill>
+                <a:effectLst/>
+                <a:uLnTx/>
+                <a:uFillTx/>
+                <a:latin typeface="Times New Roman" panose="02020603050405020304" pitchFamily="18" charset="0"/>
+                <a:cs typeface="Times New Roman" panose="02020603050405020304" pitchFamily="18" charset="0"/>
+              </a:rPr>
+              <a:t> kiếm sản phẩm</a:t>
             </a:r>
             <a:endParaRPr kumimoji="0" lang="en-US" sz="2400" b="0" i="0" u="none" strike="noStrike" kern="1200" cap="none" spc="0" normalizeH="0" baseline="0" noProof="0" dirty="0">
               <a:ln>
@@ -15920,7 +16104,7 @@
         <p:spPr>
           <a:xfrm>
             <a:off x="1405364" y="1903564"/>
-            <a:ext cx="2172723" cy="677108"/>
+            <a:ext cx="3961766" cy="677108"/>
           </a:xfrm>
           <a:prstGeom prst="rect">
             <a:avLst/>
@@ -15967,7 +16151,7 @@
               <a:t>- </a:t>
             </a:r>
             <a:r>
-              <a:rPr kumimoji="0" lang="en-US" sz="2000" b="0" i="0" u="none" strike="noStrike" kern="1200" cap="none" spc="0" normalizeH="0" baseline="0" noProof="0" dirty="0">
+              <a:rPr kumimoji="0" lang="en-US" sz="2000" b="0" i="0" u="none" strike="noStrike" kern="1200" cap="none" spc="0" normalizeH="0" baseline="0" noProof="0" dirty="0" smtClean="0">
                 <a:ln>
                   <a:noFill/>
                 </a:ln>
@@ -15980,24 +16164,21 @@
                 <a:latin typeface="Times New Roman" panose="02020603050405020304" pitchFamily="18" charset="0"/>
                 <a:cs typeface="Times New Roman" panose="02020603050405020304" pitchFamily="18" charset="0"/>
               </a:rPr>
-              <a:t>Biểu</a:t>
-            </a:r>
-            <a:r>
-              <a:rPr kumimoji="0" lang="en-US" sz="1800" b="0" i="0" u="none" strike="noStrike" kern="1200" cap="none" spc="0" normalizeH="0" baseline="0" noProof="0" dirty="0">
-                <a:ln>
-                  <a:noFill/>
-                </a:ln>
-                <a:solidFill>
-                  <a:prstClr val="white"/>
-                </a:solidFill>
-                <a:effectLst/>
-                <a:uLnTx/>
-                <a:uFillTx/>
-                <a:latin typeface="Times New Roman" panose="02020603050405020304" pitchFamily="18" charset="0"/>
-                <a:cs typeface="Times New Roman" panose="02020603050405020304" pitchFamily="18" charset="0"/>
-              </a:rPr>
-              <a:t> đồ trình tự</a:t>
-            </a:r>
+              <a:t>Biểu đồ lớp phân tích</a:t>
+            </a:r>
+            <a:endParaRPr kumimoji="0" lang="en-US" sz="1800" b="0" i="0" u="none" strike="noStrike" kern="1200" cap="none" spc="0" normalizeH="0" baseline="0" noProof="0" dirty="0">
+              <a:ln>
+                <a:noFill/>
+              </a:ln>
+              <a:solidFill>
+                <a:prstClr val="white"/>
+              </a:solidFill>
+              <a:effectLst/>
+              <a:uLnTx/>
+              <a:uFillTx/>
+              <a:latin typeface="Times New Roman" panose="02020603050405020304" pitchFamily="18" charset="0"/>
+              <a:cs typeface="Times New Roman" panose="02020603050405020304" pitchFamily="18" charset="0"/>
+            </a:endParaRPr>
           </a:p>
           <a:p>
             <a:pPr marL="0" marR="0" lvl="0" indent="0" algn="l" defTabSz="914400" rtl="0" eaLnBrk="1" fontAlgn="auto" latinLnBrk="0" hangingPunct="1">
@@ -16034,7 +16215,7 @@
       </p:sp>
       <p:pic>
         <p:nvPicPr>
-          <p:cNvPr id="4" name="Picture 3"/>
+          <p:cNvPr id="5" name="Picture 4"/>
           <p:cNvPicPr>
             <a:picLocks noChangeAspect="1"/>
           </p:cNvPicPr>
@@ -16048,8 +16229,8 @@
         </p:blipFill>
         <p:spPr>
           <a:xfrm>
-            <a:off x="1890712" y="2365229"/>
-            <a:ext cx="8410575" cy="3584997"/>
+            <a:off x="2262187" y="2226365"/>
+            <a:ext cx="7667625" cy="3644348"/>
           </a:xfrm>
           <a:prstGeom prst="rect">
             <a:avLst/>
@@ -16059,7 +16240,7 @@
     </p:spTree>
     <p:extLst>
       <p:ext uri="{BB962C8B-B14F-4D97-AF65-F5344CB8AC3E}">
-        <p14:creationId xmlns:p14="http://schemas.microsoft.com/office/powerpoint/2010/main" val="444798182"/>
+        <p14:creationId xmlns:p14="http://schemas.microsoft.com/office/powerpoint/2010/main" val="886097603"/>
       </p:ext>
     </p:extLst>
   </p:cSld>
@@ -16070,7 +16251,7 @@
     <mc:Choice Requires="p14">
       <p:transition spd="slow" p14:dur="2000"/>
     </mc:Choice>
-    <mc:Fallback xmlns="" xmlns:p15="http://schemas.microsoft.com/office/powerpoint/2012/main">
+    <mc:Fallback xmlns:p15="http://schemas.microsoft.com/office/powerpoint/2012/main" xmlns="">
       <p:transition spd="slow"/>
     </mc:Fallback>
   </mc:AlternateContent>
@@ -16248,14 +16429,14 @@
               <a:defRPr/>
             </a:pPr>
             <a:r>
-              <a:rPr lang="en-US" sz="2400" noProof="0" dirty="0" smtClean="0">
+              <a:rPr lang="en-US" sz="2400" dirty="0" smtClean="0">
                 <a:solidFill>
                   <a:prstClr val="white"/>
                 </a:solidFill>
                 <a:latin typeface="Times New Roman" panose="02020603050405020304" pitchFamily="18" charset="0"/>
                 <a:cs typeface="Times New Roman" panose="02020603050405020304" pitchFamily="18" charset="0"/>
               </a:rPr>
-              <a:t>Đặt hàng</a:t>
+              <a:t>Đăng kí nhận thông tin</a:t>
             </a:r>
             <a:endParaRPr kumimoji="0" lang="en-US" sz="2400" b="0" i="0" u="none" strike="noStrike" kern="1200" cap="none" spc="0" normalizeH="0" baseline="0" noProof="0" dirty="0">
               <a:ln>
@@ -16410,8 +16591,8 @@
         </p:blipFill>
         <p:spPr>
           <a:xfrm>
-            <a:off x="1852612" y="2365228"/>
-            <a:ext cx="8486775" cy="3651259"/>
+            <a:off x="1966912" y="2365228"/>
+            <a:ext cx="8258175" cy="3692671"/>
           </a:xfrm>
           <a:prstGeom prst="rect">
             <a:avLst/>
@@ -16421,7 +16602,7 @@
     </p:spTree>
     <p:extLst>
       <p:ext uri="{BB962C8B-B14F-4D97-AF65-F5344CB8AC3E}">
-        <p14:creationId xmlns:p14="http://schemas.microsoft.com/office/powerpoint/2010/main" val="4015691864"/>
+        <p14:creationId xmlns:p14="http://schemas.microsoft.com/office/powerpoint/2010/main" val="1414748006"/>
       </p:ext>
     </p:extLst>
   </p:cSld>
@@ -16432,7 +16613,7 @@
     <mc:Choice Requires="p14">
       <p:transition spd="slow" p14:dur="2000"/>
     </mc:Choice>
-    <mc:Fallback xmlns="" xmlns:p15="http://schemas.microsoft.com/office/powerpoint/2012/main">
+    <mc:Fallback xmlns:p15="http://schemas.microsoft.com/office/powerpoint/2012/main" xmlns="">
       <p:transition spd="slow"/>
     </mc:Fallback>
   </mc:AlternateContent>
@@ -16610,14 +16791,14 @@
               <a:defRPr/>
             </a:pPr>
             <a:r>
-              <a:rPr lang="en-US" sz="2400" noProof="0" dirty="0" smtClean="0">
+              <a:rPr lang="en-US" sz="2400" dirty="0" smtClean="0">
                 <a:solidFill>
                   <a:prstClr val="white"/>
                 </a:solidFill>
                 <a:latin typeface="Times New Roman" panose="02020603050405020304" pitchFamily="18" charset="0"/>
                 <a:cs typeface="Times New Roman" panose="02020603050405020304" pitchFamily="18" charset="0"/>
               </a:rPr>
-              <a:t>Đặt hàng</a:t>
+              <a:t>Đăng kí nhận thông tin</a:t>
             </a:r>
             <a:endParaRPr kumimoji="0" lang="en-US" sz="2400" b="0" i="0" u="none" strike="noStrike" kern="1200" cap="none" spc="0" normalizeH="0" baseline="0" noProof="0" dirty="0">
               <a:ln>
@@ -16755,7 +16936,7 @@
       </p:sp>
       <p:pic>
         <p:nvPicPr>
-          <p:cNvPr id="5" name="Picture 4"/>
+          <p:cNvPr id="4" name="Picture 3"/>
           <p:cNvPicPr>
             <a:picLocks noChangeAspect="1"/>
           </p:cNvPicPr>
@@ -16769,8 +16950,8 @@
         </p:blipFill>
         <p:spPr>
           <a:xfrm>
-            <a:off x="2000250" y="2339420"/>
-            <a:ext cx="8191500" cy="3650563"/>
+            <a:off x="2471736" y="2242119"/>
+            <a:ext cx="7248525" cy="3734612"/>
           </a:xfrm>
           <a:prstGeom prst="rect">
             <a:avLst/>
@@ -16780,7 +16961,7 @@
     </p:spTree>
     <p:extLst>
       <p:ext uri="{BB962C8B-B14F-4D97-AF65-F5344CB8AC3E}">
-        <p14:creationId xmlns:p14="http://schemas.microsoft.com/office/powerpoint/2010/main" val="4124212329"/>
+        <p14:creationId xmlns:p14="http://schemas.microsoft.com/office/powerpoint/2010/main" val="811708155"/>
       </p:ext>
     </p:extLst>
   </p:cSld>
@@ -16791,7 +16972,7 @@
     <mc:Choice Requires="p14">
       <p:transition spd="slow" p14:dur="2000"/>
     </mc:Choice>
-    <mc:Fallback xmlns="" xmlns:p15="http://schemas.microsoft.com/office/powerpoint/2012/main">
+    <mc:Fallback xmlns:p15="http://schemas.microsoft.com/office/powerpoint/2012/main" xmlns="">
       <p:transition spd="slow"/>
     </mc:Fallback>
   </mc:AlternateContent>
@@ -16969,14 +17150,14 @@
               <a:defRPr/>
             </a:pPr>
             <a:r>
-              <a:rPr lang="en-US" sz="2400" dirty="0" smtClean="0">
+              <a:rPr lang="en-US" sz="2400" noProof="0" dirty="0" smtClean="0">
                 <a:solidFill>
                   <a:prstClr val="white"/>
                 </a:solidFill>
                 <a:latin typeface="Times New Roman" panose="02020603050405020304" pitchFamily="18" charset="0"/>
                 <a:cs typeface="Times New Roman" panose="02020603050405020304" pitchFamily="18" charset="0"/>
               </a:rPr>
-              <a:t>Quản lí danh mục</a:t>
+              <a:t>Đặt hàng</a:t>
             </a:r>
             <a:endParaRPr kumimoji="0" lang="en-US" sz="2400" b="0" i="0" u="none" strike="noStrike" kern="1200" cap="none" spc="0" normalizeH="0" baseline="0" noProof="0" dirty="0">
               <a:ln>
@@ -17117,7 +17298,7 @@
       </p:sp>
       <p:pic>
         <p:nvPicPr>
-          <p:cNvPr id="6" name="Picture 5"/>
+          <p:cNvPr id="4" name="Picture 3"/>
           <p:cNvPicPr>
             <a:picLocks noChangeAspect="1"/>
           </p:cNvPicPr>
@@ -17131,8 +17312,8 @@
         </p:blipFill>
         <p:spPr>
           <a:xfrm>
-            <a:off x="2009775" y="2399521"/>
-            <a:ext cx="8172450" cy="3630218"/>
+            <a:off x="1890712" y="2365229"/>
+            <a:ext cx="8410575" cy="3584997"/>
           </a:xfrm>
           <a:prstGeom prst="rect">
             <a:avLst/>
@@ -17142,7 +17323,7 @@
     </p:spTree>
     <p:extLst>
       <p:ext uri="{BB962C8B-B14F-4D97-AF65-F5344CB8AC3E}">
-        <p14:creationId xmlns:p14="http://schemas.microsoft.com/office/powerpoint/2010/main" val="3335344120"/>
+        <p14:creationId xmlns:p14="http://schemas.microsoft.com/office/powerpoint/2010/main" val="444798182"/>
       </p:ext>
     </p:extLst>
   </p:cSld>
@@ -17153,7 +17334,7 @@
     <mc:Choice Requires="p14">
       <p:transition spd="slow" p14:dur="2000"/>
     </mc:Choice>
-    <mc:Fallback xmlns="" xmlns:p15="http://schemas.microsoft.com/office/powerpoint/2012/main">
+    <mc:Fallback xmlns:p15="http://schemas.microsoft.com/office/powerpoint/2012/main" xmlns="">
       <p:transition spd="slow"/>
     </mc:Fallback>
   </mc:AlternateContent>
@@ -17331,14 +17512,14 @@
               <a:defRPr/>
             </a:pPr>
             <a:r>
-              <a:rPr lang="en-US" sz="2400" dirty="0" smtClean="0">
+              <a:rPr lang="en-US" sz="2400" noProof="0" dirty="0" smtClean="0">
                 <a:solidFill>
                   <a:prstClr val="white"/>
                 </a:solidFill>
                 <a:latin typeface="Times New Roman" panose="02020603050405020304" pitchFamily="18" charset="0"/>
                 <a:cs typeface="Times New Roman" panose="02020603050405020304" pitchFamily="18" charset="0"/>
               </a:rPr>
-              <a:t>Quản lí danh mục</a:t>
+              <a:t>Đặt hàng</a:t>
             </a:r>
             <a:endParaRPr kumimoji="0" lang="en-US" sz="2400" b="0" i="0" u="none" strike="noStrike" kern="1200" cap="none" spc="0" normalizeH="0" baseline="0" noProof="0" dirty="0">
               <a:ln>
@@ -17479,7 +17660,7 @@
       </p:sp>
       <p:pic>
         <p:nvPicPr>
-          <p:cNvPr id="4" name="Picture 3"/>
+          <p:cNvPr id="5" name="Picture 4"/>
           <p:cNvPicPr>
             <a:picLocks noChangeAspect="1"/>
           </p:cNvPicPr>
@@ -17493,8 +17674,8 @@
         </p:blipFill>
         <p:spPr>
           <a:xfrm>
-            <a:off x="2138362" y="2399522"/>
-            <a:ext cx="7915275" cy="3643470"/>
+            <a:off x="1852612" y="2365228"/>
+            <a:ext cx="8486775" cy="3651259"/>
           </a:xfrm>
           <a:prstGeom prst="rect">
             <a:avLst/>
@@ -17504,7 +17685,7 @@
     </p:spTree>
     <p:extLst>
       <p:ext uri="{BB962C8B-B14F-4D97-AF65-F5344CB8AC3E}">
-        <p14:creationId xmlns:p14="http://schemas.microsoft.com/office/powerpoint/2010/main" val="854064031"/>
+        <p14:creationId xmlns:p14="http://schemas.microsoft.com/office/powerpoint/2010/main" val="4015691864"/>
       </p:ext>
     </p:extLst>
   </p:cSld>
@@ -17515,7 +17696,7 @@
     <mc:Choice Requires="p14">
       <p:transition spd="slow" p14:dur="2000"/>
     </mc:Choice>
-    <mc:Fallback xmlns="" xmlns:p15="http://schemas.microsoft.com/office/powerpoint/2012/main">
+    <mc:Fallback xmlns:p15="http://schemas.microsoft.com/office/powerpoint/2012/main" xmlns="">
       <p:transition spd="slow"/>
     </mc:Fallback>
   </mc:AlternateContent>
@@ -17693,14 +17874,14 @@
               <a:defRPr/>
             </a:pPr>
             <a:r>
-              <a:rPr lang="en-US" sz="2400" dirty="0" smtClean="0">
+              <a:rPr lang="en-US" sz="2400" noProof="0" dirty="0" smtClean="0">
                 <a:solidFill>
                   <a:prstClr val="white"/>
                 </a:solidFill>
                 <a:latin typeface="Times New Roman" panose="02020603050405020304" pitchFamily="18" charset="0"/>
                 <a:cs typeface="Times New Roman" panose="02020603050405020304" pitchFamily="18" charset="0"/>
               </a:rPr>
-              <a:t>Quản lí danh mục</a:t>
+              <a:t>Đặt hàng</a:t>
             </a:r>
             <a:endParaRPr kumimoji="0" lang="en-US" sz="2400" b="0" i="0" u="none" strike="noStrike" kern="1200" cap="none" spc="0" normalizeH="0" baseline="0" noProof="0" dirty="0">
               <a:ln>
@@ -17727,7 +17908,7 @@
         <p:spPr>
           <a:xfrm>
             <a:off x="1405364" y="1903564"/>
-            <a:ext cx="2172723" cy="677108"/>
+            <a:ext cx="3961766" cy="677108"/>
           </a:xfrm>
           <a:prstGeom prst="rect">
             <a:avLst/>
@@ -17774,7 +17955,7 @@
               <a:t>- </a:t>
             </a:r>
             <a:r>
-              <a:rPr kumimoji="0" lang="en-US" sz="2000" b="0" i="0" u="none" strike="noStrike" kern="1200" cap="none" spc="0" normalizeH="0" baseline="0" noProof="0" dirty="0">
+              <a:rPr kumimoji="0" lang="en-US" sz="2000" b="0" i="0" u="none" strike="noStrike" kern="1200" cap="none" spc="0" normalizeH="0" baseline="0" noProof="0" dirty="0" smtClean="0">
                 <a:ln>
                   <a:noFill/>
                 </a:ln>
@@ -17787,24 +17968,21 @@
                 <a:latin typeface="Times New Roman" panose="02020603050405020304" pitchFamily="18" charset="0"/>
                 <a:cs typeface="Times New Roman" panose="02020603050405020304" pitchFamily="18" charset="0"/>
               </a:rPr>
-              <a:t>Biểu</a:t>
-            </a:r>
-            <a:r>
-              <a:rPr kumimoji="0" lang="en-US" sz="1800" b="0" i="0" u="none" strike="noStrike" kern="1200" cap="none" spc="0" normalizeH="0" baseline="0" noProof="0" dirty="0">
-                <a:ln>
-                  <a:noFill/>
-                </a:ln>
-                <a:solidFill>
-                  <a:prstClr val="white"/>
-                </a:solidFill>
-                <a:effectLst/>
-                <a:uLnTx/>
-                <a:uFillTx/>
-                <a:latin typeface="Times New Roman" panose="02020603050405020304" pitchFamily="18" charset="0"/>
-                <a:cs typeface="Times New Roman" panose="02020603050405020304" pitchFamily="18" charset="0"/>
-              </a:rPr>
-              <a:t> đồ trình tự</a:t>
-            </a:r>
+              <a:t>Biểu đồ lớp phân tích</a:t>
+            </a:r>
+            <a:endParaRPr kumimoji="0" lang="en-US" sz="1800" b="0" i="0" u="none" strike="noStrike" kern="1200" cap="none" spc="0" normalizeH="0" baseline="0" noProof="0" dirty="0">
+              <a:ln>
+                <a:noFill/>
+              </a:ln>
+              <a:solidFill>
+                <a:prstClr val="white"/>
+              </a:solidFill>
+              <a:effectLst/>
+              <a:uLnTx/>
+              <a:uFillTx/>
+              <a:latin typeface="Times New Roman" panose="02020603050405020304" pitchFamily="18" charset="0"/>
+              <a:cs typeface="Times New Roman" panose="02020603050405020304" pitchFamily="18" charset="0"/>
+            </a:endParaRPr>
           </a:p>
           <a:p>
             <a:pPr marL="0" marR="0" lvl="0" indent="0" algn="l" defTabSz="914400" rtl="0" eaLnBrk="1" fontAlgn="auto" latinLnBrk="0" hangingPunct="1">
@@ -17855,8 +18033,8 @@
         </p:blipFill>
         <p:spPr>
           <a:xfrm>
-            <a:off x="2166937" y="2365229"/>
-            <a:ext cx="7858125" cy="3658379"/>
+            <a:off x="2000250" y="2339420"/>
+            <a:ext cx="8191500" cy="3650563"/>
           </a:xfrm>
           <a:prstGeom prst="rect">
             <a:avLst/>
@@ -17866,7 +18044,7 @@
     </p:spTree>
     <p:extLst>
       <p:ext uri="{BB962C8B-B14F-4D97-AF65-F5344CB8AC3E}">
-        <p14:creationId xmlns:p14="http://schemas.microsoft.com/office/powerpoint/2010/main" val="494988987"/>
+        <p14:creationId xmlns:p14="http://schemas.microsoft.com/office/powerpoint/2010/main" val="4124212329"/>
       </p:ext>
     </p:extLst>
   </p:cSld>
@@ -17877,7 +18055,7 @@
     <mc:Choice Requires="p14">
       <p:transition spd="slow" p14:dur="2000"/>
     </mc:Choice>
-    <mc:Fallback xmlns="" xmlns:p15="http://schemas.microsoft.com/office/powerpoint/2012/main">
+    <mc:Fallback xmlns:p15="http://schemas.microsoft.com/office/powerpoint/2012/main" xmlns="">
       <p:transition spd="slow"/>
     </mc:Fallback>
   </mc:AlternateContent>
@@ -18203,7 +18381,7 @@
       </p:sp>
       <p:pic>
         <p:nvPicPr>
-          <p:cNvPr id="4" name="Picture 3"/>
+          <p:cNvPr id="6" name="Picture 5"/>
           <p:cNvPicPr>
             <a:picLocks noChangeAspect="1"/>
           </p:cNvPicPr>
@@ -18217,8 +18395,8 @@
         </p:blipFill>
         <p:spPr>
           <a:xfrm>
-            <a:off x="2233612" y="2399520"/>
-            <a:ext cx="7724775" cy="3601229"/>
+            <a:off x="2009775" y="2399521"/>
+            <a:ext cx="8172450" cy="3630218"/>
           </a:xfrm>
           <a:prstGeom prst="rect">
             <a:avLst/>
@@ -18228,7 +18406,7 @@
     </p:spTree>
     <p:extLst>
       <p:ext uri="{BB962C8B-B14F-4D97-AF65-F5344CB8AC3E}">
-        <p14:creationId xmlns:p14="http://schemas.microsoft.com/office/powerpoint/2010/main" val="1026856704"/>
+        <p14:creationId xmlns:p14="http://schemas.microsoft.com/office/powerpoint/2010/main" val="3335344120"/>
       </p:ext>
     </p:extLst>
   </p:cSld>
@@ -18239,7 +18417,7 @@
     <mc:Choice Requires="p14">
       <p:transition spd="slow" p14:dur="2000"/>
     </mc:Choice>
-    <mc:Fallback xmlns="" xmlns:p15="http://schemas.microsoft.com/office/powerpoint/2012/main">
+    <mc:Fallback xmlns:p15="http://schemas.microsoft.com/office/powerpoint/2012/main" xmlns="">
       <p:transition spd="slow"/>
     </mc:Fallback>
   </mc:AlternateContent>
@@ -18392,7 +18570,7 @@
     <mc:Choice Requires="p14">
       <p:transition spd="slow" p14:dur="2000"/>
     </mc:Choice>
-    <mc:Fallback xmlns="" xmlns:p15="http://schemas.microsoft.com/office/powerpoint/2012/main">
+    <mc:Fallback xmlns:p15="http://schemas.microsoft.com/office/powerpoint/2012/main" xmlns="">
       <p:transition spd="slow"/>
     </mc:Fallback>
   </mc:AlternateContent>
@@ -18570,36 +18748,14 @@
               <a:defRPr/>
             </a:pPr>
             <a:r>
-              <a:rPr kumimoji="0" lang="en-US" sz="2400" b="0" i="0" u="none" strike="noStrike" kern="1200" cap="none" spc="0" normalizeH="0" baseline="0" noProof="0" dirty="0" smtClean="0">
-                <a:ln>
-                  <a:noFill/>
-                </a:ln>
+              <a:rPr lang="en-US" sz="2400" dirty="0" smtClean="0">
                 <a:solidFill>
                   <a:prstClr val="white"/>
                 </a:solidFill>
-                <a:effectLst/>
-                <a:uLnTx/>
-                <a:uFillTx/>
                 <a:latin typeface="Times New Roman" panose="02020603050405020304" pitchFamily="18" charset="0"/>
                 <a:cs typeface="Times New Roman" panose="02020603050405020304" pitchFamily="18" charset="0"/>
               </a:rPr>
-              <a:t>Quản</a:t>
-            </a:r>
-            <a:r>
-              <a:rPr kumimoji="0" lang="en-US" sz="2400" b="0" i="0" u="none" strike="noStrike" kern="1200" cap="none" spc="0" normalizeH="0" noProof="0" dirty="0" smtClean="0">
-                <a:ln>
-                  <a:noFill/>
-                </a:ln>
-                <a:solidFill>
-                  <a:prstClr val="white"/>
-                </a:solidFill>
-                <a:effectLst/>
-                <a:uLnTx/>
-                <a:uFillTx/>
-                <a:latin typeface="Times New Roman" panose="02020603050405020304" pitchFamily="18" charset="0"/>
-                <a:cs typeface="Times New Roman" panose="02020603050405020304" pitchFamily="18" charset="0"/>
-              </a:rPr>
-              <a:t> lí danh mục</a:t>
+              <a:t>Quản lí danh mục</a:t>
             </a:r>
             <a:endParaRPr kumimoji="0" lang="en-US" sz="2400" b="0" i="0" u="none" strike="noStrike" kern="1200" cap="none" spc="0" normalizeH="0" baseline="0" noProof="0" dirty="0">
               <a:ln>
@@ -18626,7 +18782,7 @@
         <p:spPr>
           <a:xfrm>
             <a:off x="1405364" y="1903564"/>
-            <a:ext cx="3961766" cy="677108"/>
+            <a:ext cx="2172723" cy="677108"/>
           </a:xfrm>
           <a:prstGeom prst="rect">
             <a:avLst/>
@@ -18673,7 +18829,7 @@
               <a:t>- </a:t>
             </a:r>
             <a:r>
-              <a:rPr kumimoji="0" lang="en-US" sz="2000" b="0" i="0" u="none" strike="noStrike" kern="1200" cap="none" spc="0" normalizeH="0" baseline="0" noProof="0" dirty="0" smtClean="0">
+              <a:rPr kumimoji="0" lang="en-US" sz="2000" b="0" i="0" u="none" strike="noStrike" kern="1200" cap="none" spc="0" normalizeH="0" baseline="0" noProof="0" dirty="0">
                 <a:ln>
                   <a:noFill/>
                 </a:ln>
@@ -18686,21 +18842,24 @@
                 <a:latin typeface="Times New Roman" panose="02020603050405020304" pitchFamily="18" charset="0"/>
                 <a:cs typeface="Times New Roman" panose="02020603050405020304" pitchFamily="18" charset="0"/>
               </a:rPr>
-              <a:t>Biểu đồ lớp phân tích</a:t>
-            </a:r>
-            <a:endParaRPr kumimoji="0" lang="en-US" sz="1800" b="0" i="0" u="none" strike="noStrike" kern="1200" cap="none" spc="0" normalizeH="0" baseline="0" noProof="0" dirty="0">
-              <a:ln>
-                <a:noFill/>
-              </a:ln>
-              <a:solidFill>
-                <a:prstClr val="white"/>
-              </a:solidFill>
-              <a:effectLst/>
-              <a:uLnTx/>
-              <a:uFillTx/>
-              <a:latin typeface="Times New Roman" panose="02020603050405020304" pitchFamily="18" charset="0"/>
-              <a:cs typeface="Times New Roman" panose="02020603050405020304" pitchFamily="18" charset="0"/>
-            </a:endParaRPr>
+              <a:t>Biểu</a:t>
+            </a:r>
+            <a:r>
+              <a:rPr kumimoji="0" lang="en-US" sz="1800" b="0" i="0" u="none" strike="noStrike" kern="1200" cap="none" spc="0" normalizeH="0" baseline="0" noProof="0" dirty="0">
+                <a:ln>
+                  <a:noFill/>
+                </a:ln>
+                <a:solidFill>
+                  <a:prstClr val="white"/>
+                </a:solidFill>
+                <a:effectLst/>
+                <a:uLnTx/>
+                <a:uFillTx/>
+                <a:latin typeface="Times New Roman" panose="02020603050405020304" pitchFamily="18" charset="0"/>
+                <a:cs typeface="Times New Roman" panose="02020603050405020304" pitchFamily="18" charset="0"/>
+              </a:rPr>
+              <a:t> đồ trình tự</a:t>
+            </a:r>
           </a:p>
           <a:p>
             <a:pPr marL="0" marR="0" lvl="0" indent="0" algn="l" defTabSz="914400" rtl="0" eaLnBrk="1" fontAlgn="auto" latinLnBrk="0" hangingPunct="1">
@@ -18737,7 +18896,7 @@
       </p:sp>
       <p:pic>
         <p:nvPicPr>
-          <p:cNvPr id="6" name="Picture 5"/>
+          <p:cNvPr id="4" name="Picture 3"/>
           <p:cNvPicPr>
             <a:picLocks noChangeAspect="1"/>
           </p:cNvPicPr>
@@ -18751,8 +18910,8 @@
         </p:blipFill>
         <p:spPr>
           <a:xfrm>
-            <a:off x="2076449" y="2399521"/>
-            <a:ext cx="8039100" cy="3337480"/>
+            <a:off x="2138362" y="2399522"/>
+            <a:ext cx="7915275" cy="3643470"/>
           </a:xfrm>
           <a:prstGeom prst="rect">
             <a:avLst/>
@@ -18762,7 +18921,7 @@
     </p:spTree>
     <p:extLst>
       <p:ext uri="{BB962C8B-B14F-4D97-AF65-F5344CB8AC3E}">
-        <p14:creationId xmlns:p14="http://schemas.microsoft.com/office/powerpoint/2010/main" val="907120314"/>
+        <p14:creationId xmlns:p14="http://schemas.microsoft.com/office/powerpoint/2010/main" val="854064031"/>
       </p:ext>
     </p:extLst>
   </p:cSld>
@@ -18773,7 +18932,7 @@
     <mc:Choice Requires="p14">
       <p:transition spd="slow" p14:dur="2000"/>
     </mc:Choice>
-    <mc:Fallback xmlns="" xmlns:p15="http://schemas.microsoft.com/office/powerpoint/2012/main">
+    <mc:Fallback xmlns:p15="http://schemas.microsoft.com/office/powerpoint/2012/main" xmlns="">
       <p:transition spd="slow"/>
     </mc:Fallback>
   </mc:AlternateContent>
@@ -18958,7 +19117,7 @@
                 <a:latin typeface="Times New Roman" panose="02020603050405020304" pitchFamily="18" charset="0"/>
                 <a:cs typeface="Times New Roman" panose="02020603050405020304" pitchFamily="18" charset="0"/>
               </a:rPr>
-              <a:t>Quản lí sản phẩm</a:t>
+              <a:t>Quản lí danh mục</a:t>
             </a:r>
             <a:endParaRPr kumimoji="0" lang="en-US" sz="2400" b="0" i="0" u="none" strike="noStrike" kern="1200" cap="none" spc="0" normalizeH="0" baseline="0" noProof="0" dirty="0">
               <a:ln>
@@ -19113,8 +19272,8 @@
         </p:blipFill>
         <p:spPr>
           <a:xfrm>
-            <a:off x="2090737" y="2399520"/>
-            <a:ext cx="8010525" cy="3630219"/>
+            <a:off x="2166937" y="2365229"/>
+            <a:ext cx="7858125" cy="3658379"/>
           </a:xfrm>
           <a:prstGeom prst="rect">
             <a:avLst/>
@@ -19124,7 +19283,7 @@
     </p:spTree>
     <p:extLst>
       <p:ext uri="{BB962C8B-B14F-4D97-AF65-F5344CB8AC3E}">
-        <p14:creationId xmlns:p14="http://schemas.microsoft.com/office/powerpoint/2010/main" val="3303188778"/>
+        <p14:creationId xmlns:p14="http://schemas.microsoft.com/office/powerpoint/2010/main" val="494988987"/>
       </p:ext>
     </p:extLst>
   </p:cSld>
@@ -19135,7 +19294,7 @@
     <mc:Choice Requires="p14">
       <p:transition spd="slow" p14:dur="2000"/>
     </mc:Choice>
-    <mc:Fallback xmlns="" xmlns:p15="http://schemas.microsoft.com/office/powerpoint/2012/main">
+    <mc:Fallback xmlns:p15="http://schemas.microsoft.com/office/powerpoint/2012/main" xmlns="">
       <p:transition spd="slow"/>
     </mc:Fallback>
   </mc:AlternateContent>
@@ -19320,7 +19479,7 @@
                 <a:latin typeface="Times New Roman" panose="02020603050405020304" pitchFamily="18" charset="0"/>
                 <a:cs typeface="Times New Roman" panose="02020603050405020304" pitchFamily="18" charset="0"/>
               </a:rPr>
-              <a:t>Quản lí sản phẩm</a:t>
+              <a:t>Quản lí danh mục</a:t>
             </a:r>
             <a:endParaRPr kumimoji="0" lang="en-US" sz="2400" b="0" i="0" u="none" strike="noStrike" kern="1200" cap="none" spc="0" normalizeH="0" baseline="0" noProof="0" dirty="0">
               <a:ln>
@@ -19475,8 +19634,8 @@
         </p:blipFill>
         <p:spPr>
           <a:xfrm>
-            <a:off x="2085975" y="2266122"/>
-            <a:ext cx="8020050" cy="3723861"/>
+            <a:off x="2233612" y="2399520"/>
+            <a:ext cx="7724775" cy="3601229"/>
           </a:xfrm>
           <a:prstGeom prst="rect">
             <a:avLst/>
@@ -19486,7 +19645,7 @@
     </p:spTree>
     <p:extLst>
       <p:ext uri="{BB962C8B-B14F-4D97-AF65-F5344CB8AC3E}">
-        <p14:creationId xmlns:p14="http://schemas.microsoft.com/office/powerpoint/2010/main" val="2940633202"/>
+        <p14:creationId xmlns:p14="http://schemas.microsoft.com/office/powerpoint/2010/main" val="1026856704"/>
       </p:ext>
     </p:extLst>
   </p:cSld>
@@ -19497,7 +19656,7 @@
     <mc:Choice Requires="p14">
       <p:transition spd="slow" p14:dur="2000"/>
     </mc:Choice>
-    <mc:Fallback xmlns="" xmlns:p15="http://schemas.microsoft.com/office/powerpoint/2012/main">
+    <mc:Fallback xmlns:p15="http://schemas.microsoft.com/office/powerpoint/2012/main" xmlns="">
       <p:transition spd="slow"/>
     </mc:Fallback>
   </mc:AlternateContent>
@@ -19675,14 +19834,36 @@
               <a:defRPr/>
             </a:pPr>
             <a:r>
-              <a:rPr lang="en-US" sz="2400" dirty="0" smtClean="0">
+              <a:rPr kumimoji="0" lang="en-US" sz="2400" b="0" i="0" u="none" strike="noStrike" kern="1200" cap="none" spc="0" normalizeH="0" baseline="0" noProof="0" dirty="0" smtClean="0">
+                <a:ln>
+                  <a:noFill/>
+                </a:ln>
                 <a:solidFill>
                   <a:prstClr val="white"/>
                 </a:solidFill>
+                <a:effectLst/>
+                <a:uLnTx/>
+                <a:uFillTx/>
                 <a:latin typeface="Times New Roman" panose="02020603050405020304" pitchFamily="18" charset="0"/>
                 <a:cs typeface="Times New Roman" panose="02020603050405020304" pitchFamily="18" charset="0"/>
               </a:rPr>
-              <a:t>Quản lí sản phẩm</a:t>
+              <a:t>Quản</a:t>
+            </a:r>
+            <a:r>
+              <a:rPr kumimoji="0" lang="en-US" sz="2400" b="0" i="0" u="none" strike="noStrike" kern="1200" cap="none" spc="0" normalizeH="0" noProof="0" dirty="0" smtClean="0">
+                <a:ln>
+                  <a:noFill/>
+                </a:ln>
+                <a:solidFill>
+                  <a:prstClr val="white"/>
+                </a:solidFill>
+                <a:effectLst/>
+                <a:uLnTx/>
+                <a:uFillTx/>
+                <a:latin typeface="Times New Roman" panose="02020603050405020304" pitchFamily="18" charset="0"/>
+                <a:cs typeface="Times New Roman" panose="02020603050405020304" pitchFamily="18" charset="0"/>
+              </a:rPr>
+              <a:t> lí danh mục</a:t>
             </a:r>
             <a:endParaRPr kumimoji="0" lang="en-US" sz="2400" b="0" i="0" u="none" strike="noStrike" kern="1200" cap="none" spc="0" normalizeH="0" baseline="0" noProof="0" dirty="0">
               <a:ln>
@@ -19709,7 +19890,7 @@
         <p:spPr>
           <a:xfrm>
             <a:off x="1405364" y="1903564"/>
-            <a:ext cx="2172723" cy="677108"/>
+            <a:ext cx="3961766" cy="677108"/>
           </a:xfrm>
           <a:prstGeom prst="rect">
             <a:avLst/>
@@ -19756,7 +19937,7 @@
               <a:t>- </a:t>
             </a:r>
             <a:r>
-              <a:rPr kumimoji="0" lang="en-US" sz="2000" b="0" i="0" u="none" strike="noStrike" kern="1200" cap="none" spc="0" normalizeH="0" baseline="0" noProof="0" dirty="0">
+              <a:rPr kumimoji="0" lang="en-US" sz="2000" b="0" i="0" u="none" strike="noStrike" kern="1200" cap="none" spc="0" normalizeH="0" baseline="0" noProof="0" dirty="0" smtClean="0">
                 <a:ln>
                   <a:noFill/>
                 </a:ln>
@@ -19769,24 +19950,21 @@
                 <a:latin typeface="Times New Roman" panose="02020603050405020304" pitchFamily="18" charset="0"/>
                 <a:cs typeface="Times New Roman" panose="02020603050405020304" pitchFamily="18" charset="0"/>
               </a:rPr>
-              <a:t>Biểu</a:t>
-            </a:r>
-            <a:r>
-              <a:rPr kumimoji="0" lang="en-US" sz="1800" b="0" i="0" u="none" strike="noStrike" kern="1200" cap="none" spc="0" normalizeH="0" baseline="0" noProof="0" dirty="0">
-                <a:ln>
-                  <a:noFill/>
-                </a:ln>
-                <a:solidFill>
-                  <a:prstClr val="white"/>
-                </a:solidFill>
-                <a:effectLst/>
-                <a:uLnTx/>
-                <a:uFillTx/>
-                <a:latin typeface="Times New Roman" panose="02020603050405020304" pitchFamily="18" charset="0"/>
-                <a:cs typeface="Times New Roman" panose="02020603050405020304" pitchFamily="18" charset="0"/>
-              </a:rPr>
-              <a:t> đồ trình tự</a:t>
-            </a:r>
+              <a:t>Biểu đồ lớp phân tích</a:t>
+            </a:r>
+            <a:endParaRPr kumimoji="0" lang="en-US" sz="1800" b="0" i="0" u="none" strike="noStrike" kern="1200" cap="none" spc="0" normalizeH="0" baseline="0" noProof="0" dirty="0">
+              <a:ln>
+                <a:noFill/>
+              </a:ln>
+              <a:solidFill>
+                <a:prstClr val="white"/>
+              </a:solidFill>
+              <a:effectLst/>
+              <a:uLnTx/>
+              <a:uFillTx/>
+              <a:latin typeface="Times New Roman" panose="02020603050405020304" pitchFamily="18" charset="0"/>
+              <a:cs typeface="Times New Roman" panose="02020603050405020304" pitchFamily="18" charset="0"/>
+            </a:endParaRPr>
           </a:p>
           <a:p>
             <a:pPr marL="0" marR="0" lvl="0" indent="0" algn="l" defTabSz="914400" rtl="0" eaLnBrk="1" fontAlgn="auto" latinLnBrk="0" hangingPunct="1">
@@ -19823,7 +20001,7 @@
       </p:sp>
       <p:pic>
         <p:nvPicPr>
-          <p:cNvPr id="5" name="Picture 4"/>
+          <p:cNvPr id="6" name="Picture 5"/>
           <p:cNvPicPr>
             <a:picLocks noChangeAspect="1"/>
           </p:cNvPicPr>
@@ -19837,8 +20015,8 @@
         </p:blipFill>
         <p:spPr>
           <a:xfrm>
-            <a:off x="2024062" y="2266122"/>
-            <a:ext cx="8143875" cy="3776869"/>
+            <a:off x="2076449" y="2399521"/>
+            <a:ext cx="8039100" cy="3337480"/>
           </a:xfrm>
           <a:prstGeom prst="rect">
             <a:avLst/>
@@ -19848,7 +20026,7 @@
     </p:spTree>
     <p:extLst>
       <p:ext uri="{BB962C8B-B14F-4D97-AF65-F5344CB8AC3E}">
-        <p14:creationId xmlns:p14="http://schemas.microsoft.com/office/powerpoint/2010/main" val="1861906476"/>
+        <p14:creationId xmlns:p14="http://schemas.microsoft.com/office/powerpoint/2010/main" val="907120314"/>
       </p:ext>
     </p:extLst>
   </p:cSld>
@@ -19859,7 +20037,7 @@
     <mc:Choice Requires="p14">
       <p:transition spd="slow" p14:dur="2000"/>
     </mc:Choice>
-    <mc:Fallback xmlns="" xmlns:p15="http://schemas.microsoft.com/office/powerpoint/2012/main">
+    <mc:Fallback xmlns:p15="http://schemas.microsoft.com/office/powerpoint/2012/main" xmlns="">
       <p:transition spd="slow"/>
     </mc:Fallback>
   </mc:AlternateContent>
@@ -20185,7 +20363,7 @@
       </p:sp>
       <p:pic>
         <p:nvPicPr>
-          <p:cNvPr id="4" name="Picture 3"/>
+          <p:cNvPr id="5" name="Picture 4"/>
           <p:cNvPicPr>
             <a:picLocks noChangeAspect="1"/>
           </p:cNvPicPr>
@@ -20199,8 +20377,8 @@
         </p:blipFill>
         <p:spPr>
           <a:xfrm>
-            <a:off x="2024061" y="2365228"/>
-            <a:ext cx="8143875" cy="3624755"/>
+            <a:off x="2090737" y="2399520"/>
+            <a:ext cx="8010525" cy="3630219"/>
           </a:xfrm>
           <a:prstGeom prst="rect">
             <a:avLst/>
@@ -20210,7 +20388,7 @@
     </p:spTree>
     <p:extLst>
       <p:ext uri="{BB962C8B-B14F-4D97-AF65-F5344CB8AC3E}">
-        <p14:creationId xmlns:p14="http://schemas.microsoft.com/office/powerpoint/2010/main" val="3122472411"/>
+        <p14:creationId xmlns:p14="http://schemas.microsoft.com/office/powerpoint/2010/main" val="3303188778"/>
       </p:ext>
     </p:extLst>
   </p:cSld>
@@ -20221,7 +20399,7 @@
     <mc:Choice Requires="p14">
       <p:transition spd="slow" p14:dur="2000"/>
     </mc:Choice>
-    <mc:Fallback xmlns="" xmlns:p15="http://schemas.microsoft.com/office/powerpoint/2012/main">
+    <mc:Fallback xmlns:p15="http://schemas.microsoft.com/office/powerpoint/2012/main" xmlns="">
       <p:transition spd="slow"/>
     </mc:Fallback>
   </mc:AlternateContent>
@@ -20399,36 +20577,14 @@
               <a:defRPr/>
             </a:pPr>
             <a:r>
-              <a:rPr kumimoji="0" lang="en-US" sz="2400" b="0" i="0" u="none" strike="noStrike" kern="1200" cap="none" spc="0" normalizeH="0" baseline="0" noProof="0" dirty="0" smtClean="0">
-                <a:ln>
-                  <a:noFill/>
-                </a:ln>
+              <a:rPr lang="en-US" sz="2400" dirty="0" smtClean="0">
                 <a:solidFill>
                   <a:prstClr val="white"/>
                 </a:solidFill>
-                <a:effectLst/>
-                <a:uLnTx/>
-                <a:uFillTx/>
                 <a:latin typeface="Times New Roman" panose="02020603050405020304" pitchFamily="18" charset="0"/>
                 <a:cs typeface="Times New Roman" panose="02020603050405020304" pitchFamily="18" charset="0"/>
               </a:rPr>
-              <a:t>Quản</a:t>
-            </a:r>
-            <a:r>
-              <a:rPr kumimoji="0" lang="en-US" sz="2400" b="0" i="0" u="none" strike="noStrike" kern="1200" cap="none" spc="0" normalizeH="0" noProof="0" dirty="0" smtClean="0">
-                <a:ln>
-                  <a:noFill/>
-                </a:ln>
-                <a:solidFill>
-                  <a:prstClr val="white"/>
-                </a:solidFill>
-                <a:effectLst/>
-                <a:uLnTx/>
-                <a:uFillTx/>
-                <a:latin typeface="Times New Roman" panose="02020603050405020304" pitchFamily="18" charset="0"/>
-                <a:cs typeface="Times New Roman" panose="02020603050405020304" pitchFamily="18" charset="0"/>
-              </a:rPr>
-              <a:t> lí sản phẩm</a:t>
+              <a:t>Quản lí sản phẩm</a:t>
             </a:r>
             <a:endParaRPr kumimoji="0" lang="en-US" sz="2400" b="0" i="0" u="none" strike="noStrike" kern="1200" cap="none" spc="0" normalizeH="0" baseline="0" noProof="0" dirty="0">
               <a:ln>
@@ -20455,7 +20611,7 @@
         <p:spPr>
           <a:xfrm>
             <a:off x="1405364" y="1903564"/>
-            <a:ext cx="3961766" cy="677108"/>
+            <a:ext cx="2172723" cy="677108"/>
           </a:xfrm>
           <a:prstGeom prst="rect">
             <a:avLst/>
@@ -20502,7 +20658,7 @@
               <a:t>- </a:t>
             </a:r>
             <a:r>
-              <a:rPr kumimoji="0" lang="en-US" sz="2000" b="0" i="0" u="none" strike="noStrike" kern="1200" cap="none" spc="0" normalizeH="0" baseline="0" noProof="0" dirty="0" smtClean="0">
+              <a:rPr kumimoji="0" lang="en-US" sz="2000" b="0" i="0" u="none" strike="noStrike" kern="1200" cap="none" spc="0" normalizeH="0" baseline="0" noProof="0" dirty="0">
                 <a:ln>
                   <a:noFill/>
                 </a:ln>
@@ -20515,21 +20671,24 @@
                 <a:latin typeface="Times New Roman" panose="02020603050405020304" pitchFamily="18" charset="0"/>
                 <a:cs typeface="Times New Roman" panose="02020603050405020304" pitchFamily="18" charset="0"/>
               </a:rPr>
-              <a:t>Biểu đồ lớp phân tích</a:t>
-            </a:r>
-            <a:endParaRPr kumimoji="0" lang="en-US" sz="1800" b="0" i="0" u="none" strike="noStrike" kern="1200" cap="none" spc="0" normalizeH="0" baseline="0" noProof="0" dirty="0">
-              <a:ln>
-                <a:noFill/>
-              </a:ln>
-              <a:solidFill>
-                <a:prstClr val="white"/>
-              </a:solidFill>
-              <a:effectLst/>
-              <a:uLnTx/>
-              <a:uFillTx/>
-              <a:latin typeface="Times New Roman" panose="02020603050405020304" pitchFamily="18" charset="0"/>
-              <a:cs typeface="Times New Roman" panose="02020603050405020304" pitchFamily="18" charset="0"/>
-            </a:endParaRPr>
+              <a:t>Biểu</a:t>
+            </a:r>
+            <a:r>
+              <a:rPr kumimoji="0" lang="en-US" sz="1800" b="0" i="0" u="none" strike="noStrike" kern="1200" cap="none" spc="0" normalizeH="0" baseline="0" noProof="0" dirty="0">
+                <a:ln>
+                  <a:noFill/>
+                </a:ln>
+                <a:solidFill>
+                  <a:prstClr val="white"/>
+                </a:solidFill>
+                <a:effectLst/>
+                <a:uLnTx/>
+                <a:uFillTx/>
+                <a:latin typeface="Times New Roman" panose="02020603050405020304" pitchFamily="18" charset="0"/>
+                <a:cs typeface="Times New Roman" panose="02020603050405020304" pitchFamily="18" charset="0"/>
+              </a:rPr>
+              <a:t> đồ trình tự</a:t>
+            </a:r>
           </a:p>
           <a:p>
             <a:pPr marL="0" marR="0" lvl="0" indent="0" algn="l" defTabSz="914400" rtl="0" eaLnBrk="1" fontAlgn="auto" latinLnBrk="0" hangingPunct="1">
@@ -20566,7 +20725,7 @@
       </p:sp>
       <p:pic>
         <p:nvPicPr>
-          <p:cNvPr id="5" name="Picture 4"/>
+          <p:cNvPr id="4" name="Picture 3"/>
           <p:cNvPicPr>
             <a:picLocks noChangeAspect="1"/>
           </p:cNvPicPr>
@@ -20580,8 +20739,8 @@
         </p:blipFill>
         <p:spPr>
           <a:xfrm>
-            <a:off x="2238375" y="2399520"/>
-            <a:ext cx="7715250" cy="3544079"/>
+            <a:off x="2085975" y="2266122"/>
+            <a:ext cx="8020050" cy="3723861"/>
           </a:xfrm>
           <a:prstGeom prst="rect">
             <a:avLst/>
@@ -20591,7 +20750,7 @@
     </p:spTree>
     <p:extLst>
       <p:ext uri="{BB962C8B-B14F-4D97-AF65-F5344CB8AC3E}">
-        <p14:creationId xmlns:p14="http://schemas.microsoft.com/office/powerpoint/2010/main" val="1130965102"/>
+        <p14:creationId xmlns:p14="http://schemas.microsoft.com/office/powerpoint/2010/main" val="2940633202"/>
       </p:ext>
     </p:extLst>
   </p:cSld>
@@ -20602,7 +20761,7 @@
     <mc:Choice Requires="p14">
       <p:transition spd="slow" p14:dur="2000"/>
     </mc:Choice>
-    <mc:Fallback xmlns="" xmlns:p15="http://schemas.microsoft.com/office/powerpoint/2012/main">
+    <mc:Fallback xmlns:p15="http://schemas.microsoft.com/office/powerpoint/2012/main" xmlns="">
       <p:transition spd="slow"/>
     </mc:Fallback>
   </mc:AlternateContent>
@@ -20787,7 +20946,7 @@
                 <a:latin typeface="Times New Roman" panose="02020603050405020304" pitchFamily="18" charset="0"/>
                 <a:cs typeface="Times New Roman" panose="02020603050405020304" pitchFamily="18" charset="0"/>
               </a:rPr>
-              <a:t>Quản lí đặt hàng</a:t>
+              <a:t>Quản lí sản phẩm</a:t>
             </a:r>
             <a:endParaRPr kumimoji="0" lang="en-US" sz="2400" b="0" i="0" u="none" strike="noStrike" kern="1200" cap="none" spc="0" normalizeH="0" baseline="0" noProof="0" dirty="0">
               <a:ln>
@@ -20942,8 +21101,8 @@
         </p:blipFill>
         <p:spPr>
           <a:xfrm>
-            <a:off x="1943100" y="2399520"/>
-            <a:ext cx="8305800" cy="3643471"/>
+            <a:off x="2024062" y="2266122"/>
+            <a:ext cx="8143875" cy="3776869"/>
           </a:xfrm>
           <a:prstGeom prst="rect">
             <a:avLst/>
@@ -20953,7 +21112,7 @@
     </p:spTree>
     <p:extLst>
       <p:ext uri="{BB962C8B-B14F-4D97-AF65-F5344CB8AC3E}">
-        <p14:creationId xmlns:p14="http://schemas.microsoft.com/office/powerpoint/2010/main" val="982424855"/>
+        <p14:creationId xmlns:p14="http://schemas.microsoft.com/office/powerpoint/2010/main" val="1861906476"/>
       </p:ext>
     </p:extLst>
   </p:cSld>
@@ -20964,7 +21123,7 @@
     <mc:Choice Requires="p14">
       <p:transition spd="slow" p14:dur="2000"/>
     </mc:Choice>
-    <mc:Fallback xmlns="" xmlns:p15="http://schemas.microsoft.com/office/powerpoint/2012/main">
+    <mc:Fallback xmlns:p15="http://schemas.microsoft.com/office/powerpoint/2012/main" xmlns="">
       <p:transition spd="slow"/>
     </mc:Fallback>
   </mc:AlternateContent>
@@ -21149,7 +21308,7 @@
                 <a:latin typeface="Times New Roman" panose="02020603050405020304" pitchFamily="18" charset="0"/>
                 <a:cs typeface="Times New Roman" panose="02020603050405020304" pitchFamily="18" charset="0"/>
               </a:rPr>
-              <a:t>Quản lí đặt hàng</a:t>
+              <a:t>Quản lí sản phẩm</a:t>
             </a:r>
             <a:endParaRPr kumimoji="0" lang="en-US" sz="2400" b="0" i="0" u="none" strike="noStrike" kern="1200" cap="none" spc="0" normalizeH="0" baseline="0" noProof="0" dirty="0">
               <a:ln>
@@ -21304,8 +21463,8 @@
         </p:blipFill>
         <p:spPr>
           <a:xfrm>
-            <a:off x="1919287" y="2399521"/>
-            <a:ext cx="8353425" cy="3616966"/>
+            <a:off x="2024061" y="2365228"/>
+            <a:ext cx="8143875" cy="3624755"/>
           </a:xfrm>
           <a:prstGeom prst="rect">
             <a:avLst/>
@@ -21315,7 +21474,7 @@
     </p:spTree>
     <p:extLst>
       <p:ext uri="{BB962C8B-B14F-4D97-AF65-F5344CB8AC3E}">
-        <p14:creationId xmlns:p14="http://schemas.microsoft.com/office/powerpoint/2010/main" val="1714840472"/>
+        <p14:creationId xmlns:p14="http://schemas.microsoft.com/office/powerpoint/2010/main" val="3122472411"/>
       </p:ext>
     </p:extLst>
   </p:cSld>
@@ -21326,7 +21485,7 @@
     <mc:Choice Requires="p14">
       <p:transition spd="slow" p14:dur="2000"/>
     </mc:Choice>
-    <mc:Fallback xmlns="" xmlns:p15="http://schemas.microsoft.com/office/powerpoint/2012/main">
+    <mc:Fallback xmlns:p15="http://schemas.microsoft.com/office/powerpoint/2012/main" xmlns="">
       <p:transition spd="slow"/>
     </mc:Fallback>
   </mc:AlternateContent>
@@ -21504,14 +21663,36 @@
               <a:defRPr/>
             </a:pPr>
             <a:r>
-              <a:rPr lang="en-US" sz="2400" dirty="0" smtClean="0">
+              <a:rPr kumimoji="0" lang="en-US" sz="2400" b="0" i="0" u="none" strike="noStrike" kern="1200" cap="none" spc="0" normalizeH="0" baseline="0" noProof="0" dirty="0" smtClean="0">
+                <a:ln>
+                  <a:noFill/>
+                </a:ln>
                 <a:solidFill>
                   <a:prstClr val="white"/>
                 </a:solidFill>
+                <a:effectLst/>
+                <a:uLnTx/>
+                <a:uFillTx/>
                 <a:latin typeface="Times New Roman" panose="02020603050405020304" pitchFamily="18" charset="0"/>
                 <a:cs typeface="Times New Roman" panose="02020603050405020304" pitchFamily="18" charset="0"/>
               </a:rPr>
-              <a:t>Quản lí đặt hàng</a:t>
+              <a:t>Quản</a:t>
+            </a:r>
+            <a:r>
+              <a:rPr kumimoji="0" lang="en-US" sz="2400" b="0" i="0" u="none" strike="noStrike" kern="1200" cap="none" spc="0" normalizeH="0" noProof="0" dirty="0" smtClean="0">
+                <a:ln>
+                  <a:noFill/>
+                </a:ln>
+                <a:solidFill>
+                  <a:prstClr val="white"/>
+                </a:solidFill>
+                <a:effectLst/>
+                <a:uLnTx/>
+                <a:uFillTx/>
+                <a:latin typeface="Times New Roman" panose="02020603050405020304" pitchFamily="18" charset="0"/>
+                <a:cs typeface="Times New Roman" panose="02020603050405020304" pitchFamily="18" charset="0"/>
+              </a:rPr>
+              <a:t> lí sản phẩm</a:t>
             </a:r>
             <a:endParaRPr kumimoji="0" lang="en-US" sz="2400" b="0" i="0" u="none" strike="noStrike" kern="1200" cap="none" spc="0" normalizeH="0" baseline="0" noProof="0" dirty="0">
               <a:ln>
@@ -21538,7 +21719,7 @@
         <p:spPr>
           <a:xfrm>
             <a:off x="1405364" y="1903564"/>
-            <a:ext cx="2172723" cy="677108"/>
+            <a:ext cx="3961766" cy="677108"/>
           </a:xfrm>
           <a:prstGeom prst="rect">
             <a:avLst/>
@@ -21585,7 +21766,7 @@
               <a:t>- </a:t>
             </a:r>
             <a:r>
-              <a:rPr kumimoji="0" lang="en-US" sz="2000" b="0" i="0" u="none" strike="noStrike" kern="1200" cap="none" spc="0" normalizeH="0" baseline="0" noProof="0" dirty="0">
+              <a:rPr kumimoji="0" lang="en-US" sz="2000" b="0" i="0" u="none" strike="noStrike" kern="1200" cap="none" spc="0" normalizeH="0" baseline="0" noProof="0" dirty="0" smtClean="0">
                 <a:ln>
                   <a:noFill/>
                 </a:ln>
@@ -21598,24 +21779,21 @@
                 <a:latin typeface="Times New Roman" panose="02020603050405020304" pitchFamily="18" charset="0"/>
                 <a:cs typeface="Times New Roman" panose="02020603050405020304" pitchFamily="18" charset="0"/>
               </a:rPr>
-              <a:t>Biểu</a:t>
-            </a:r>
-            <a:r>
-              <a:rPr kumimoji="0" lang="en-US" sz="1800" b="0" i="0" u="none" strike="noStrike" kern="1200" cap="none" spc="0" normalizeH="0" baseline="0" noProof="0" dirty="0">
-                <a:ln>
-                  <a:noFill/>
-                </a:ln>
-                <a:solidFill>
-                  <a:prstClr val="white"/>
-                </a:solidFill>
-                <a:effectLst/>
-                <a:uLnTx/>
-                <a:uFillTx/>
-                <a:latin typeface="Times New Roman" panose="02020603050405020304" pitchFamily="18" charset="0"/>
-                <a:cs typeface="Times New Roman" panose="02020603050405020304" pitchFamily="18" charset="0"/>
-              </a:rPr>
-              <a:t> đồ trình tự</a:t>
-            </a:r>
+              <a:t>Biểu đồ lớp phân tích</a:t>
+            </a:r>
+            <a:endParaRPr kumimoji="0" lang="en-US" sz="1800" b="0" i="0" u="none" strike="noStrike" kern="1200" cap="none" spc="0" normalizeH="0" baseline="0" noProof="0" dirty="0">
+              <a:ln>
+                <a:noFill/>
+              </a:ln>
+              <a:solidFill>
+                <a:prstClr val="white"/>
+              </a:solidFill>
+              <a:effectLst/>
+              <a:uLnTx/>
+              <a:uFillTx/>
+              <a:latin typeface="Times New Roman" panose="02020603050405020304" pitchFamily="18" charset="0"/>
+              <a:cs typeface="Times New Roman" panose="02020603050405020304" pitchFamily="18" charset="0"/>
+            </a:endParaRPr>
           </a:p>
           <a:p>
             <a:pPr marL="0" marR="0" lvl="0" indent="0" algn="l" defTabSz="914400" rtl="0" eaLnBrk="1" fontAlgn="auto" latinLnBrk="0" hangingPunct="1">
@@ -21666,8 +21844,8 @@
         </p:blipFill>
         <p:spPr>
           <a:xfrm>
-            <a:off x="1843087" y="2399521"/>
-            <a:ext cx="8505825" cy="3563958"/>
+            <a:off x="2238375" y="2399520"/>
+            <a:ext cx="7715250" cy="3544079"/>
           </a:xfrm>
           <a:prstGeom prst="rect">
             <a:avLst/>
@@ -21677,7 +21855,7 @@
     </p:spTree>
     <p:extLst>
       <p:ext uri="{BB962C8B-B14F-4D97-AF65-F5344CB8AC3E}">
-        <p14:creationId xmlns:p14="http://schemas.microsoft.com/office/powerpoint/2010/main" val="4291451881"/>
+        <p14:creationId xmlns:p14="http://schemas.microsoft.com/office/powerpoint/2010/main" val="1130965102"/>
       </p:ext>
     </p:extLst>
   </p:cSld>
@@ -21688,7 +21866,7 @@
     <mc:Choice Requires="p14">
       <p:transition spd="slow" p14:dur="2000"/>
     </mc:Choice>
-    <mc:Fallback xmlns="" xmlns:p15="http://schemas.microsoft.com/office/powerpoint/2012/main">
+    <mc:Fallback xmlns:p15="http://schemas.microsoft.com/office/powerpoint/2012/main" xmlns="">
       <p:transition spd="slow"/>
     </mc:Fallback>
   </mc:AlternateContent>
@@ -21866,36 +22044,14 @@
               <a:defRPr/>
             </a:pPr>
             <a:r>
-              <a:rPr kumimoji="0" lang="en-US" sz="2400" b="0" i="0" u="none" strike="noStrike" kern="1200" cap="none" spc="0" normalizeH="0" baseline="0" noProof="0" dirty="0" smtClean="0">
-                <a:ln>
-                  <a:noFill/>
-                </a:ln>
+              <a:rPr lang="en-US" sz="2400" dirty="0" smtClean="0">
                 <a:solidFill>
                   <a:prstClr val="white"/>
                 </a:solidFill>
-                <a:effectLst/>
-                <a:uLnTx/>
-                <a:uFillTx/>
                 <a:latin typeface="Times New Roman" panose="02020603050405020304" pitchFamily="18" charset="0"/>
                 <a:cs typeface="Times New Roman" panose="02020603050405020304" pitchFamily="18" charset="0"/>
               </a:rPr>
-              <a:t>Quản</a:t>
-            </a:r>
-            <a:r>
-              <a:rPr kumimoji="0" lang="en-US" sz="2400" b="0" i="0" u="none" strike="noStrike" kern="1200" cap="none" spc="0" normalizeH="0" noProof="0" dirty="0" smtClean="0">
-                <a:ln>
-                  <a:noFill/>
-                </a:ln>
-                <a:solidFill>
-                  <a:prstClr val="white"/>
-                </a:solidFill>
-                <a:effectLst/>
-                <a:uLnTx/>
-                <a:uFillTx/>
-                <a:latin typeface="Times New Roman" panose="02020603050405020304" pitchFamily="18" charset="0"/>
-                <a:cs typeface="Times New Roman" panose="02020603050405020304" pitchFamily="18" charset="0"/>
-              </a:rPr>
-              <a:t> lí đặt hàng</a:t>
+              <a:t>Quản lí đặt hàng</a:t>
             </a:r>
             <a:endParaRPr kumimoji="0" lang="en-US" sz="2400" b="0" i="0" u="none" strike="noStrike" kern="1200" cap="none" spc="0" normalizeH="0" baseline="0" noProof="0" dirty="0">
               <a:ln>
@@ -21922,7 +22078,7 @@
         <p:spPr>
           <a:xfrm>
             <a:off x="1405364" y="1903564"/>
-            <a:ext cx="3961766" cy="677108"/>
+            <a:ext cx="2172723" cy="677108"/>
           </a:xfrm>
           <a:prstGeom prst="rect">
             <a:avLst/>
@@ -21969,7 +22125,7 @@
               <a:t>- </a:t>
             </a:r>
             <a:r>
-              <a:rPr kumimoji="0" lang="en-US" sz="2000" b="0" i="0" u="none" strike="noStrike" kern="1200" cap="none" spc="0" normalizeH="0" baseline="0" noProof="0" dirty="0" smtClean="0">
+              <a:rPr kumimoji="0" lang="en-US" sz="2000" b="0" i="0" u="none" strike="noStrike" kern="1200" cap="none" spc="0" normalizeH="0" baseline="0" noProof="0" dirty="0">
                 <a:ln>
                   <a:noFill/>
                 </a:ln>
@@ -21982,21 +22138,24 @@
                 <a:latin typeface="Times New Roman" panose="02020603050405020304" pitchFamily="18" charset="0"/>
                 <a:cs typeface="Times New Roman" panose="02020603050405020304" pitchFamily="18" charset="0"/>
               </a:rPr>
-              <a:t>Biểu đồ lớp phân tích</a:t>
-            </a:r>
-            <a:endParaRPr kumimoji="0" lang="en-US" sz="1800" b="0" i="0" u="none" strike="noStrike" kern="1200" cap="none" spc="0" normalizeH="0" baseline="0" noProof="0" dirty="0">
-              <a:ln>
-                <a:noFill/>
-              </a:ln>
-              <a:solidFill>
-                <a:prstClr val="white"/>
-              </a:solidFill>
-              <a:effectLst/>
-              <a:uLnTx/>
-              <a:uFillTx/>
-              <a:latin typeface="Times New Roman" panose="02020603050405020304" pitchFamily="18" charset="0"/>
-              <a:cs typeface="Times New Roman" panose="02020603050405020304" pitchFamily="18" charset="0"/>
-            </a:endParaRPr>
+              <a:t>Biểu</a:t>
+            </a:r>
+            <a:r>
+              <a:rPr kumimoji="0" lang="en-US" sz="1800" b="0" i="0" u="none" strike="noStrike" kern="1200" cap="none" spc="0" normalizeH="0" baseline="0" noProof="0" dirty="0">
+                <a:ln>
+                  <a:noFill/>
+                </a:ln>
+                <a:solidFill>
+                  <a:prstClr val="white"/>
+                </a:solidFill>
+                <a:effectLst/>
+                <a:uLnTx/>
+                <a:uFillTx/>
+                <a:latin typeface="Times New Roman" panose="02020603050405020304" pitchFamily="18" charset="0"/>
+                <a:cs typeface="Times New Roman" panose="02020603050405020304" pitchFamily="18" charset="0"/>
+              </a:rPr>
+              <a:t> đồ trình tự</a:t>
+            </a:r>
           </a:p>
           <a:p>
             <a:pPr marL="0" marR="0" lvl="0" indent="0" algn="l" defTabSz="914400" rtl="0" eaLnBrk="1" fontAlgn="auto" latinLnBrk="0" hangingPunct="1">
@@ -22033,7 +22192,7 @@
       </p:sp>
       <p:pic>
         <p:nvPicPr>
-          <p:cNvPr id="4" name="Picture 3"/>
+          <p:cNvPr id="5" name="Picture 4"/>
           <p:cNvPicPr>
             <a:picLocks noChangeAspect="1"/>
           </p:cNvPicPr>
@@ -22047,8 +22206,8 @@
         </p:blipFill>
         <p:spPr>
           <a:xfrm>
-            <a:off x="2214562" y="2399521"/>
-            <a:ext cx="7762875" cy="3577209"/>
+            <a:off x="1943100" y="2399520"/>
+            <a:ext cx="8305800" cy="3643471"/>
           </a:xfrm>
           <a:prstGeom prst="rect">
             <a:avLst/>
@@ -22058,7 +22217,7 @@
     </p:spTree>
     <p:extLst>
       <p:ext uri="{BB962C8B-B14F-4D97-AF65-F5344CB8AC3E}">
-        <p14:creationId xmlns:p14="http://schemas.microsoft.com/office/powerpoint/2010/main" val="2189107864"/>
+        <p14:creationId xmlns:p14="http://schemas.microsoft.com/office/powerpoint/2010/main" val="982424855"/>
       </p:ext>
     </p:extLst>
   </p:cSld>
@@ -22069,7 +22228,7 @@
     <mc:Choice Requires="p14">
       <p:transition spd="slow" p14:dur="2000"/>
     </mc:Choice>
-    <mc:Fallback xmlns="" xmlns:p15="http://schemas.microsoft.com/office/powerpoint/2012/main">
+    <mc:Fallback xmlns:p15="http://schemas.microsoft.com/office/powerpoint/2012/main" xmlns="">
       <p:transition spd="slow"/>
     </mc:Fallback>
   </mc:AlternateContent>
@@ -22348,7 +22507,7 @@
     <mc:Choice Requires="p14">
       <p:transition spd="slow" p14:dur="2000"/>
     </mc:Choice>
-    <mc:Fallback xmlns="" xmlns:p15="http://schemas.microsoft.com/office/powerpoint/2012/main">
+    <mc:Fallback xmlns:p15="http://schemas.microsoft.com/office/powerpoint/2012/main" xmlns="">
       <p:transition spd="slow"/>
     </mc:Fallback>
   </mc:AlternateContent>
@@ -22533,7 +22692,7 @@
                 <a:latin typeface="Times New Roman" panose="02020603050405020304" pitchFamily="18" charset="0"/>
                 <a:cs typeface="Times New Roman" panose="02020603050405020304" pitchFamily="18" charset="0"/>
               </a:rPr>
-              <a:t>Quản lí tài khoản</a:t>
+              <a:t>Quản lí đặt hàng</a:t>
             </a:r>
             <a:endParaRPr kumimoji="0" lang="en-US" sz="2400" b="0" i="0" u="none" strike="noStrike" kern="1200" cap="none" spc="0" normalizeH="0" baseline="0" noProof="0" dirty="0">
               <a:ln>
@@ -22674,7 +22833,7 @@
       </p:sp>
       <p:pic>
         <p:nvPicPr>
-          <p:cNvPr id="5" name="Picture 4"/>
+          <p:cNvPr id="4" name="Picture 3"/>
           <p:cNvPicPr>
             <a:picLocks noChangeAspect="1"/>
           </p:cNvPicPr>
@@ -22688,8 +22847,8 @@
         </p:blipFill>
         <p:spPr>
           <a:xfrm>
-            <a:off x="2190750" y="2365229"/>
-            <a:ext cx="7810500" cy="3717519"/>
+            <a:off x="1919287" y="2399521"/>
+            <a:ext cx="8353425" cy="3616966"/>
           </a:xfrm>
           <a:prstGeom prst="rect">
             <a:avLst/>
@@ -22699,7 +22858,7 @@
     </p:spTree>
     <p:extLst>
       <p:ext uri="{BB962C8B-B14F-4D97-AF65-F5344CB8AC3E}">
-        <p14:creationId xmlns:p14="http://schemas.microsoft.com/office/powerpoint/2010/main" val="3427094805"/>
+        <p14:creationId xmlns:p14="http://schemas.microsoft.com/office/powerpoint/2010/main" val="1714840472"/>
       </p:ext>
     </p:extLst>
   </p:cSld>
@@ -22710,7 +22869,7 @@
     <mc:Choice Requires="p14">
       <p:transition spd="slow" p14:dur="2000"/>
     </mc:Choice>
-    <mc:Fallback xmlns="" xmlns:p15="http://schemas.microsoft.com/office/powerpoint/2012/main">
+    <mc:Fallback xmlns:p15="http://schemas.microsoft.com/office/powerpoint/2012/main" xmlns="">
       <p:transition spd="slow"/>
     </mc:Fallback>
   </mc:AlternateContent>
@@ -22895,7 +23054,7 @@
                 <a:latin typeface="Times New Roman" panose="02020603050405020304" pitchFamily="18" charset="0"/>
                 <a:cs typeface="Times New Roman" panose="02020603050405020304" pitchFamily="18" charset="0"/>
               </a:rPr>
-              <a:t>Quản lí tài khoản</a:t>
+              <a:t>Quản lí đặt hàng</a:t>
             </a:r>
             <a:endParaRPr kumimoji="0" lang="en-US" sz="2400" b="0" i="0" u="none" strike="noStrike" kern="1200" cap="none" spc="0" normalizeH="0" baseline="0" noProof="0" dirty="0">
               <a:ln>
@@ -23036,7 +23195,7 @@
       </p:sp>
       <p:pic>
         <p:nvPicPr>
-          <p:cNvPr id="4" name="Picture 3"/>
+          <p:cNvPr id="5" name="Picture 4"/>
           <p:cNvPicPr>
             <a:picLocks noChangeAspect="1"/>
           </p:cNvPicPr>
@@ -23050,8 +23209,8 @@
         </p:blipFill>
         <p:spPr>
           <a:xfrm>
-            <a:off x="2393052" y="2399521"/>
-            <a:ext cx="7591425" cy="3630218"/>
+            <a:off x="1843087" y="2399521"/>
+            <a:ext cx="8505825" cy="3563958"/>
           </a:xfrm>
           <a:prstGeom prst="rect">
             <a:avLst/>
@@ -23061,7 +23220,7 @@
     </p:spTree>
     <p:extLst>
       <p:ext uri="{BB962C8B-B14F-4D97-AF65-F5344CB8AC3E}">
-        <p14:creationId xmlns:p14="http://schemas.microsoft.com/office/powerpoint/2010/main" val="295273485"/>
+        <p14:creationId xmlns:p14="http://schemas.microsoft.com/office/powerpoint/2010/main" val="4291451881"/>
       </p:ext>
     </p:extLst>
   </p:cSld>
@@ -23072,7 +23231,7 @@
     <mc:Choice Requires="p14">
       <p:transition spd="slow" p14:dur="2000"/>
     </mc:Choice>
-    <mc:Fallback xmlns="" xmlns:p15="http://schemas.microsoft.com/office/powerpoint/2012/main">
+    <mc:Fallback xmlns:p15="http://schemas.microsoft.com/office/powerpoint/2012/main" xmlns="">
       <p:transition spd="slow"/>
     </mc:Fallback>
   </mc:AlternateContent>
@@ -23279,7 +23438,7 @@
                 <a:latin typeface="Times New Roman" panose="02020603050405020304" pitchFamily="18" charset="0"/>
                 <a:cs typeface="Times New Roman" panose="02020603050405020304" pitchFamily="18" charset="0"/>
               </a:rPr>
-              <a:t> lí tài khoản</a:t>
+              <a:t> lí đặt hàng</a:t>
             </a:r>
             <a:endParaRPr kumimoji="0" lang="en-US" sz="2400" b="0" i="0" u="none" strike="noStrike" kern="1200" cap="none" spc="0" normalizeH="0" baseline="0" noProof="0" dirty="0">
               <a:ln>
@@ -23417,7 +23576,7 @@
       </p:sp>
       <p:pic>
         <p:nvPicPr>
-          <p:cNvPr id="5" name="Picture 4"/>
+          <p:cNvPr id="4" name="Picture 3"/>
           <p:cNvPicPr>
             <a:picLocks noChangeAspect="1"/>
           </p:cNvPicPr>
@@ -23431,8 +23590,8 @@
         </p:blipFill>
         <p:spPr>
           <a:xfrm>
-            <a:off x="1919287" y="2339420"/>
-            <a:ext cx="8353425" cy="3690319"/>
+            <a:off x="2214562" y="2399521"/>
+            <a:ext cx="7762875" cy="3577209"/>
           </a:xfrm>
           <a:prstGeom prst="rect">
             <a:avLst/>
@@ -23442,7 +23601,7 @@
     </p:spTree>
     <p:extLst>
       <p:ext uri="{BB962C8B-B14F-4D97-AF65-F5344CB8AC3E}">
-        <p14:creationId xmlns:p14="http://schemas.microsoft.com/office/powerpoint/2010/main" val="754682409"/>
+        <p14:creationId xmlns:p14="http://schemas.microsoft.com/office/powerpoint/2010/main" val="2189107864"/>
       </p:ext>
     </p:extLst>
   </p:cSld>
@@ -23453,7 +23612,7 @@
     <mc:Choice Requires="p14">
       <p:transition spd="slow" p14:dur="2000"/>
     </mc:Choice>
-    <mc:Fallback xmlns="" xmlns:p15="http://schemas.microsoft.com/office/powerpoint/2012/main">
+    <mc:Fallback xmlns:p15="http://schemas.microsoft.com/office/powerpoint/2012/main" xmlns="">
       <p:transition spd="slow"/>
     </mc:Fallback>
   </mc:AlternateContent>
@@ -23638,7 +23797,7 @@
                 <a:latin typeface="Times New Roman" panose="02020603050405020304" pitchFamily="18" charset="0"/>
                 <a:cs typeface="Times New Roman" panose="02020603050405020304" pitchFamily="18" charset="0"/>
               </a:rPr>
-              <a:t>Phân quyền người dùng</a:t>
+              <a:t>Quản lí tài khoản</a:t>
             </a:r>
             <a:endParaRPr kumimoji="0" lang="en-US" sz="2400" b="0" i="0" u="none" strike="noStrike" kern="1200" cap="none" spc="0" normalizeH="0" baseline="0" noProof="0" dirty="0">
               <a:ln>
@@ -23793,8 +23952,8 @@
         </p:blipFill>
         <p:spPr>
           <a:xfrm>
-            <a:off x="1866900" y="2399521"/>
-            <a:ext cx="8458200" cy="3524201"/>
+            <a:off x="2190750" y="2365229"/>
+            <a:ext cx="7810500" cy="3717519"/>
           </a:xfrm>
           <a:prstGeom prst="rect">
             <a:avLst/>
@@ -23804,7 +23963,7 @@
     </p:spTree>
     <p:extLst>
       <p:ext uri="{BB962C8B-B14F-4D97-AF65-F5344CB8AC3E}">
-        <p14:creationId xmlns:p14="http://schemas.microsoft.com/office/powerpoint/2010/main" val="2796769390"/>
+        <p14:creationId xmlns:p14="http://schemas.microsoft.com/office/powerpoint/2010/main" val="3427094805"/>
       </p:ext>
     </p:extLst>
   </p:cSld>
@@ -23815,7 +23974,7 @@
     <mc:Choice Requires="p14">
       <p:transition spd="slow" p14:dur="2000"/>
     </mc:Choice>
-    <mc:Fallback xmlns="" xmlns:p15="http://schemas.microsoft.com/office/powerpoint/2012/main">
+    <mc:Fallback xmlns:p15="http://schemas.microsoft.com/office/powerpoint/2012/main" xmlns="">
       <p:transition spd="slow"/>
     </mc:Fallback>
   </mc:AlternateContent>
@@ -24000,7 +24159,7 @@
                 <a:latin typeface="Times New Roman" panose="02020603050405020304" pitchFamily="18" charset="0"/>
                 <a:cs typeface="Times New Roman" panose="02020603050405020304" pitchFamily="18" charset="0"/>
               </a:rPr>
-              <a:t>Phân quyền người dùng</a:t>
+              <a:t>Quản lí tài khoản</a:t>
             </a:r>
             <a:endParaRPr kumimoji="0" lang="en-US" sz="2400" b="0" i="0" u="none" strike="noStrike" kern="1200" cap="none" spc="0" normalizeH="0" baseline="0" noProof="0" dirty="0">
               <a:ln>
@@ -24155,8 +24314,8 @@
         </p:blipFill>
         <p:spPr>
           <a:xfrm>
-            <a:off x="1795462" y="2399521"/>
-            <a:ext cx="8601075" cy="3550705"/>
+            <a:off x="2393052" y="2399521"/>
+            <a:ext cx="7591425" cy="3630218"/>
           </a:xfrm>
           <a:prstGeom prst="rect">
             <a:avLst/>
@@ -24166,7 +24325,7 @@
     </p:spTree>
     <p:extLst>
       <p:ext uri="{BB962C8B-B14F-4D97-AF65-F5344CB8AC3E}">
-        <p14:creationId xmlns:p14="http://schemas.microsoft.com/office/powerpoint/2010/main" val="2285801574"/>
+        <p14:creationId xmlns:p14="http://schemas.microsoft.com/office/powerpoint/2010/main" val="295273485"/>
       </p:ext>
     </p:extLst>
   </p:cSld>
@@ -24177,7 +24336,7 @@
     <mc:Choice Requires="p14">
       <p:transition spd="slow" p14:dur="2000"/>
     </mc:Choice>
-    <mc:Fallback xmlns="" xmlns:p15="http://schemas.microsoft.com/office/powerpoint/2012/main">
+    <mc:Fallback xmlns:p15="http://schemas.microsoft.com/office/powerpoint/2012/main" xmlns="">
       <p:transition spd="slow"/>
     </mc:Fallback>
   </mc:AlternateContent>
@@ -24355,14 +24514,36 @@
               <a:defRPr/>
             </a:pPr>
             <a:r>
-              <a:rPr lang="en-US" sz="2400" dirty="0" smtClean="0">
+              <a:rPr kumimoji="0" lang="en-US" sz="2400" b="0" i="0" u="none" strike="noStrike" kern="1200" cap="none" spc="0" normalizeH="0" baseline="0" noProof="0" dirty="0" smtClean="0">
+                <a:ln>
+                  <a:noFill/>
+                </a:ln>
                 <a:solidFill>
                   <a:prstClr val="white"/>
                 </a:solidFill>
+                <a:effectLst/>
+                <a:uLnTx/>
+                <a:uFillTx/>
                 <a:latin typeface="Times New Roman" panose="02020603050405020304" pitchFamily="18" charset="0"/>
                 <a:cs typeface="Times New Roman" panose="02020603050405020304" pitchFamily="18" charset="0"/>
               </a:rPr>
-              <a:t>Phân quyền người dùng</a:t>
+              <a:t>Quản</a:t>
+            </a:r>
+            <a:r>
+              <a:rPr kumimoji="0" lang="en-US" sz="2400" b="0" i="0" u="none" strike="noStrike" kern="1200" cap="none" spc="0" normalizeH="0" noProof="0" dirty="0" smtClean="0">
+                <a:ln>
+                  <a:noFill/>
+                </a:ln>
+                <a:solidFill>
+                  <a:prstClr val="white"/>
+                </a:solidFill>
+                <a:effectLst/>
+                <a:uLnTx/>
+                <a:uFillTx/>
+                <a:latin typeface="Times New Roman" panose="02020603050405020304" pitchFamily="18" charset="0"/>
+                <a:cs typeface="Times New Roman" panose="02020603050405020304" pitchFamily="18" charset="0"/>
+              </a:rPr>
+              <a:t> lí tài khoản</a:t>
             </a:r>
             <a:endParaRPr kumimoji="0" lang="en-US" sz="2400" b="0" i="0" u="none" strike="noStrike" kern="1200" cap="none" spc="0" normalizeH="0" baseline="0" noProof="0" dirty="0">
               <a:ln>
@@ -24389,7 +24570,7 @@
         <p:spPr>
           <a:xfrm>
             <a:off x="1405364" y="1903564"/>
-            <a:ext cx="2172723" cy="677108"/>
+            <a:ext cx="3961766" cy="677108"/>
           </a:xfrm>
           <a:prstGeom prst="rect">
             <a:avLst/>
@@ -24436,7 +24617,7 @@
               <a:t>- </a:t>
             </a:r>
             <a:r>
-              <a:rPr kumimoji="0" lang="en-US" sz="2000" b="0" i="0" u="none" strike="noStrike" kern="1200" cap="none" spc="0" normalizeH="0" baseline="0" noProof="0" dirty="0">
+              <a:rPr kumimoji="0" lang="en-US" sz="2000" b="0" i="0" u="none" strike="noStrike" kern="1200" cap="none" spc="0" normalizeH="0" baseline="0" noProof="0" dirty="0" smtClean="0">
                 <a:ln>
                   <a:noFill/>
                 </a:ln>
@@ -24449,24 +24630,21 @@
                 <a:latin typeface="Times New Roman" panose="02020603050405020304" pitchFamily="18" charset="0"/>
                 <a:cs typeface="Times New Roman" panose="02020603050405020304" pitchFamily="18" charset="0"/>
               </a:rPr>
-              <a:t>Biểu</a:t>
-            </a:r>
-            <a:r>
-              <a:rPr kumimoji="0" lang="en-US" sz="1800" b="0" i="0" u="none" strike="noStrike" kern="1200" cap="none" spc="0" normalizeH="0" baseline="0" noProof="0" dirty="0">
-                <a:ln>
-                  <a:noFill/>
-                </a:ln>
-                <a:solidFill>
-                  <a:prstClr val="white"/>
-                </a:solidFill>
-                <a:effectLst/>
-                <a:uLnTx/>
-                <a:uFillTx/>
-                <a:latin typeface="Times New Roman" panose="02020603050405020304" pitchFamily="18" charset="0"/>
-                <a:cs typeface="Times New Roman" panose="02020603050405020304" pitchFamily="18" charset="0"/>
-              </a:rPr>
-              <a:t> đồ trình tự</a:t>
-            </a:r>
+              <a:t>Biểu đồ lớp phân tích</a:t>
+            </a:r>
+            <a:endParaRPr kumimoji="0" lang="en-US" sz="1800" b="0" i="0" u="none" strike="noStrike" kern="1200" cap="none" spc="0" normalizeH="0" baseline="0" noProof="0" dirty="0">
+              <a:ln>
+                <a:noFill/>
+              </a:ln>
+              <a:solidFill>
+                <a:prstClr val="white"/>
+              </a:solidFill>
+              <a:effectLst/>
+              <a:uLnTx/>
+              <a:uFillTx/>
+              <a:latin typeface="Times New Roman" panose="02020603050405020304" pitchFamily="18" charset="0"/>
+              <a:cs typeface="Times New Roman" panose="02020603050405020304" pitchFamily="18" charset="0"/>
+            </a:endParaRPr>
           </a:p>
           <a:p>
             <a:pPr marL="0" marR="0" lvl="0" indent="0" algn="l" defTabSz="914400" rtl="0" eaLnBrk="1" fontAlgn="auto" latinLnBrk="0" hangingPunct="1">
@@ -24517,8 +24695,8 @@
         </p:blipFill>
         <p:spPr>
           <a:xfrm>
-            <a:off x="1900237" y="2365229"/>
-            <a:ext cx="8391525" cy="3683146"/>
+            <a:off x="1919287" y="2339420"/>
+            <a:ext cx="8353425" cy="3690319"/>
           </a:xfrm>
           <a:prstGeom prst="rect">
             <a:avLst/>
@@ -24528,7 +24706,7 @@
     </p:spTree>
     <p:extLst>
       <p:ext uri="{BB962C8B-B14F-4D97-AF65-F5344CB8AC3E}">
-        <p14:creationId xmlns:p14="http://schemas.microsoft.com/office/powerpoint/2010/main" val="4270855926"/>
+        <p14:creationId xmlns:p14="http://schemas.microsoft.com/office/powerpoint/2010/main" val="754682409"/>
       </p:ext>
     </p:extLst>
   </p:cSld>
@@ -24539,7 +24717,7 @@
     <mc:Choice Requires="p14">
       <p:transition spd="slow" p14:dur="2000"/>
     </mc:Choice>
-    <mc:Fallback xmlns="" xmlns:p15="http://schemas.microsoft.com/office/powerpoint/2012/main">
+    <mc:Fallback xmlns:p15="http://schemas.microsoft.com/office/powerpoint/2012/main" xmlns="">
       <p:transition spd="slow"/>
     </mc:Fallback>
   </mc:AlternateContent>
@@ -24717,36 +24895,14 @@
               <a:defRPr/>
             </a:pPr>
             <a:r>
-              <a:rPr kumimoji="0" lang="en-US" sz="2400" b="0" i="0" u="none" strike="noStrike" kern="1200" cap="none" spc="0" normalizeH="0" baseline="0" noProof="0" dirty="0" smtClean="0">
-                <a:ln>
-                  <a:noFill/>
-                </a:ln>
+              <a:rPr lang="en-US" sz="2400" dirty="0" smtClean="0">
                 <a:solidFill>
                   <a:prstClr val="white"/>
                 </a:solidFill>
-                <a:effectLst/>
-                <a:uLnTx/>
-                <a:uFillTx/>
                 <a:latin typeface="Times New Roman" panose="02020603050405020304" pitchFamily="18" charset="0"/>
                 <a:cs typeface="Times New Roman" panose="02020603050405020304" pitchFamily="18" charset="0"/>
               </a:rPr>
-              <a:t>Quản</a:t>
-            </a:r>
-            <a:r>
-              <a:rPr kumimoji="0" lang="en-US" sz="2400" b="0" i="0" u="none" strike="noStrike" kern="1200" cap="none" spc="0" normalizeH="0" noProof="0" dirty="0" smtClean="0">
-                <a:ln>
-                  <a:noFill/>
-                </a:ln>
-                <a:solidFill>
-                  <a:prstClr val="white"/>
-                </a:solidFill>
-                <a:effectLst/>
-                <a:uLnTx/>
-                <a:uFillTx/>
-                <a:latin typeface="Times New Roman" panose="02020603050405020304" pitchFamily="18" charset="0"/>
-                <a:cs typeface="Times New Roman" panose="02020603050405020304" pitchFamily="18" charset="0"/>
-              </a:rPr>
-              <a:t> lí tài khoản</a:t>
+              <a:t>Phân quyền người dùng</a:t>
             </a:r>
             <a:endParaRPr kumimoji="0" lang="en-US" sz="2400" b="0" i="0" u="none" strike="noStrike" kern="1200" cap="none" spc="0" normalizeH="0" baseline="0" noProof="0" dirty="0">
               <a:ln>
@@ -24773,7 +24929,7 @@
         <p:spPr>
           <a:xfrm>
             <a:off x="1405364" y="1903564"/>
-            <a:ext cx="3961766" cy="677108"/>
+            <a:ext cx="2172723" cy="677108"/>
           </a:xfrm>
           <a:prstGeom prst="rect">
             <a:avLst/>
@@ -24820,7 +24976,7 @@
               <a:t>- </a:t>
             </a:r>
             <a:r>
-              <a:rPr kumimoji="0" lang="en-US" sz="2000" b="0" i="0" u="none" strike="noStrike" kern="1200" cap="none" spc="0" normalizeH="0" baseline="0" noProof="0" dirty="0" smtClean="0">
+              <a:rPr kumimoji="0" lang="en-US" sz="2000" b="0" i="0" u="none" strike="noStrike" kern="1200" cap="none" spc="0" normalizeH="0" baseline="0" noProof="0" dirty="0">
                 <a:ln>
                   <a:noFill/>
                 </a:ln>
@@ -24833,21 +24989,24 @@
                 <a:latin typeface="Times New Roman" panose="02020603050405020304" pitchFamily="18" charset="0"/>
                 <a:cs typeface="Times New Roman" panose="02020603050405020304" pitchFamily="18" charset="0"/>
               </a:rPr>
-              <a:t>Biểu đồ lớp phân tích</a:t>
-            </a:r>
-            <a:endParaRPr kumimoji="0" lang="en-US" sz="1800" b="0" i="0" u="none" strike="noStrike" kern="1200" cap="none" spc="0" normalizeH="0" baseline="0" noProof="0" dirty="0">
-              <a:ln>
-                <a:noFill/>
-              </a:ln>
-              <a:solidFill>
-                <a:prstClr val="white"/>
-              </a:solidFill>
-              <a:effectLst/>
-              <a:uLnTx/>
-              <a:uFillTx/>
-              <a:latin typeface="Times New Roman" panose="02020603050405020304" pitchFamily="18" charset="0"/>
-              <a:cs typeface="Times New Roman" panose="02020603050405020304" pitchFamily="18" charset="0"/>
-            </a:endParaRPr>
+              <a:t>Biểu</a:t>
+            </a:r>
+            <a:r>
+              <a:rPr kumimoji="0" lang="en-US" sz="1800" b="0" i="0" u="none" strike="noStrike" kern="1200" cap="none" spc="0" normalizeH="0" baseline="0" noProof="0" dirty="0">
+                <a:ln>
+                  <a:noFill/>
+                </a:ln>
+                <a:solidFill>
+                  <a:prstClr val="white"/>
+                </a:solidFill>
+                <a:effectLst/>
+                <a:uLnTx/>
+                <a:uFillTx/>
+                <a:latin typeface="Times New Roman" panose="02020603050405020304" pitchFamily="18" charset="0"/>
+                <a:cs typeface="Times New Roman" panose="02020603050405020304" pitchFamily="18" charset="0"/>
+              </a:rPr>
+              <a:t> đồ trình tự</a:t>
+            </a:r>
           </a:p>
           <a:p>
             <a:pPr marL="0" marR="0" lvl="0" indent="0" algn="l" defTabSz="914400" rtl="0" eaLnBrk="1" fontAlgn="auto" latinLnBrk="0" hangingPunct="1">
@@ -24884,7 +25043,7 @@
       </p:sp>
       <p:pic>
         <p:nvPicPr>
-          <p:cNvPr id="4" name="Picture 3"/>
+          <p:cNvPr id="5" name="Picture 4"/>
           <p:cNvPicPr>
             <a:picLocks noChangeAspect="1"/>
           </p:cNvPicPr>
@@ -24898,8 +25057,8 @@
         </p:blipFill>
         <p:spPr>
           <a:xfrm>
-            <a:off x="2009775" y="2399520"/>
-            <a:ext cx="8172450" cy="3616967"/>
+            <a:off x="1866900" y="2399521"/>
+            <a:ext cx="8458200" cy="3524201"/>
           </a:xfrm>
           <a:prstGeom prst="rect">
             <a:avLst/>
@@ -24909,7 +25068,7 @@
     </p:spTree>
     <p:extLst>
       <p:ext uri="{BB962C8B-B14F-4D97-AF65-F5344CB8AC3E}">
-        <p14:creationId xmlns:p14="http://schemas.microsoft.com/office/powerpoint/2010/main" val="3809264540"/>
+        <p14:creationId xmlns:p14="http://schemas.microsoft.com/office/powerpoint/2010/main" val="2796769390"/>
       </p:ext>
     </p:extLst>
   </p:cSld>
@@ -24920,7 +25079,7 @@
     <mc:Choice Requires="p14">
       <p:transition spd="slow" p14:dur="2000"/>
     </mc:Choice>
-    <mc:Fallback xmlns="" xmlns:p15="http://schemas.microsoft.com/office/powerpoint/2012/main">
+    <mc:Fallback xmlns:p15="http://schemas.microsoft.com/office/powerpoint/2012/main" xmlns="">
       <p:transition spd="slow"/>
     </mc:Fallback>
   </mc:AlternateContent>
@@ -24953,7 +25112,7 @@
       </p:grpSpPr>
       <p:pic>
         <p:nvPicPr>
-          <p:cNvPr id="292" name="Content Placeholder 4"/>
+          <p:cNvPr id="156" name="Content Placeholder 4"/>
           <p:cNvPicPr/>
           <p:nvPr/>
         </p:nvPicPr>
@@ -24976,14 +25135,14 @@
       </p:pic>
       <p:sp>
         <p:nvSpPr>
-          <p:cNvPr id="293" name="CustomShape 1"/>
+          <p:cNvPr id="158" name="CustomShape 2"/>
           <p:cNvSpPr/>
           <p:nvPr/>
         </p:nvSpPr>
         <p:spPr>
           <a:xfrm>
-            <a:off x="1794240" y="2705760"/>
-            <a:ext cx="8602920" cy="1431000"/>
+            <a:off x="4313696" y="945942"/>
+            <a:ext cx="3026511" cy="521766"/>
           </a:xfrm>
           <a:prstGeom prst="rect">
             <a:avLst/>
@@ -25011,27 +25170,269 @@
           </a:bodyPr>
           <a:lstStyle/>
           <a:p>
-            <a:pPr>
+            <a:pPr marL="0" marR="0" lvl="0" indent="0" algn="l" defTabSz="914400" rtl="0" eaLnBrk="1" fontAlgn="auto" latinLnBrk="0" hangingPunct="1">
               <a:lnSpc>
                 <a:spcPct val="100000"/>
               </a:lnSpc>
-            </a:pPr>
-            <a:r>
-              <a:rPr lang="vi-VN" sz="8800" b="1" strike="noStrike" spc="-1">
+              <a:spcBef>
+                <a:spcPts val="0"/>
+              </a:spcBef>
+              <a:spcAft>
+                <a:spcPts val="0"/>
+              </a:spcAft>
+              <a:buClrTx/>
+              <a:buSzTx/>
+              <a:buFontTx/>
+              <a:buNone/>
+              <a:tabLst/>
+              <a:defRPr/>
+            </a:pPr>
+            <a:r>
+              <a:rPr kumimoji="0" lang="en-US" sz="2800" b="1" i="0" u="none" strike="noStrike" kern="1200" cap="none" spc="-1" normalizeH="0" baseline="0" noProof="0" dirty="0" smtClean="0">
+                <a:ln>
+                  <a:noFill/>
+                </a:ln>
                 <a:solidFill>
                   <a:srgbClr val="FFFFFF"/>
                 </a:solidFill>
-                <a:latin typeface="Brush Script MT"/>
-              </a:rPr>
-              <a:t>Thank You !!!</a:t>
-            </a:r>
-            <a:endParaRPr lang="vi-VN" sz="8800" b="0" strike="noStrike" spc="-1">
+                <a:effectLst/>
+                <a:uLnTx/>
+                <a:uFillTx/>
+                <a:latin typeface="Times New Roman"/>
+              </a:rPr>
+              <a:t>Mô hình phân tích</a:t>
+            </a:r>
+            <a:endParaRPr kumimoji="0" lang="vi-VN" sz="2800" b="1" i="0" u="none" strike="noStrike" kern="1200" cap="none" spc="-1" normalizeH="0" baseline="0" noProof="0" dirty="0">
+              <a:ln>
+                <a:noFill/>
+              </a:ln>
+              <a:solidFill>
+                <a:prstClr val="black"/>
+              </a:solidFill>
+              <a:effectLst/>
+              <a:uLnTx/>
+              <a:uFillTx/>
               <a:latin typeface="Arial"/>
             </a:endParaRPr>
           </a:p>
         </p:txBody>
       </p:sp>
+      <p:sp>
+        <p:nvSpPr>
+          <p:cNvPr id="2" name="TextBox 1"/>
+          <p:cNvSpPr txBox="1"/>
+          <p:nvPr/>
+        </p:nvSpPr>
+        <p:spPr>
+          <a:xfrm>
+            <a:off x="1033670" y="1441899"/>
+            <a:ext cx="5645426" cy="461665"/>
+          </a:xfrm>
+          <a:prstGeom prst="rect">
+            <a:avLst/>
+          </a:prstGeom>
+          <a:noFill/>
+        </p:spPr>
+        <p:txBody>
+          <a:bodyPr wrap="square" rtlCol="0">
+            <a:spAutoFit/>
+          </a:bodyPr>
+          <a:lstStyle/>
+          <a:p>
+            <a:pPr marL="0" marR="0" lvl="0" indent="0" algn="l" defTabSz="914400" rtl="0" eaLnBrk="1" fontAlgn="auto" latinLnBrk="0" hangingPunct="1">
+              <a:lnSpc>
+                <a:spcPct val="100000"/>
+              </a:lnSpc>
+              <a:spcBef>
+                <a:spcPts val="0"/>
+              </a:spcBef>
+              <a:spcAft>
+                <a:spcPts val="0"/>
+              </a:spcAft>
+              <a:buClrTx/>
+              <a:buSzTx/>
+              <a:buFontTx/>
+              <a:buNone/>
+              <a:tabLst/>
+              <a:defRPr/>
+            </a:pPr>
+            <a:r>
+              <a:rPr lang="en-US" sz="2400" dirty="0" smtClean="0">
+                <a:solidFill>
+                  <a:prstClr val="white"/>
+                </a:solidFill>
+                <a:latin typeface="Times New Roman" panose="02020603050405020304" pitchFamily="18" charset="0"/>
+                <a:cs typeface="Times New Roman" panose="02020603050405020304" pitchFamily="18" charset="0"/>
+              </a:rPr>
+              <a:t>Phân quyền người dùng</a:t>
+            </a:r>
+            <a:endParaRPr kumimoji="0" lang="en-US" sz="2400" b="0" i="0" u="none" strike="noStrike" kern="1200" cap="none" spc="0" normalizeH="0" baseline="0" noProof="0" dirty="0">
+              <a:ln>
+                <a:noFill/>
+              </a:ln>
+              <a:solidFill>
+                <a:prstClr val="white"/>
+              </a:solidFill>
+              <a:effectLst/>
+              <a:uLnTx/>
+              <a:uFillTx/>
+              <a:latin typeface="Times New Roman" panose="02020603050405020304" pitchFamily="18" charset="0"/>
+              <a:cs typeface="Times New Roman" panose="02020603050405020304" pitchFamily="18" charset="0"/>
+            </a:endParaRPr>
+          </a:p>
+        </p:txBody>
+      </p:sp>
+      <p:sp>
+        <p:nvSpPr>
+          <p:cNvPr id="3" name="TextBox 2"/>
+          <p:cNvSpPr txBox="1"/>
+          <p:nvPr/>
+        </p:nvSpPr>
+        <p:spPr>
+          <a:xfrm>
+            <a:off x="1405364" y="1903564"/>
+            <a:ext cx="2172723" cy="677108"/>
+          </a:xfrm>
+          <a:prstGeom prst="rect">
+            <a:avLst/>
+          </a:prstGeom>
+          <a:noFill/>
+        </p:spPr>
+        <p:txBody>
+          <a:bodyPr wrap="square" rtlCol="0">
+            <a:spAutoFit/>
+          </a:bodyPr>
+          <a:lstStyle/>
+          <a:p>
+            <a:pPr marL="0" marR="0" lvl="0" indent="0" algn="l" defTabSz="914400" rtl="0" eaLnBrk="1" fontAlgn="auto" latinLnBrk="0" hangingPunct="1">
+              <a:lnSpc>
+                <a:spcPct val="100000"/>
+              </a:lnSpc>
+              <a:spcBef>
+                <a:spcPts val="0"/>
+              </a:spcBef>
+              <a:spcAft>
+                <a:spcPts val="0"/>
+              </a:spcAft>
+              <a:buClrTx/>
+              <a:buSzTx/>
+              <a:buFontTx/>
+              <a:buNone/>
+              <a:tabLst/>
+              <a:defRPr/>
+            </a:pPr>
+            <a:r>
+              <a:rPr kumimoji="0" lang="en-US" sz="1800" b="0" i="0" u="none" strike="noStrike" kern="1200" cap="none" spc="0" normalizeH="0" baseline="0" noProof="0" dirty="0">
+                <a:ln>
+                  <a:noFill/>
+                </a:ln>
+                <a:solidFill>
+                  <a:prstClr val="white"/>
+                </a:solidFill>
+                <a:effectLst/>
+                <a:uLnTx/>
+                <a:uFillTx/>
+                <a:latin typeface="Times New Roman" panose="02020603050405020304" pitchFamily="18" charset="0"/>
+                <a:cs typeface="Times New Roman" panose="02020603050405020304" pitchFamily="18" charset="0"/>
+              </a:rPr>
+              <a:t>- </a:t>
+            </a:r>
+            <a:r>
+              <a:rPr kumimoji="0" lang="en-US" sz="2000" b="0" i="0" u="none" strike="noStrike" kern="1200" cap="none" spc="0" normalizeH="0" baseline="0" noProof="0" dirty="0">
+                <a:ln>
+                  <a:noFill/>
+                </a:ln>
+                <a:solidFill>
+                  <a:prstClr val="white"/>
+                </a:solidFill>
+                <a:effectLst/>
+                <a:uLnTx/>
+                <a:uFillTx/>
+                <a:latin typeface="Times New Roman" panose="02020603050405020304" pitchFamily="18" charset="0"/>
+                <a:cs typeface="Times New Roman" panose="02020603050405020304" pitchFamily="18" charset="0"/>
+              </a:rPr>
+              <a:t>Biểu</a:t>
+            </a:r>
+            <a:r>
+              <a:rPr kumimoji="0" lang="en-US" sz="1800" b="0" i="0" u="none" strike="noStrike" kern="1200" cap="none" spc="0" normalizeH="0" baseline="0" noProof="0" dirty="0">
+                <a:ln>
+                  <a:noFill/>
+                </a:ln>
+                <a:solidFill>
+                  <a:prstClr val="white"/>
+                </a:solidFill>
+                <a:effectLst/>
+                <a:uLnTx/>
+                <a:uFillTx/>
+                <a:latin typeface="Times New Roman" panose="02020603050405020304" pitchFamily="18" charset="0"/>
+                <a:cs typeface="Times New Roman" panose="02020603050405020304" pitchFamily="18" charset="0"/>
+              </a:rPr>
+              <a:t> đồ trình tự</a:t>
+            </a:r>
+          </a:p>
+          <a:p>
+            <a:pPr marL="0" marR="0" lvl="0" indent="0" algn="l" defTabSz="914400" rtl="0" eaLnBrk="1" fontAlgn="auto" latinLnBrk="0" hangingPunct="1">
+              <a:lnSpc>
+                <a:spcPct val="100000"/>
+              </a:lnSpc>
+              <a:spcBef>
+                <a:spcPts val="0"/>
+              </a:spcBef>
+              <a:spcAft>
+                <a:spcPts val="0"/>
+              </a:spcAft>
+              <a:buClrTx/>
+              <a:buSzTx/>
+              <a:buFontTx/>
+              <a:buNone/>
+              <a:tabLst/>
+              <a:defRPr/>
+            </a:pPr>
+            <a:endParaRPr kumimoji="0" lang="en-US" sz="1800" b="0" i="0" u="none" strike="noStrike" kern="1200" cap="none" spc="0" normalizeH="0" baseline="0" noProof="0" dirty="0">
+              <a:ln>
+                <a:noFill/>
+              </a:ln>
+              <a:solidFill>
+                <a:prstClr val="black"/>
+              </a:solidFill>
+              <a:effectLst/>
+              <a:uLnTx/>
+              <a:uFillTx/>
+              <a:latin typeface="Arial"/>
+            </a:endParaRPr>
+          </a:p>
+        </p:txBody>
+      </p:sp>
+      <p:pic>
+        <p:nvPicPr>
+          <p:cNvPr id="4" name="Picture 3"/>
+          <p:cNvPicPr>
+            <a:picLocks noChangeAspect="1"/>
+          </p:cNvPicPr>
+          <p:nvPr/>
+        </p:nvPicPr>
+        <p:blipFill>
+          <a:blip r:embed="rId3"/>
+          <a:stretch>
+            <a:fillRect/>
+          </a:stretch>
+        </p:blipFill>
+        <p:spPr>
+          <a:xfrm>
+            <a:off x="1795462" y="2399521"/>
+            <a:ext cx="8601075" cy="3550705"/>
+          </a:xfrm>
+          <a:prstGeom prst="rect">
+            <a:avLst/>
+          </a:prstGeom>
+        </p:spPr>
+      </p:pic>
     </p:spTree>
+    <p:extLst>
+      <p:ext uri="{BB962C8B-B14F-4D97-AF65-F5344CB8AC3E}">
+        <p14:creationId xmlns:p14="http://schemas.microsoft.com/office/powerpoint/2010/main" val="2285801574"/>
+      </p:ext>
+    </p:extLst>
   </p:cSld>
   <p:clrMapOvr>
     <a:masterClrMapping/>
@@ -25040,7 +25441,750 @@
     <mc:Choice Requires="p14">
       <p:transition spd="slow" p14:dur="2000"/>
     </mc:Choice>
-    <mc:Fallback xmlns="" xmlns:p15="http://schemas.microsoft.com/office/powerpoint/2012/main">
+    <mc:Fallback xmlns:p15="http://schemas.microsoft.com/office/powerpoint/2012/main" xmlns="">
+      <p:transition spd="slow"/>
+    </mc:Fallback>
+  </mc:AlternateContent>
+  <p:timing>
+    <p:tnLst>
+      <p:par>
+        <p:cTn id="1" dur="indefinite" restart="never" nodeType="tmRoot"/>
+      </p:par>
+    </p:tnLst>
+  </p:timing>
+</p:sld>
+</file>
+
+<file path=ppt/slides/slide58.xml><?xml version="1.0" encoding="utf-8"?>
+<p:sld xmlns:a="http://schemas.openxmlformats.org/drawingml/2006/main" xmlns:r="http://schemas.openxmlformats.org/officeDocument/2006/relationships" xmlns:p="http://schemas.openxmlformats.org/presentationml/2006/main">
+  <p:cSld>
+    <p:spTree>
+      <p:nvGrpSpPr>
+        <p:cNvPr id="1" name=""/>
+        <p:cNvGrpSpPr/>
+        <p:nvPr/>
+      </p:nvGrpSpPr>
+      <p:grpSpPr>
+        <a:xfrm>
+          <a:off x="0" y="0"/>
+          <a:ext cx="0" cy="0"/>
+          <a:chOff x="0" y="0"/>
+          <a:chExt cx="0" cy="0"/>
+        </a:xfrm>
+      </p:grpSpPr>
+      <p:pic>
+        <p:nvPicPr>
+          <p:cNvPr id="156" name="Content Placeholder 4"/>
+          <p:cNvPicPr/>
+          <p:nvPr/>
+        </p:nvPicPr>
+        <p:blipFill>
+          <a:blip r:embed="rId2"/>
+          <a:stretch/>
+        </p:blipFill>
+        <p:spPr>
+          <a:xfrm>
+            <a:off x="11379240" y="60480"/>
+            <a:ext cx="700920" cy="700920"/>
+          </a:xfrm>
+          <a:prstGeom prst="rect">
+            <a:avLst/>
+          </a:prstGeom>
+          <a:ln>
+            <a:noFill/>
+          </a:ln>
+        </p:spPr>
+      </p:pic>
+      <p:sp>
+        <p:nvSpPr>
+          <p:cNvPr id="158" name="CustomShape 2"/>
+          <p:cNvSpPr/>
+          <p:nvPr/>
+        </p:nvSpPr>
+        <p:spPr>
+          <a:xfrm>
+            <a:off x="4313696" y="945942"/>
+            <a:ext cx="3026511" cy="521766"/>
+          </a:xfrm>
+          <a:prstGeom prst="rect">
+            <a:avLst/>
+          </a:prstGeom>
+          <a:noFill/>
+          <a:ln>
+            <a:noFill/>
+          </a:ln>
+        </p:spPr>
+        <p:style>
+          <a:lnRef idx="0">
+            <a:scrgbClr r="0" g="0" b="0"/>
+          </a:lnRef>
+          <a:fillRef idx="0">
+            <a:scrgbClr r="0" g="0" b="0"/>
+          </a:fillRef>
+          <a:effectRef idx="0">
+            <a:scrgbClr r="0" g="0" b="0"/>
+          </a:effectRef>
+          <a:fontRef idx="minor"/>
+        </p:style>
+        <p:txBody>
+          <a:bodyPr wrap="none" lIns="90000" tIns="45000" rIns="90000" bIns="45000">
+            <a:spAutoFit/>
+          </a:bodyPr>
+          <a:lstStyle/>
+          <a:p>
+            <a:pPr marL="0" marR="0" lvl="0" indent="0" algn="l" defTabSz="914400" rtl="0" eaLnBrk="1" fontAlgn="auto" latinLnBrk="0" hangingPunct="1">
+              <a:lnSpc>
+                <a:spcPct val="100000"/>
+              </a:lnSpc>
+              <a:spcBef>
+                <a:spcPts val="0"/>
+              </a:spcBef>
+              <a:spcAft>
+                <a:spcPts val="0"/>
+              </a:spcAft>
+              <a:buClrTx/>
+              <a:buSzTx/>
+              <a:buFontTx/>
+              <a:buNone/>
+              <a:tabLst/>
+              <a:defRPr/>
+            </a:pPr>
+            <a:r>
+              <a:rPr kumimoji="0" lang="en-US" sz="2800" b="1" i="0" u="none" strike="noStrike" kern="1200" cap="none" spc="-1" normalizeH="0" baseline="0" noProof="0" dirty="0" smtClean="0">
+                <a:ln>
+                  <a:noFill/>
+                </a:ln>
+                <a:solidFill>
+                  <a:srgbClr val="FFFFFF"/>
+                </a:solidFill>
+                <a:effectLst/>
+                <a:uLnTx/>
+                <a:uFillTx/>
+                <a:latin typeface="Times New Roman"/>
+              </a:rPr>
+              <a:t>Mô hình phân tích</a:t>
+            </a:r>
+            <a:endParaRPr kumimoji="0" lang="vi-VN" sz="2800" b="1" i="0" u="none" strike="noStrike" kern="1200" cap="none" spc="-1" normalizeH="0" baseline="0" noProof="0" dirty="0">
+              <a:ln>
+                <a:noFill/>
+              </a:ln>
+              <a:solidFill>
+                <a:prstClr val="black"/>
+              </a:solidFill>
+              <a:effectLst/>
+              <a:uLnTx/>
+              <a:uFillTx/>
+              <a:latin typeface="Arial"/>
+            </a:endParaRPr>
+          </a:p>
+        </p:txBody>
+      </p:sp>
+      <p:sp>
+        <p:nvSpPr>
+          <p:cNvPr id="2" name="TextBox 1"/>
+          <p:cNvSpPr txBox="1"/>
+          <p:nvPr/>
+        </p:nvSpPr>
+        <p:spPr>
+          <a:xfrm>
+            <a:off x="1033670" y="1441899"/>
+            <a:ext cx="5645426" cy="461665"/>
+          </a:xfrm>
+          <a:prstGeom prst="rect">
+            <a:avLst/>
+          </a:prstGeom>
+          <a:noFill/>
+        </p:spPr>
+        <p:txBody>
+          <a:bodyPr wrap="square" rtlCol="0">
+            <a:spAutoFit/>
+          </a:bodyPr>
+          <a:lstStyle/>
+          <a:p>
+            <a:pPr marL="0" marR="0" lvl="0" indent="0" algn="l" defTabSz="914400" rtl="0" eaLnBrk="1" fontAlgn="auto" latinLnBrk="0" hangingPunct="1">
+              <a:lnSpc>
+                <a:spcPct val="100000"/>
+              </a:lnSpc>
+              <a:spcBef>
+                <a:spcPts val="0"/>
+              </a:spcBef>
+              <a:spcAft>
+                <a:spcPts val="0"/>
+              </a:spcAft>
+              <a:buClrTx/>
+              <a:buSzTx/>
+              <a:buFontTx/>
+              <a:buNone/>
+              <a:tabLst/>
+              <a:defRPr/>
+            </a:pPr>
+            <a:r>
+              <a:rPr lang="en-US" sz="2400" dirty="0" smtClean="0">
+                <a:solidFill>
+                  <a:prstClr val="white"/>
+                </a:solidFill>
+                <a:latin typeface="Times New Roman" panose="02020603050405020304" pitchFamily="18" charset="0"/>
+                <a:cs typeface="Times New Roman" panose="02020603050405020304" pitchFamily="18" charset="0"/>
+              </a:rPr>
+              <a:t>Phân quyền người dùng</a:t>
+            </a:r>
+            <a:endParaRPr kumimoji="0" lang="en-US" sz="2400" b="0" i="0" u="none" strike="noStrike" kern="1200" cap="none" spc="0" normalizeH="0" baseline="0" noProof="0" dirty="0">
+              <a:ln>
+                <a:noFill/>
+              </a:ln>
+              <a:solidFill>
+                <a:prstClr val="white"/>
+              </a:solidFill>
+              <a:effectLst/>
+              <a:uLnTx/>
+              <a:uFillTx/>
+              <a:latin typeface="Times New Roman" panose="02020603050405020304" pitchFamily="18" charset="0"/>
+              <a:cs typeface="Times New Roman" panose="02020603050405020304" pitchFamily="18" charset="0"/>
+            </a:endParaRPr>
+          </a:p>
+        </p:txBody>
+      </p:sp>
+      <p:sp>
+        <p:nvSpPr>
+          <p:cNvPr id="3" name="TextBox 2"/>
+          <p:cNvSpPr txBox="1"/>
+          <p:nvPr/>
+        </p:nvSpPr>
+        <p:spPr>
+          <a:xfrm>
+            <a:off x="1405364" y="1903564"/>
+            <a:ext cx="2172723" cy="677108"/>
+          </a:xfrm>
+          <a:prstGeom prst="rect">
+            <a:avLst/>
+          </a:prstGeom>
+          <a:noFill/>
+        </p:spPr>
+        <p:txBody>
+          <a:bodyPr wrap="square" rtlCol="0">
+            <a:spAutoFit/>
+          </a:bodyPr>
+          <a:lstStyle/>
+          <a:p>
+            <a:pPr marL="0" marR="0" lvl="0" indent="0" algn="l" defTabSz="914400" rtl="0" eaLnBrk="1" fontAlgn="auto" latinLnBrk="0" hangingPunct="1">
+              <a:lnSpc>
+                <a:spcPct val="100000"/>
+              </a:lnSpc>
+              <a:spcBef>
+                <a:spcPts val="0"/>
+              </a:spcBef>
+              <a:spcAft>
+                <a:spcPts val="0"/>
+              </a:spcAft>
+              <a:buClrTx/>
+              <a:buSzTx/>
+              <a:buFontTx/>
+              <a:buNone/>
+              <a:tabLst/>
+              <a:defRPr/>
+            </a:pPr>
+            <a:r>
+              <a:rPr kumimoji="0" lang="en-US" sz="1800" b="0" i="0" u="none" strike="noStrike" kern="1200" cap="none" spc="0" normalizeH="0" baseline="0" noProof="0" dirty="0">
+                <a:ln>
+                  <a:noFill/>
+                </a:ln>
+                <a:solidFill>
+                  <a:prstClr val="white"/>
+                </a:solidFill>
+                <a:effectLst/>
+                <a:uLnTx/>
+                <a:uFillTx/>
+                <a:latin typeface="Times New Roman" panose="02020603050405020304" pitchFamily="18" charset="0"/>
+                <a:cs typeface="Times New Roman" panose="02020603050405020304" pitchFamily="18" charset="0"/>
+              </a:rPr>
+              <a:t>- </a:t>
+            </a:r>
+            <a:r>
+              <a:rPr kumimoji="0" lang="en-US" sz="2000" b="0" i="0" u="none" strike="noStrike" kern="1200" cap="none" spc="0" normalizeH="0" baseline="0" noProof="0" dirty="0">
+                <a:ln>
+                  <a:noFill/>
+                </a:ln>
+                <a:solidFill>
+                  <a:prstClr val="white"/>
+                </a:solidFill>
+                <a:effectLst/>
+                <a:uLnTx/>
+                <a:uFillTx/>
+                <a:latin typeface="Times New Roman" panose="02020603050405020304" pitchFamily="18" charset="0"/>
+                <a:cs typeface="Times New Roman" panose="02020603050405020304" pitchFamily="18" charset="0"/>
+              </a:rPr>
+              <a:t>Biểu</a:t>
+            </a:r>
+            <a:r>
+              <a:rPr kumimoji="0" lang="en-US" sz="1800" b="0" i="0" u="none" strike="noStrike" kern="1200" cap="none" spc="0" normalizeH="0" baseline="0" noProof="0" dirty="0">
+                <a:ln>
+                  <a:noFill/>
+                </a:ln>
+                <a:solidFill>
+                  <a:prstClr val="white"/>
+                </a:solidFill>
+                <a:effectLst/>
+                <a:uLnTx/>
+                <a:uFillTx/>
+                <a:latin typeface="Times New Roman" panose="02020603050405020304" pitchFamily="18" charset="0"/>
+                <a:cs typeface="Times New Roman" panose="02020603050405020304" pitchFamily="18" charset="0"/>
+              </a:rPr>
+              <a:t> đồ trình tự</a:t>
+            </a:r>
+          </a:p>
+          <a:p>
+            <a:pPr marL="0" marR="0" lvl="0" indent="0" algn="l" defTabSz="914400" rtl="0" eaLnBrk="1" fontAlgn="auto" latinLnBrk="0" hangingPunct="1">
+              <a:lnSpc>
+                <a:spcPct val="100000"/>
+              </a:lnSpc>
+              <a:spcBef>
+                <a:spcPts val="0"/>
+              </a:spcBef>
+              <a:spcAft>
+                <a:spcPts val="0"/>
+              </a:spcAft>
+              <a:buClrTx/>
+              <a:buSzTx/>
+              <a:buFontTx/>
+              <a:buNone/>
+              <a:tabLst/>
+              <a:defRPr/>
+            </a:pPr>
+            <a:endParaRPr kumimoji="0" lang="en-US" sz="1800" b="0" i="0" u="none" strike="noStrike" kern="1200" cap="none" spc="0" normalizeH="0" baseline="0" noProof="0" dirty="0">
+              <a:ln>
+                <a:noFill/>
+              </a:ln>
+              <a:solidFill>
+                <a:prstClr val="black"/>
+              </a:solidFill>
+              <a:effectLst/>
+              <a:uLnTx/>
+              <a:uFillTx/>
+              <a:latin typeface="Arial"/>
+            </a:endParaRPr>
+          </a:p>
+        </p:txBody>
+      </p:sp>
+      <p:pic>
+        <p:nvPicPr>
+          <p:cNvPr id="5" name="Picture 4"/>
+          <p:cNvPicPr>
+            <a:picLocks noChangeAspect="1"/>
+          </p:cNvPicPr>
+          <p:nvPr/>
+        </p:nvPicPr>
+        <p:blipFill>
+          <a:blip r:embed="rId3"/>
+          <a:stretch>
+            <a:fillRect/>
+          </a:stretch>
+        </p:blipFill>
+        <p:spPr>
+          <a:xfrm>
+            <a:off x="1900237" y="2365229"/>
+            <a:ext cx="8391525" cy="3683146"/>
+          </a:xfrm>
+          <a:prstGeom prst="rect">
+            <a:avLst/>
+          </a:prstGeom>
+        </p:spPr>
+      </p:pic>
+    </p:spTree>
+    <p:extLst>
+      <p:ext uri="{BB962C8B-B14F-4D97-AF65-F5344CB8AC3E}">
+        <p14:creationId xmlns:p14="http://schemas.microsoft.com/office/powerpoint/2010/main" val="4270855926"/>
+      </p:ext>
+    </p:extLst>
+  </p:cSld>
+  <p:clrMapOvr>
+    <a:masterClrMapping/>
+  </p:clrMapOvr>
+  <mc:AlternateContent xmlns:mc="http://schemas.openxmlformats.org/markup-compatibility/2006" xmlns:p14="http://schemas.microsoft.com/office/powerpoint/2010/main">
+    <mc:Choice Requires="p14">
+      <p:transition spd="slow" p14:dur="2000"/>
+    </mc:Choice>
+    <mc:Fallback xmlns:p15="http://schemas.microsoft.com/office/powerpoint/2012/main" xmlns="">
+      <p:transition spd="slow"/>
+    </mc:Fallback>
+  </mc:AlternateContent>
+  <p:timing>
+    <p:tnLst>
+      <p:par>
+        <p:cTn id="1" dur="indefinite" restart="never" nodeType="tmRoot"/>
+      </p:par>
+    </p:tnLst>
+  </p:timing>
+</p:sld>
+</file>
+
+<file path=ppt/slides/slide59.xml><?xml version="1.0" encoding="utf-8"?>
+<p:sld xmlns:a="http://schemas.openxmlformats.org/drawingml/2006/main" xmlns:r="http://schemas.openxmlformats.org/officeDocument/2006/relationships" xmlns:p="http://schemas.openxmlformats.org/presentationml/2006/main">
+  <p:cSld>
+    <p:spTree>
+      <p:nvGrpSpPr>
+        <p:cNvPr id="1" name=""/>
+        <p:cNvGrpSpPr/>
+        <p:nvPr/>
+      </p:nvGrpSpPr>
+      <p:grpSpPr>
+        <a:xfrm>
+          <a:off x="0" y="0"/>
+          <a:ext cx="0" cy="0"/>
+          <a:chOff x="0" y="0"/>
+          <a:chExt cx="0" cy="0"/>
+        </a:xfrm>
+      </p:grpSpPr>
+      <p:pic>
+        <p:nvPicPr>
+          <p:cNvPr id="156" name="Content Placeholder 4"/>
+          <p:cNvPicPr/>
+          <p:nvPr/>
+        </p:nvPicPr>
+        <p:blipFill>
+          <a:blip r:embed="rId2"/>
+          <a:stretch/>
+        </p:blipFill>
+        <p:spPr>
+          <a:xfrm>
+            <a:off x="11379240" y="60480"/>
+            <a:ext cx="700920" cy="700920"/>
+          </a:xfrm>
+          <a:prstGeom prst="rect">
+            <a:avLst/>
+          </a:prstGeom>
+          <a:ln>
+            <a:noFill/>
+          </a:ln>
+        </p:spPr>
+      </p:pic>
+      <p:sp>
+        <p:nvSpPr>
+          <p:cNvPr id="158" name="CustomShape 2"/>
+          <p:cNvSpPr/>
+          <p:nvPr/>
+        </p:nvSpPr>
+        <p:spPr>
+          <a:xfrm>
+            <a:off x="4313696" y="945942"/>
+            <a:ext cx="3026511" cy="521766"/>
+          </a:xfrm>
+          <a:prstGeom prst="rect">
+            <a:avLst/>
+          </a:prstGeom>
+          <a:noFill/>
+          <a:ln>
+            <a:noFill/>
+          </a:ln>
+        </p:spPr>
+        <p:style>
+          <a:lnRef idx="0">
+            <a:scrgbClr r="0" g="0" b="0"/>
+          </a:lnRef>
+          <a:fillRef idx="0">
+            <a:scrgbClr r="0" g="0" b="0"/>
+          </a:fillRef>
+          <a:effectRef idx="0">
+            <a:scrgbClr r="0" g="0" b="0"/>
+          </a:effectRef>
+          <a:fontRef idx="minor"/>
+        </p:style>
+        <p:txBody>
+          <a:bodyPr wrap="none" lIns="90000" tIns="45000" rIns="90000" bIns="45000">
+            <a:spAutoFit/>
+          </a:bodyPr>
+          <a:lstStyle/>
+          <a:p>
+            <a:pPr marL="0" marR="0" lvl="0" indent="0" algn="l" defTabSz="914400" rtl="0" eaLnBrk="1" fontAlgn="auto" latinLnBrk="0" hangingPunct="1">
+              <a:lnSpc>
+                <a:spcPct val="100000"/>
+              </a:lnSpc>
+              <a:spcBef>
+                <a:spcPts val="0"/>
+              </a:spcBef>
+              <a:spcAft>
+                <a:spcPts val="0"/>
+              </a:spcAft>
+              <a:buClrTx/>
+              <a:buSzTx/>
+              <a:buFontTx/>
+              <a:buNone/>
+              <a:tabLst/>
+              <a:defRPr/>
+            </a:pPr>
+            <a:r>
+              <a:rPr kumimoji="0" lang="en-US" sz="2800" b="1" i="0" u="none" strike="noStrike" kern="1200" cap="none" spc="-1" normalizeH="0" baseline="0" noProof="0" dirty="0" smtClean="0">
+                <a:ln>
+                  <a:noFill/>
+                </a:ln>
+                <a:solidFill>
+                  <a:srgbClr val="FFFFFF"/>
+                </a:solidFill>
+                <a:effectLst/>
+                <a:uLnTx/>
+                <a:uFillTx/>
+                <a:latin typeface="Times New Roman"/>
+              </a:rPr>
+              <a:t>Mô hình phân tích</a:t>
+            </a:r>
+            <a:endParaRPr kumimoji="0" lang="vi-VN" sz="2800" b="1" i="0" u="none" strike="noStrike" kern="1200" cap="none" spc="-1" normalizeH="0" baseline="0" noProof="0" dirty="0">
+              <a:ln>
+                <a:noFill/>
+              </a:ln>
+              <a:solidFill>
+                <a:prstClr val="black"/>
+              </a:solidFill>
+              <a:effectLst/>
+              <a:uLnTx/>
+              <a:uFillTx/>
+              <a:latin typeface="Arial"/>
+            </a:endParaRPr>
+          </a:p>
+        </p:txBody>
+      </p:sp>
+      <p:sp>
+        <p:nvSpPr>
+          <p:cNvPr id="2" name="TextBox 1"/>
+          <p:cNvSpPr txBox="1"/>
+          <p:nvPr/>
+        </p:nvSpPr>
+        <p:spPr>
+          <a:xfrm>
+            <a:off x="1033670" y="1441899"/>
+            <a:ext cx="5645426" cy="461665"/>
+          </a:xfrm>
+          <a:prstGeom prst="rect">
+            <a:avLst/>
+          </a:prstGeom>
+          <a:noFill/>
+        </p:spPr>
+        <p:txBody>
+          <a:bodyPr wrap="square" rtlCol="0">
+            <a:spAutoFit/>
+          </a:bodyPr>
+          <a:lstStyle/>
+          <a:p>
+            <a:pPr marL="0" marR="0" lvl="0" indent="0" algn="l" defTabSz="914400" rtl="0" eaLnBrk="1" fontAlgn="auto" latinLnBrk="0" hangingPunct="1">
+              <a:lnSpc>
+                <a:spcPct val="100000"/>
+              </a:lnSpc>
+              <a:spcBef>
+                <a:spcPts val="0"/>
+              </a:spcBef>
+              <a:spcAft>
+                <a:spcPts val="0"/>
+              </a:spcAft>
+              <a:buClrTx/>
+              <a:buSzTx/>
+              <a:buFontTx/>
+              <a:buNone/>
+              <a:tabLst/>
+              <a:defRPr/>
+            </a:pPr>
+            <a:r>
+              <a:rPr kumimoji="0" lang="en-US" sz="2400" b="0" i="0" u="none" strike="noStrike" kern="1200" cap="none" spc="0" normalizeH="0" baseline="0" noProof="0" dirty="0" smtClean="0">
+                <a:ln>
+                  <a:noFill/>
+                </a:ln>
+                <a:solidFill>
+                  <a:prstClr val="white"/>
+                </a:solidFill>
+                <a:effectLst/>
+                <a:uLnTx/>
+                <a:uFillTx/>
+                <a:latin typeface="Times New Roman" panose="02020603050405020304" pitchFamily="18" charset="0"/>
+                <a:cs typeface="Times New Roman" panose="02020603050405020304" pitchFamily="18" charset="0"/>
+              </a:rPr>
+              <a:t>Quản</a:t>
+            </a:r>
+            <a:r>
+              <a:rPr kumimoji="0" lang="en-US" sz="2400" b="0" i="0" u="none" strike="noStrike" kern="1200" cap="none" spc="0" normalizeH="0" noProof="0" dirty="0" smtClean="0">
+                <a:ln>
+                  <a:noFill/>
+                </a:ln>
+                <a:solidFill>
+                  <a:prstClr val="white"/>
+                </a:solidFill>
+                <a:effectLst/>
+                <a:uLnTx/>
+                <a:uFillTx/>
+                <a:latin typeface="Times New Roman" panose="02020603050405020304" pitchFamily="18" charset="0"/>
+                <a:cs typeface="Times New Roman" panose="02020603050405020304" pitchFamily="18" charset="0"/>
+              </a:rPr>
+              <a:t> lí tài khoản</a:t>
+            </a:r>
+            <a:endParaRPr kumimoji="0" lang="en-US" sz="2400" b="0" i="0" u="none" strike="noStrike" kern="1200" cap="none" spc="0" normalizeH="0" baseline="0" noProof="0" dirty="0">
+              <a:ln>
+                <a:noFill/>
+              </a:ln>
+              <a:solidFill>
+                <a:prstClr val="white"/>
+              </a:solidFill>
+              <a:effectLst/>
+              <a:uLnTx/>
+              <a:uFillTx/>
+              <a:latin typeface="Times New Roman" panose="02020603050405020304" pitchFamily="18" charset="0"/>
+              <a:cs typeface="Times New Roman" panose="02020603050405020304" pitchFamily="18" charset="0"/>
+            </a:endParaRPr>
+          </a:p>
+        </p:txBody>
+      </p:sp>
+      <p:sp>
+        <p:nvSpPr>
+          <p:cNvPr id="3" name="TextBox 2"/>
+          <p:cNvSpPr txBox="1"/>
+          <p:nvPr/>
+        </p:nvSpPr>
+        <p:spPr>
+          <a:xfrm>
+            <a:off x="1405364" y="1903564"/>
+            <a:ext cx="3961766" cy="677108"/>
+          </a:xfrm>
+          <a:prstGeom prst="rect">
+            <a:avLst/>
+          </a:prstGeom>
+          <a:noFill/>
+        </p:spPr>
+        <p:txBody>
+          <a:bodyPr wrap="square" rtlCol="0">
+            <a:spAutoFit/>
+          </a:bodyPr>
+          <a:lstStyle/>
+          <a:p>
+            <a:pPr marL="0" marR="0" lvl="0" indent="0" algn="l" defTabSz="914400" rtl="0" eaLnBrk="1" fontAlgn="auto" latinLnBrk="0" hangingPunct="1">
+              <a:lnSpc>
+                <a:spcPct val="100000"/>
+              </a:lnSpc>
+              <a:spcBef>
+                <a:spcPts val="0"/>
+              </a:spcBef>
+              <a:spcAft>
+                <a:spcPts val="0"/>
+              </a:spcAft>
+              <a:buClrTx/>
+              <a:buSzTx/>
+              <a:buFontTx/>
+              <a:buNone/>
+              <a:tabLst/>
+              <a:defRPr/>
+            </a:pPr>
+            <a:r>
+              <a:rPr kumimoji="0" lang="en-US" sz="1800" b="0" i="0" u="none" strike="noStrike" kern="1200" cap="none" spc="0" normalizeH="0" baseline="0" noProof="0" dirty="0">
+                <a:ln>
+                  <a:noFill/>
+                </a:ln>
+                <a:solidFill>
+                  <a:prstClr val="white"/>
+                </a:solidFill>
+                <a:effectLst/>
+                <a:uLnTx/>
+                <a:uFillTx/>
+                <a:latin typeface="Times New Roman" panose="02020603050405020304" pitchFamily="18" charset="0"/>
+                <a:cs typeface="Times New Roman" panose="02020603050405020304" pitchFamily="18" charset="0"/>
+              </a:rPr>
+              <a:t>- </a:t>
+            </a:r>
+            <a:r>
+              <a:rPr kumimoji="0" lang="en-US" sz="2000" b="0" i="0" u="none" strike="noStrike" kern="1200" cap="none" spc="0" normalizeH="0" baseline="0" noProof="0" dirty="0" smtClean="0">
+                <a:ln>
+                  <a:noFill/>
+                </a:ln>
+                <a:solidFill>
+                  <a:prstClr val="white"/>
+                </a:solidFill>
+                <a:effectLst/>
+                <a:uLnTx/>
+                <a:uFillTx/>
+                <a:latin typeface="Times New Roman" panose="02020603050405020304" pitchFamily="18" charset="0"/>
+                <a:cs typeface="Times New Roman" panose="02020603050405020304" pitchFamily="18" charset="0"/>
+              </a:rPr>
+              <a:t>Biểu đồ lớp phân tích</a:t>
+            </a:r>
+            <a:endParaRPr kumimoji="0" lang="en-US" sz="1800" b="0" i="0" u="none" strike="noStrike" kern="1200" cap="none" spc="0" normalizeH="0" baseline="0" noProof="0" dirty="0">
+              <a:ln>
+                <a:noFill/>
+              </a:ln>
+              <a:solidFill>
+                <a:prstClr val="white"/>
+              </a:solidFill>
+              <a:effectLst/>
+              <a:uLnTx/>
+              <a:uFillTx/>
+              <a:latin typeface="Times New Roman" panose="02020603050405020304" pitchFamily="18" charset="0"/>
+              <a:cs typeface="Times New Roman" panose="02020603050405020304" pitchFamily="18" charset="0"/>
+            </a:endParaRPr>
+          </a:p>
+          <a:p>
+            <a:pPr marL="0" marR="0" lvl="0" indent="0" algn="l" defTabSz="914400" rtl="0" eaLnBrk="1" fontAlgn="auto" latinLnBrk="0" hangingPunct="1">
+              <a:lnSpc>
+                <a:spcPct val="100000"/>
+              </a:lnSpc>
+              <a:spcBef>
+                <a:spcPts val="0"/>
+              </a:spcBef>
+              <a:spcAft>
+                <a:spcPts val="0"/>
+              </a:spcAft>
+              <a:buClrTx/>
+              <a:buSzTx/>
+              <a:buFontTx/>
+              <a:buNone/>
+              <a:tabLst/>
+              <a:defRPr/>
+            </a:pPr>
+            <a:endParaRPr kumimoji="0" lang="en-US" sz="1800" b="0" i="0" u="none" strike="noStrike" kern="1200" cap="none" spc="0" normalizeH="0" baseline="0" noProof="0" dirty="0">
+              <a:ln>
+                <a:noFill/>
+              </a:ln>
+              <a:solidFill>
+                <a:prstClr val="black"/>
+              </a:solidFill>
+              <a:effectLst/>
+              <a:uLnTx/>
+              <a:uFillTx/>
+              <a:latin typeface="Arial"/>
+            </a:endParaRPr>
+          </a:p>
+        </p:txBody>
+      </p:sp>
+      <p:pic>
+        <p:nvPicPr>
+          <p:cNvPr id="4" name="Picture 3"/>
+          <p:cNvPicPr>
+            <a:picLocks noChangeAspect="1"/>
+          </p:cNvPicPr>
+          <p:nvPr/>
+        </p:nvPicPr>
+        <p:blipFill>
+          <a:blip r:embed="rId3"/>
+          <a:stretch>
+            <a:fillRect/>
+          </a:stretch>
+        </p:blipFill>
+        <p:spPr>
+          <a:xfrm>
+            <a:off x="2009775" y="2399520"/>
+            <a:ext cx="8172450" cy="3616967"/>
+          </a:xfrm>
+          <a:prstGeom prst="rect">
+            <a:avLst/>
+          </a:prstGeom>
+        </p:spPr>
+      </p:pic>
+    </p:spTree>
+    <p:extLst>
+      <p:ext uri="{BB962C8B-B14F-4D97-AF65-F5344CB8AC3E}">
+        <p14:creationId xmlns:p14="http://schemas.microsoft.com/office/powerpoint/2010/main" val="3809264540"/>
+      </p:ext>
+    </p:extLst>
+  </p:cSld>
+  <p:clrMapOvr>
+    <a:masterClrMapping/>
+  </p:clrMapOvr>
+  <mc:AlternateContent xmlns:mc="http://schemas.openxmlformats.org/markup-compatibility/2006" xmlns:p14="http://schemas.microsoft.com/office/powerpoint/2010/main">
+    <mc:Choice Requires="p14">
+      <p:transition spd="slow" p14:dur="2000"/>
+    </mc:Choice>
+    <mc:Fallback xmlns:p15="http://schemas.microsoft.com/office/powerpoint/2012/main" xmlns="">
       <p:transition spd="slow"/>
     </mc:Fallback>
   </mc:AlternateContent>
@@ -25366,7 +26510,127 @@
     <mc:Choice Requires="p14">
       <p:transition spd="slow" p14:dur="2000"/>
     </mc:Choice>
-    <mc:Fallback xmlns="" xmlns:p15="http://schemas.microsoft.com/office/powerpoint/2012/main">
+    <mc:Fallback xmlns:p15="http://schemas.microsoft.com/office/powerpoint/2012/main" xmlns="">
+      <p:transition spd="slow"/>
+    </mc:Fallback>
+  </mc:AlternateContent>
+  <p:timing>
+    <p:tnLst>
+      <p:par>
+        <p:cTn id="1" dur="indefinite" restart="never" nodeType="tmRoot"/>
+      </p:par>
+    </p:tnLst>
+  </p:timing>
+</p:sld>
+</file>
+
+<file path=ppt/slides/slide60.xml><?xml version="1.0" encoding="utf-8"?>
+<p:sld xmlns:a="http://schemas.openxmlformats.org/drawingml/2006/main" xmlns:r="http://schemas.openxmlformats.org/officeDocument/2006/relationships" xmlns:p="http://schemas.openxmlformats.org/presentationml/2006/main">
+  <p:cSld>
+    <p:spTree>
+      <p:nvGrpSpPr>
+        <p:cNvPr id="1" name=""/>
+        <p:cNvGrpSpPr/>
+        <p:nvPr/>
+      </p:nvGrpSpPr>
+      <p:grpSpPr>
+        <a:xfrm>
+          <a:off x="0" y="0"/>
+          <a:ext cx="0" cy="0"/>
+          <a:chOff x="0" y="0"/>
+          <a:chExt cx="0" cy="0"/>
+        </a:xfrm>
+      </p:grpSpPr>
+      <p:pic>
+        <p:nvPicPr>
+          <p:cNvPr id="292" name="Content Placeholder 4"/>
+          <p:cNvPicPr/>
+          <p:nvPr/>
+        </p:nvPicPr>
+        <p:blipFill>
+          <a:blip r:embed="rId2"/>
+          <a:stretch/>
+        </p:blipFill>
+        <p:spPr>
+          <a:xfrm>
+            <a:off x="11379240" y="60480"/>
+            <a:ext cx="700920" cy="700920"/>
+          </a:xfrm>
+          <a:prstGeom prst="rect">
+            <a:avLst/>
+          </a:prstGeom>
+          <a:ln>
+            <a:noFill/>
+          </a:ln>
+        </p:spPr>
+      </p:pic>
+      <p:sp>
+        <p:nvSpPr>
+          <p:cNvPr id="293" name="CustomShape 1"/>
+          <p:cNvSpPr/>
+          <p:nvPr/>
+        </p:nvSpPr>
+        <p:spPr>
+          <a:xfrm>
+            <a:off x="1794240" y="2705760"/>
+            <a:ext cx="8602920" cy="1431000"/>
+          </a:xfrm>
+          <a:prstGeom prst="rect">
+            <a:avLst/>
+          </a:prstGeom>
+          <a:noFill/>
+          <a:ln>
+            <a:noFill/>
+          </a:ln>
+        </p:spPr>
+        <p:style>
+          <a:lnRef idx="0">
+            <a:scrgbClr r="0" g="0" b="0"/>
+          </a:lnRef>
+          <a:fillRef idx="0">
+            <a:scrgbClr r="0" g="0" b="0"/>
+          </a:fillRef>
+          <a:effectRef idx="0">
+            <a:scrgbClr r="0" g="0" b="0"/>
+          </a:effectRef>
+          <a:fontRef idx="minor"/>
+        </p:style>
+        <p:txBody>
+          <a:bodyPr wrap="none" lIns="90000" tIns="45000" rIns="90000" bIns="45000">
+            <a:spAutoFit/>
+          </a:bodyPr>
+          <a:lstStyle/>
+          <a:p>
+            <a:pPr>
+              <a:lnSpc>
+                <a:spcPct val="100000"/>
+              </a:lnSpc>
+            </a:pPr>
+            <a:r>
+              <a:rPr lang="vi-VN" sz="8800" b="1" strike="noStrike" spc="-1">
+                <a:solidFill>
+                  <a:srgbClr val="FFFFFF"/>
+                </a:solidFill>
+                <a:latin typeface="Brush Script MT"/>
+              </a:rPr>
+              <a:t>Thank You !!!</a:t>
+            </a:r>
+            <a:endParaRPr lang="vi-VN" sz="8800" b="0" strike="noStrike" spc="-1">
+              <a:latin typeface="Arial"/>
+            </a:endParaRPr>
+          </a:p>
+        </p:txBody>
+      </p:sp>
+    </p:spTree>
+  </p:cSld>
+  <p:clrMapOvr>
+    <a:masterClrMapping/>
+  </p:clrMapOvr>
+  <mc:AlternateContent xmlns:mc="http://schemas.openxmlformats.org/markup-compatibility/2006" xmlns:p14="http://schemas.microsoft.com/office/powerpoint/2010/main">
+    <mc:Choice Requires="p14">
+      <p:transition spd="slow" p14:dur="2000"/>
+    </mc:Choice>
+    <mc:Fallback xmlns:p15="http://schemas.microsoft.com/office/powerpoint/2012/main" xmlns="">
       <p:transition spd="slow"/>
     </mc:Fallback>
   </mc:AlternateContent>
@@ -25638,7 +26902,7 @@
     <mc:Choice Requires="p14">
       <p:transition spd="slow" p14:dur="2000"/>
     </mc:Choice>
-    <mc:Fallback xmlns="" xmlns:p15="http://schemas.microsoft.com/office/powerpoint/2012/main">
+    <mc:Fallback xmlns:p15="http://schemas.microsoft.com/office/powerpoint/2012/main" xmlns="">
       <p:transition spd="slow"/>
     </mc:Fallback>
   </mc:AlternateContent>
@@ -25996,7 +27260,7 @@
     <mc:Choice Requires="p14">
       <p:transition spd="slow" p14:dur="2000"/>
     </mc:Choice>
-    <mc:Fallback xmlns="" xmlns:p15="http://schemas.microsoft.com/office/powerpoint/2012/main">
+    <mc:Fallback xmlns:p15="http://schemas.microsoft.com/office/powerpoint/2012/main" xmlns="">
       <p:transition spd="slow"/>
     </mc:Fallback>
   </mc:AlternateContent>
@@ -26308,7 +27572,7 @@
     <mc:Choice Requires="p14">
       <p:transition spd="slow" p14:dur="2000"/>
     </mc:Choice>
-    <mc:Fallback xmlns="" xmlns:p15="http://schemas.microsoft.com/office/powerpoint/2012/main">
+    <mc:Fallback xmlns:p15="http://schemas.microsoft.com/office/powerpoint/2012/main" xmlns="">
       <p:transition spd="slow"/>
     </mc:Fallback>
   </mc:AlternateContent>

</xml_diff>